<commit_message>
Adds to slides and Array code
</commit_message>
<xml_diff>
--- a/Selenium, module 2.pptx
+++ b/Selenium, module 2.pptx
@@ -9,7 +9,7 @@
   </p:notesMasterIdLst>
   <p:sldIdLst>
     <p:sldId id="256" r:id="rId2"/>
-    <p:sldId id="257" r:id="rId3"/>
+    <p:sldId id="312" r:id="rId3"/>
     <p:sldId id="278" r:id="rId4"/>
     <p:sldId id="279" r:id="rId5"/>
     <p:sldId id="280" r:id="rId6"/>
@@ -284,6 +284,3121 @@
     </p:ext>
   </p:extLst>
 </p:presentation>
+</file>
+
+<file path=ppt/diagrams/colors1.xml><?xml version="1.0" encoding="utf-8"?>
+<dgm:colorsDef xmlns:dgm="http://schemas.openxmlformats.org/drawingml/2006/diagram" xmlns:a="http://schemas.openxmlformats.org/drawingml/2006/main" uniqueId="urn:microsoft.com/office/officeart/2005/8/colors/accent1_2">
+  <dgm:title val=""/>
+  <dgm:desc val=""/>
+  <dgm:catLst>
+    <dgm:cat type="accent1" pri="11200"/>
+  </dgm:catLst>
+  <dgm:styleLbl name="node0">
+    <dgm:fillClrLst meth="repeat">
+      <a:schemeClr val="accent1"/>
+    </dgm:fillClrLst>
+    <dgm:linClrLst meth="repeat">
+      <a:schemeClr val="lt1"/>
+    </dgm:linClrLst>
+    <dgm:effectClrLst/>
+    <dgm:txLinClrLst/>
+    <dgm:txFillClrLst/>
+    <dgm:txEffectClrLst/>
+  </dgm:styleLbl>
+  <dgm:styleLbl name="alignNode1">
+    <dgm:fillClrLst meth="repeat">
+      <a:schemeClr val="accent1"/>
+    </dgm:fillClrLst>
+    <dgm:linClrLst meth="repeat">
+      <a:schemeClr val="accent1"/>
+    </dgm:linClrLst>
+    <dgm:effectClrLst/>
+    <dgm:txLinClrLst/>
+    <dgm:txFillClrLst/>
+    <dgm:txEffectClrLst/>
+  </dgm:styleLbl>
+  <dgm:styleLbl name="node1">
+    <dgm:fillClrLst meth="repeat">
+      <a:schemeClr val="accent1"/>
+    </dgm:fillClrLst>
+    <dgm:linClrLst meth="repeat">
+      <a:schemeClr val="lt1"/>
+    </dgm:linClrLst>
+    <dgm:effectClrLst/>
+    <dgm:txLinClrLst/>
+    <dgm:txFillClrLst/>
+    <dgm:txEffectClrLst/>
+  </dgm:styleLbl>
+  <dgm:styleLbl name="lnNode1">
+    <dgm:fillClrLst meth="repeat">
+      <a:schemeClr val="accent1"/>
+    </dgm:fillClrLst>
+    <dgm:linClrLst meth="repeat">
+      <a:schemeClr val="lt1"/>
+    </dgm:linClrLst>
+    <dgm:effectClrLst/>
+    <dgm:txLinClrLst/>
+    <dgm:txFillClrLst/>
+    <dgm:txEffectClrLst/>
+  </dgm:styleLbl>
+  <dgm:styleLbl name="vennNode1">
+    <dgm:fillClrLst meth="repeat">
+      <a:schemeClr val="accent1">
+        <a:alpha val="50000"/>
+      </a:schemeClr>
+    </dgm:fillClrLst>
+    <dgm:linClrLst meth="repeat">
+      <a:schemeClr val="lt1"/>
+    </dgm:linClrLst>
+    <dgm:effectClrLst/>
+    <dgm:txLinClrLst/>
+    <dgm:txFillClrLst/>
+    <dgm:txEffectClrLst/>
+  </dgm:styleLbl>
+  <dgm:styleLbl name="node2">
+    <dgm:fillClrLst meth="repeat">
+      <a:schemeClr val="accent1"/>
+    </dgm:fillClrLst>
+    <dgm:linClrLst meth="repeat">
+      <a:schemeClr val="lt1"/>
+    </dgm:linClrLst>
+    <dgm:effectClrLst/>
+    <dgm:txLinClrLst/>
+    <dgm:txFillClrLst/>
+    <dgm:txEffectClrLst/>
+  </dgm:styleLbl>
+  <dgm:styleLbl name="node3">
+    <dgm:fillClrLst meth="repeat">
+      <a:schemeClr val="accent1"/>
+    </dgm:fillClrLst>
+    <dgm:linClrLst meth="repeat">
+      <a:schemeClr val="lt1"/>
+    </dgm:linClrLst>
+    <dgm:effectClrLst/>
+    <dgm:txLinClrLst/>
+    <dgm:txFillClrLst/>
+    <dgm:txEffectClrLst/>
+  </dgm:styleLbl>
+  <dgm:styleLbl name="node4">
+    <dgm:fillClrLst meth="repeat">
+      <a:schemeClr val="accent1"/>
+    </dgm:fillClrLst>
+    <dgm:linClrLst meth="repeat">
+      <a:schemeClr val="lt1"/>
+    </dgm:linClrLst>
+    <dgm:effectClrLst/>
+    <dgm:txLinClrLst/>
+    <dgm:txFillClrLst/>
+    <dgm:txEffectClrLst/>
+  </dgm:styleLbl>
+  <dgm:styleLbl name="fgImgPlace1">
+    <dgm:fillClrLst meth="repeat">
+      <a:schemeClr val="accent1">
+        <a:tint val="50000"/>
+      </a:schemeClr>
+    </dgm:fillClrLst>
+    <dgm:linClrLst meth="repeat">
+      <a:schemeClr val="lt1"/>
+    </dgm:linClrLst>
+    <dgm:effectClrLst/>
+    <dgm:txLinClrLst/>
+    <dgm:txFillClrLst meth="repeat">
+      <a:schemeClr val="lt1"/>
+    </dgm:txFillClrLst>
+    <dgm:txEffectClrLst/>
+  </dgm:styleLbl>
+  <dgm:styleLbl name="alignImgPlace1">
+    <dgm:fillClrLst meth="repeat">
+      <a:schemeClr val="accent1">
+        <a:tint val="50000"/>
+      </a:schemeClr>
+    </dgm:fillClrLst>
+    <dgm:linClrLst meth="repeat">
+      <a:schemeClr val="lt1"/>
+    </dgm:linClrLst>
+    <dgm:effectClrLst/>
+    <dgm:txLinClrLst/>
+    <dgm:txFillClrLst meth="repeat">
+      <a:schemeClr val="lt1"/>
+    </dgm:txFillClrLst>
+    <dgm:txEffectClrLst/>
+  </dgm:styleLbl>
+  <dgm:styleLbl name="bgImgPlace1">
+    <dgm:fillClrLst meth="repeat">
+      <a:schemeClr val="accent1">
+        <a:tint val="50000"/>
+      </a:schemeClr>
+    </dgm:fillClrLst>
+    <dgm:linClrLst meth="repeat">
+      <a:schemeClr val="lt1"/>
+    </dgm:linClrLst>
+    <dgm:effectClrLst/>
+    <dgm:txLinClrLst/>
+    <dgm:txFillClrLst meth="repeat">
+      <a:schemeClr val="lt1"/>
+    </dgm:txFillClrLst>
+    <dgm:txEffectClrLst/>
+  </dgm:styleLbl>
+  <dgm:styleLbl name="sibTrans2D1">
+    <dgm:fillClrLst meth="repeat">
+      <a:schemeClr val="accent1">
+        <a:tint val="60000"/>
+      </a:schemeClr>
+    </dgm:fillClrLst>
+    <dgm:linClrLst meth="repeat">
+      <a:schemeClr val="accent1">
+        <a:tint val="60000"/>
+      </a:schemeClr>
+    </dgm:linClrLst>
+    <dgm:effectClrLst/>
+    <dgm:txLinClrLst/>
+    <dgm:txFillClrLst/>
+    <dgm:txEffectClrLst/>
+  </dgm:styleLbl>
+  <dgm:styleLbl name="fgSibTrans2D1">
+    <dgm:fillClrLst meth="repeat">
+      <a:schemeClr val="accent1">
+        <a:tint val="60000"/>
+      </a:schemeClr>
+    </dgm:fillClrLst>
+    <dgm:linClrLst meth="repeat">
+      <a:schemeClr val="accent1">
+        <a:tint val="60000"/>
+      </a:schemeClr>
+    </dgm:linClrLst>
+    <dgm:effectClrLst/>
+    <dgm:txLinClrLst/>
+    <dgm:txFillClrLst/>
+    <dgm:txEffectClrLst/>
+  </dgm:styleLbl>
+  <dgm:styleLbl name="bgSibTrans2D1">
+    <dgm:fillClrLst meth="repeat">
+      <a:schemeClr val="accent1">
+        <a:tint val="60000"/>
+      </a:schemeClr>
+    </dgm:fillClrLst>
+    <dgm:linClrLst meth="repeat">
+      <a:schemeClr val="accent1">
+        <a:tint val="60000"/>
+      </a:schemeClr>
+    </dgm:linClrLst>
+    <dgm:effectClrLst/>
+    <dgm:txLinClrLst/>
+    <dgm:txFillClrLst/>
+    <dgm:txEffectClrLst/>
+  </dgm:styleLbl>
+  <dgm:styleLbl name="sibTrans1D1">
+    <dgm:fillClrLst meth="repeat">
+      <a:schemeClr val="accent1"/>
+    </dgm:fillClrLst>
+    <dgm:linClrLst meth="repeat">
+      <a:schemeClr val="accent1"/>
+    </dgm:linClrLst>
+    <dgm:effectClrLst/>
+    <dgm:txLinClrLst/>
+    <dgm:txFillClrLst meth="repeat">
+      <a:schemeClr val="tx1"/>
+    </dgm:txFillClrLst>
+    <dgm:txEffectClrLst/>
+  </dgm:styleLbl>
+  <dgm:styleLbl name="callout">
+    <dgm:fillClrLst meth="repeat">
+      <a:schemeClr val="accent1"/>
+    </dgm:fillClrLst>
+    <dgm:linClrLst meth="repeat">
+      <a:schemeClr val="accent1">
+        <a:tint val="50000"/>
+      </a:schemeClr>
+    </dgm:linClrLst>
+    <dgm:effectClrLst/>
+    <dgm:txLinClrLst/>
+    <dgm:txFillClrLst meth="repeat">
+      <a:schemeClr val="tx1"/>
+    </dgm:txFillClrLst>
+    <dgm:txEffectClrLst/>
+  </dgm:styleLbl>
+  <dgm:styleLbl name="asst0">
+    <dgm:fillClrLst meth="repeat">
+      <a:schemeClr val="accent1"/>
+    </dgm:fillClrLst>
+    <dgm:linClrLst meth="repeat">
+      <a:schemeClr val="lt1"/>
+    </dgm:linClrLst>
+    <dgm:effectClrLst/>
+    <dgm:txLinClrLst/>
+    <dgm:txFillClrLst/>
+    <dgm:txEffectClrLst/>
+  </dgm:styleLbl>
+  <dgm:styleLbl name="asst1">
+    <dgm:fillClrLst meth="repeat">
+      <a:schemeClr val="accent1"/>
+    </dgm:fillClrLst>
+    <dgm:linClrLst meth="repeat">
+      <a:schemeClr val="lt1"/>
+    </dgm:linClrLst>
+    <dgm:effectClrLst/>
+    <dgm:txLinClrLst/>
+    <dgm:txFillClrLst/>
+    <dgm:txEffectClrLst/>
+  </dgm:styleLbl>
+  <dgm:styleLbl name="asst2">
+    <dgm:fillClrLst meth="repeat">
+      <a:schemeClr val="accent1"/>
+    </dgm:fillClrLst>
+    <dgm:linClrLst meth="repeat">
+      <a:schemeClr val="lt1"/>
+    </dgm:linClrLst>
+    <dgm:effectClrLst/>
+    <dgm:txLinClrLst/>
+    <dgm:txFillClrLst/>
+    <dgm:txEffectClrLst/>
+  </dgm:styleLbl>
+  <dgm:styleLbl name="asst3">
+    <dgm:fillClrLst meth="repeat">
+      <a:schemeClr val="accent1"/>
+    </dgm:fillClrLst>
+    <dgm:linClrLst meth="repeat">
+      <a:schemeClr val="lt1"/>
+    </dgm:linClrLst>
+    <dgm:effectClrLst/>
+    <dgm:txLinClrLst/>
+    <dgm:txFillClrLst/>
+    <dgm:txEffectClrLst/>
+  </dgm:styleLbl>
+  <dgm:styleLbl name="asst4">
+    <dgm:fillClrLst meth="repeat">
+      <a:schemeClr val="accent1"/>
+    </dgm:fillClrLst>
+    <dgm:linClrLst meth="repeat">
+      <a:schemeClr val="lt1"/>
+    </dgm:linClrLst>
+    <dgm:effectClrLst/>
+    <dgm:txLinClrLst/>
+    <dgm:txFillClrLst/>
+    <dgm:txEffectClrLst/>
+  </dgm:styleLbl>
+  <dgm:styleLbl name="parChTrans2D1">
+    <dgm:fillClrLst meth="repeat">
+      <a:schemeClr val="accent1">
+        <a:tint val="60000"/>
+      </a:schemeClr>
+    </dgm:fillClrLst>
+    <dgm:linClrLst meth="repeat">
+      <a:schemeClr val="accent1">
+        <a:tint val="60000"/>
+      </a:schemeClr>
+    </dgm:linClrLst>
+    <dgm:effectClrLst/>
+    <dgm:txLinClrLst/>
+    <dgm:txFillClrLst meth="repeat">
+      <a:schemeClr val="lt1"/>
+    </dgm:txFillClrLst>
+    <dgm:txEffectClrLst/>
+  </dgm:styleLbl>
+  <dgm:styleLbl name="parChTrans2D2">
+    <dgm:fillClrLst meth="repeat">
+      <a:schemeClr val="accent1"/>
+    </dgm:fillClrLst>
+    <dgm:linClrLst meth="repeat">
+      <a:schemeClr val="accent1"/>
+    </dgm:linClrLst>
+    <dgm:effectClrLst/>
+    <dgm:txLinClrLst/>
+    <dgm:txFillClrLst meth="repeat">
+      <a:schemeClr val="lt1"/>
+    </dgm:txFillClrLst>
+    <dgm:txEffectClrLst/>
+  </dgm:styleLbl>
+  <dgm:styleLbl name="parChTrans2D3">
+    <dgm:fillClrLst meth="repeat">
+      <a:schemeClr val="accent1"/>
+    </dgm:fillClrLst>
+    <dgm:linClrLst meth="repeat">
+      <a:schemeClr val="accent1"/>
+    </dgm:linClrLst>
+    <dgm:effectClrLst/>
+    <dgm:txLinClrLst/>
+    <dgm:txFillClrLst meth="repeat">
+      <a:schemeClr val="lt1"/>
+    </dgm:txFillClrLst>
+    <dgm:txEffectClrLst/>
+  </dgm:styleLbl>
+  <dgm:styleLbl name="parChTrans2D4">
+    <dgm:fillClrLst meth="repeat">
+      <a:schemeClr val="accent1"/>
+    </dgm:fillClrLst>
+    <dgm:linClrLst meth="repeat">
+      <a:schemeClr val="accent1"/>
+    </dgm:linClrLst>
+    <dgm:effectClrLst/>
+    <dgm:txLinClrLst/>
+    <dgm:txFillClrLst meth="repeat">
+      <a:schemeClr val="lt1"/>
+    </dgm:txFillClrLst>
+    <dgm:txEffectClrLst/>
+  </dgm:styleLbl>
+  <dgm:styleLbl name="parChTrans1D1">
+    <dgm:fillClrLst meth="repeat">
+      <a:schemeClr val="accent1"/>
+    </dgm:fillClrLst>
+    <dgm:linClrLst meth="repeat">
+      <a:schemeClr val="accent1">
+        <a:shade val="60000"/>
+      </a:schemeClr>
+    </dgm:linClrLst>
+    <dgm:effectClrLst/>
+    <dgm:txLinClrLst/>
+    <dgm:txFillClrLst meth="repeat">
+      <a:schemeClr val="tx1"/>
+    </dgm:txFillClrLst>
+    <dgm:txEffectClrLst/>
+  </dgm:styleLbl>
+  <dgm:styleLbl name="parChTrans1D2">
+    <dgm:fillClrLst meth="repeat">
+      <a:schemeClr val="accent1"/>
+    </dgm:fillClrLst>
+    <dgm:linClrLst meth="repeat">
+      <a:schemeClr val="accent1">
+        <a:shade val="60000"/>
+      </a:schemeClr>
+    </dgm:linClrLst>
+    <dgm:effectClrLst/>
+    <dgm:txLinClrLst/>
+    <dgm:txFillClrLst meth="repeat">
+      <a:schemeClr val="tx1"/>
+    </dgm:txFillClrLst>
+    <dgm:txEffectClrLst/>
+  </dgm:styleLbl>
+  <dgm:styleLbl name="parChTrans1D3">
+    <dgm:fillClrLst meth="repeat">
+      <a:schemeClr val="accent1"/>
+    </dgm:fillClrLst>
+    <dgm:linClrLst meth="repeat">
+      <a:schemeClr val="accent1">
+        <a:shade val="80000"/>
+      </a:schemeClr>
+    </dgm:linClrLst>
+    <dgm:effectClrLst/>
+    <dgm:txLinClrLst/>
+    <dgm:txFillClrLst meth="repeat">
+      <a:schemeClr val="tx1"/>
+    </dgm:txFillClrLst>
+    <dgm:txEffectClrLst/>
+  </dgm:styleLbl>
+  <dgm:styleLbl name="parChTrans1D4">
+    <dgm:fillClrLst meth="repeat">
+      <a:schemeClr val="accent1"/>
+    </dgm:fillClrLst>
+    <dgm:linClrLst meth="repeat">
+      <a:schemeClr val="accent1">
+        <a:shade val="80000"/>
+      </a:schemeClr>
+    </dgm:linClrLst>
+    <dgm:effectClrLst/>
+    <dgm:txLinClrLst/>
+    <dgm:txFillClrLst meth="repeat">
+      <a:schemeClr val="tx1"/>
+    </dgm:txFillClrLst>
+    <dgm:txEffectClrLst/>
+  </dgm:styleLbl>
+  <dgm:styleLbl name="fgAcc1">
+    <dgm:fillClrLst meth="repeat">
+      <a:schemeClr val="lt1">
+        <a:alpha val="90000"/>
+      </a:schemeClr>
+    </dgm:fillClrLst>
+    <dgm:linClrLst meth="repeat">
+      <a:schemeClr val="accent1"/>
+    </dgm:linClrLst>
+    <dgm:effectClrLst/>
+    <dgm:txLinClrLst/>
+    <dgm:txFillClrLst meth="repeat">
+      <a:schemeClr val="dk1"/>
+    </dgm:txFillClrLst>
+    <dgm:txEffectClrLst/>
+  </dgm:styleLbl>
+  <dgm:styleLbl name="conFgAcc1">
+    <dgm:fillClrLst meth="repeat">
+      <a:schemeClr val="lt1">
+        <a:alpha val="90000"/>
+      </a:schemeClr>
+    </dgm:fillClrLst>
+    <dgm:linClrLst meth="repeat">
+      <a:schemeClr val="accent1"/>
+    </dgm:linClrLst>
+    <dgm:effectClrLst/>
+    <dgm:txLinClrLst/>
+    <dgm:txFillClrLst meth="repeat">
+      <a:schemeClr val="dk1"/>
+    </dgm:txFillClrLst>
+    <dgm:txEffectClrLst/>
+  </dgm:styleLbl>
+  <dgm:styleLbl name="alignAcc1">
+    <dgm:fillClrLst meth="repeat">
+      <a:schemeClr val="lt1">
+        <a:alpha val="90000"/>
+      </a:schemeClr>
+    </dgm:fillClrLst>
+    <dgm:linClrLst meth="repeat">
+      <a:schemeClr val="accent1"/>
+    </dgm:linClrLst>
+    <dgm:effectClrLst/>
+    <dgm:txLinClrLst/>
+    <dgm:txFillClrLst meth="repeat">
+      <a:schemeClr val="dk1"/>
+    </dgm:txFillClrLst>
+    <dgm:txEffectClrLst/>
+  </dgm:styleLbl>
+  <dgm:styleLbl name="trAlignAcc1">
+    <dgm:fillClrLst meth="repeat">
+      <a:schemeClr val="lt1">
+        <a:alpha val="40000"/>
+      </a:schemeClr>
+    </dgm:fillClrLst>
+    <dgm:linClrLst meth="repeat">
+      <a:schemeClr val="accent1"/>
+    </dgm:linClrLst>
+    <dgm:effectClrLst/>
+    <dgm:txLinClrLst/>
+    <dgm:txFillClrLst meth="repeat">
+      <a:schemeClr val="dk1"/>
+    </dgm:txFillClrLst>
+    <dgm:txEffectClrLst/>
+  </dgm:styleLbl>
+  <dgm:styleLbl name="bgAcc1">
+    <dgm:fillClrLst meth="repeat">
+      <a:schemeClr val="lt1">
+        <a:alpha val="90000"/>
+      </a:schemeClr>
+    </dgm:fillClrLst>
+    <dgm:linClrLst meth="repeat">
+      <a:schemeClr val="accent1"/>
+    </dgm:linClrLst>
+    <dgm:effectClrLst/>
+    <dgm:txLinClrLst/>
+    <dgm:txFillClrLst meth="repeat">
+      <a:schemeClr val="dk1"/>
+    </dgm:txFillClrLst>
+    <dgm:txEffectClrLst/>
+  </dgm:styleLbl>
+  <dgm:styleLbl name="solidFgAcc1">
+    <dgm:fillClrLst meth="repeat">
+      <a:schemeClr val="lt1"/>
+    </dgm:fillClrLst>
+    <dgm:linClrLst meth="repeat">
+      <a:schemeClr val="accent1"/>
+    </dgm:linClrLst>
+    <dgm:effectClrLst/>
+    <dgm:txLinClrLst/>
+    <dgm:txFillClrLst meth="repeat">
+      <a:schemeClr val="dk1"/>
+    </dgm:txFillClrLst>
+    <dgm:txEffectClrLst/>
+  </dgm:styleLbl>
+  <dgm:styleLbl name="solidAlignAcc1">
+    <dgm:fillClrLst meth="repeat">
+      <a:schemeClr val="lt1"/>
+    </dgm:fillClrLst>
+    <dgm:linClrLst meth="repeat">
+      <a:schemeClr val="accent1"/>
+    </dgm:linClrLst>
+    <dgm:effectClrLst/>
+    <dgm:txLinClrLst/>
+    <dgm:txFillClrLst meth="repeat">
+      <a:schemeClr val="dk1"/>
+    </dgm:txFillClrLst>
+    <dgm:txEffectClrLst/>
+  </dgm:styleLbl>
+  <dgm:styleLbl name="solidBgAcc1">
+    <dgm:fillClrLst meth="repeat">
+      <a:schemeClr val="lt1"/>
+    </dgm:fillClrLst>
+    <dgm:linClrLst meth="repeat">
+      <a:schemeClr val="accent1"/>
+    </dgm:linClrLst>
+    <dgm:effectClrLst/>
+    <dgm:txLinClrLst/>
+    <dgm:txFillClrLst meth="repeat">
+      <a:schemeClr val="dk1"/>
+    </dgm:txFillClrLst>
+    <dgm:txEffectClrLst/>
+  </dgm:styleLbl>
+  <dgm:styleLbl name="fgAccFollowNode1">
+    <dgm:fillClrLst meth="repeat">
+      <a:schemeClr val="accent1">
+        <a:alpha val="90000"/>
+        <a:tint val="40000"/>
+      </a:schemeClr>
+    </dgm:fillClrLst>
+    <dgm:linClrLst meth="repeat">
+      <a:schemeClr val="accent1">
+        <a:alpha val="90000"/>
+        <a:tint val="40000"/>
+      </a:schemeClr>
+    </dgm:linClrLst>
+    <dgm:effectClrLst/>
+    <dgm:txLinClrLst/>
+    <dgm:txFillClrLst meth="repeat">
+      <a:schemeClr val="dk1"/>
+    </dgm:txFillClrLst>
+    <dgm:txEffectClrLst/>
+  </dgm:styleLbl>
+  <dgm:styleLbl name="alignAccFollowNode1">
+    <dgm:fillClrLst meth="repeat">
+      <a:schemeClr val="accent1">
+        <a:alpha val="90000"/>
+        <a:tint val="40000"/>
+      </a:schemeClr>
+    </dgm:fillClrLst>
+    <dgm:linClrLst meth="repeat">
+      <a:schemeClr val="accent1">
+        <a:alpha val="90000"/>
+        <a:tint val="40000"/>
+      </a:schemeClr>
+    </dgm:linClrLst>
+    <dgm:effectClrLst/>
+    <dgm:txLinClrLst/>
+    <dgm:txFillClrLst meth="repeat">
+      <a:schemeClr val="dk1"/>
+    </dgm:txFillClrLst>
+    <dgm:txEffectClrLst/>
+  </dgm:styleLbl>
+  <dgm:styleLbl name="bgAccFollowNode1">
+    <dgm:fillClrLst meth="repeat">
+      <a:schemeClr val="accent1">
+        <a:alpha val="90000"/>
+        <a:tint val="40000"/>
+      </a:schemeClr>
+    </dgm:fillClrLst>
+    <dgm:linClrLst meth="repeat">
+      <a:schemeClr val="accent1">
+        <a:alpha val="90000"/>
+        <a:tint val="40000"/>
+      </a:schemeClr>
+    </dgm:linClrLst>
+    <dgm:effectClrLst/>
+    <dgm:txLinClrLst/>
+    <dgm:txFillClrLst meth="repeat">
+      <a:schemeClr val="dk1"/>
+    </dgm:txFillClrLst>
+    <dgm:txEffectClrLst/>
+  </dgm:styleLbl>
+  <dgm:styleLbl name="fgAcc0">
+    <dgm:fillClrLst meth="repeat">
+      <a:schemeClr val="lt1">
+        <a:alpha val="90000"/>
+      </a:schemeClr>
+    </dgm:fillClrLst>
+    <dgm:linClrLst meth="repeat">
+      <a:schemeClr val="accent1"/>
+    </dgm:linClrLst>
+    <dgm:effectClrLst/>
+    <dgm:txLinClrLst/>
+    <dgm:txFillClrLst meth="repeat">
+      <a:schemeClr val="dk1"/>
+    </dgm:txFillClrLst>
+    <dgm:txEffectClrLst/>
+  </dgm:styleLbl>
+  <dgm:styleLbl name="fgAcc2">
+    <dgm:fillClrLst meth="repeat">
+      <a:schemeClr val="lt1">
+        <a:alpha val="90000"/>
+      </a:schemeClr>
+    </dgm:fillClrLst>
+    <dgm:linClrLst meth="repeat">
+      <a:schemeClr val="accent1"/>
+    </dgm:linClrLst>
+    <dgm:effectClrLst/>
+    <dgm:txLinClrLst/>
+    <dgm:txFillClrLst meth="repeat">
+      <a:schemeClr val="dk1"/>
+    </dgm:txFillClrLst>
+    <dgm:txEffectClrLst/>
+  </dgm:styleLbl>
+  <dgm:styleLbl name="fgAcc3">
+    <dgm:fillClrLst meth="repeat">
+      <a:schemeClr val="lt1">
+        <a:alpha val="90000"/>
+      </a:schemeClr>
+    </dgm:fillClrLst>
+    <dgm:linClrLst meth="repeat">
+      <a:schemeClr val="accent1"/>
+    </dgm:linClrLst>
+    <dgm:effectClrLst/>
+    <dgm:txLinClrLst/>
+    <dgm:txFillClrLst meth="repeat">
+      <a:schemeClr val="dk1"/>
+    </dgm:txFillClrLst>
+    <dgm:txEffectClrLst/>
+  </dgm:styleLbl>
+  <dgm:styleLbl name="fgAcc4">
+    <dgm:fillClrLst meth="repeat">
+      <a:schemeClr val="lt1">
+        <a:alpha val="90000"/>
+      </a:schemeClr>
+    </dgm:fillClrLst>
+    <dgm:linClrLst meth="repeat">
+      <a:schemeClr val="accent1"/>
+    </dgm:linClrLst>
+    <dgm:effectClrLst/>
+    <dgm:txLinClrLst/>
+    <dgm:txFillClrLst meth="repeat">
+      <a:schemeClr val="dk1"/>
+    </dgm:txFillClrLst>
+    <dgm:txEffectClrLst/>
+  </dgm:styleLbl>
+  <dgm:styleLbl name="bgShp">
+    <dgm:fillClrLst meth="repeat">
+      <a:schemeClr val="accent1">
+        <a:tint val="40000"/>
+      </a:schemeClr>
+    </dgm:fillClrLst>
+    <dgm:linClrLst meth="repeat">
+      <a:schemeClr val="accent1"/>
+    </dgm:linClrLst>
+    <dgm:effectClrLst/>
+    <dgm:txLinClrLst/>
+    <dgm:txFillClrLst meth="repeat">
+      <a:schemeClr val="dk1"/>
+    </dgm:txFillClrLst>
+    <dgm:txEffectClrLst/>
+  </dgm:styleLbl>
+  <dgm:styleLbl name="dkBgShp">
+    <dgm:fillClrLst meth="repeat">
+      <a:schemeClr val="accent1">
+        <a:shade val="80000"/>
+      </a:schemeClr>
+    </dgm:fillClrLst>
+    <dgm:linClrLst meth="repeat">
+      <a:schemeClr val="accent1"/>
+    </dgm:linClrLst>
+    <dgm:effectClrLst/>
+    <dgm:txLinClrLst/>
+    <dgm:txFillClrLst meth="repeat">
+      <a:schemeClr val="lt1"/>
+    </dgm:txFillClrLst>
+    <dgm:txEffectClrLst/>
+  </dgm:styleLbl>
+  <dgm:styleLbl name="trBgShp">
+    <dgm:fillClrLst meth="repeat">
+      <a:schemeClr val="accent1">
+        <a:tint val="50000"/>
+        <a:alpha val="40000"/>
+      </a:schemeClr>
+    </dgm:fillClrLst>
+    <dgm:linClrLst meth="repeat">
+      <a:schemeClr val="accent1"/>
+    </dgm:linClrLst>
+    <dgm:effectClrLst/>
+    <dgm:txLinClrLst/>
+    <dgm:txFillClrLst meth="repeat">
+      <a:schemeClr val="lt1"/>
+    </dgm:txFillClrLst>
+    <dgm:txEffectClrLst/>
+  </dgm:styleLbl>
+  <dgm:styleLbl name="fgShp">
+    <dgm:fillClrLst meth="repeat">
+      <a:schemeClr val="accent1">
+        <a:tint val="60000"/>
+      </a:schemeClr>
+    </dgm:fillClrLst>
+    <dgm:linClrLst meth="repeat">
+      <a:schemeClr val="lt1"/>
+    </dgm:linClrLst>
+    <dgm:effectClrLst/>
+    <dgm:txLinClrLst/>
+    <dgm:txFillClrLst meth="repeat">
+      <a:schemeClr val="dk1"/>
+    </dgm:txFillClrLst>
+    <dgm:txEffectClrLst/>
+  </dgm:styleLbl>
+  <dgm:styleLbl name="revTx">
+    <dgm:fillClrLst meth="repeat">
+      <a:schemeClr val="lt1">
+        <a:alpha val="0"/>
+      </a:schemeClr>
+    </dgm:fillClrLst>
+    <dgm:linClrLst meth="repeat">
+      <a:schemeClr val="dk1">
+        <a:alpha val="0"/>
+      </a:schemeClr>
+    </dgm:linClrLst>
+    <dgm:effectClrLst/>
+    <dgm:txLinClrLst/>
+    <dgm:txFillClrLst meth="repeat">
+      <a:schemeClr val="tx1"/>
+    </dgm:txFillClrLst>
+    <dgm:txEffectClrLst/>
+  </dgm:styleLbl>
+</dgm:colorsDef>
+</file>
+
+<file path=ppt/diagrams/data1.xml><?xml version="1.0" encoding="utf-8"?>
+<dgm:dataModel xmlns:dgm="http://schemas.openxmlformats.org/drawingml/2006/diagram" xmlns:a="http://schemas.openxmlformats.org/drawingml/2006/main">
+  <dgm:ptLst>
+    <dgm:pt modelId="{C242D152-3DF2-D548-8EEE-B9B22E4F93CD}" type="doc">
+      <dgm:prSet loTypeId="urn:microsoft.com/office/officeart/2005/8/layout/hList1" loCatId="" qsTypeId="urn:microsoft.com/office/officeart/2005/8/quickstyle/simple1" qsCatId="simple" csTypeId="urn:microsoft.com/office/officeart/2005/8/colors/accent1_2" csCatId="accent1" phldr="1"/>
+      <dgm:spPr/>
+      <dgm:t>
+        <a:bodyPr/>
+        <a:lstStyle/>
+        <a:p>
+          <a:endParaRPr lang="en-US"/>
+        </a:p>
+      </dgm:t>
+    </dgm:pt>
+    <dgm:pt modelId="{A9C8E855-F256-9D48-8F59-24DDA61C5A85}">
+      <dgm:prSet phldrT="[Text]"/>
+      <dgm:spPr/>
+      <dgm:t>
+        <a:bodyPr/>
+        <a:lstStyle/>
+        <a:p>
+          <a:r>
+            <a:rPr lang="en-US" dirty="0" err="1"/>
+            <a:t>Pseudocódigo</a:t>
+          </a:r>
+          <a:endParaRPr lang="en-US" dirty="0"/>
+        </a:p>
+      </dgm:t>
+    </dgm:pt>
+    <dgm:pt modelId="{B82ECAF6-1097-DB43-83B0-57E475040981}" type="parTrans" cxnId="{1534B231-316B-024F-A5DB-27C4330F1DBC}">
+      <dgm:prSet/>
+      <dgm:spPr/>
+      <dgm:t>
+        <a:bodyPr/>
+        <a:lstStyle/>
+        <a:p>
+          <a:endParaRPr lang="en-US"/>
+        </a:p>
+      </dgm:t>
+    </dgm:pt>
+    <dgm:pt modelId="{873101A3-3B71-9B44-A576-753EE2F53106}" type="sibTrans" cxnId="{1534B231-316B-024F-A5DB-27C4330F1DBC}">
+      <dgm:prSet/>
+      <dgm:spPr/>
+      <dgm:t>
+        <a:bodyPr/>
+        <a:lstStyle/>
+        <a:p>
+          <a:endParaRPr lang="en-US"/>
+        </a:p>
+      </dgm:t>
+    </dgm:pt>
+    <dgm:pt modelId="{9562C37C-B3C8-3244-A2FA-81E29B5C090A}">
+      <dgm:prSet phldrT="[Text]"/>
+      <dgm:spPr/>
+      <dgm:t>
+        <a:bodyPr/>
+        <a:lstStyle/>
+        <a:p>
+          <a:r>
+            <a:rPr lang="en-US" dirty="0" err="1"/>
+            <a:t>Funciones</a:t>
+          </a:r>
+          <a:endParaRPr lang="en-US" dirty="0"/>
+        </a:p>
+      </dgm:t>
+    </dgm:pt>
+    <dgm:pt modelId="{F9AC1F39-3B4B-4C48-B780-9449C533BB4F}" type="parTrans" cxnId="{DA0EDD6F-DF82-3A44-813C-49B1962A1108}">
+      <dgm:prSet/>
+      <dgm:spPr/>
+      <dgm:t>
+        <a:bodyPr/>
+        <a:lstStyle/>
+        <a:p>
+          <a:endParaRPr lang="en-US"/>
+        </a:p>
+      </dgm:t>
+    </dgm:pt>
+    <dgm:pt modelId="{A214A30E-6132-2E40-8780-164889E58137}" type="sibTrans" cxnId="{DA0EDD6F-DF82-3A44-813C-49B1962A1108}">
+      <dgm:prSet/>
+      <dgm:spPr/>
+      <dgm:t>
+        <a:bodyPr/>
+        <a:lstStyle/>
+        <a:p>
+          <a:endParaRPr lang="en-US"/>
+        </a:p>
+      </dgm:t>
+    </dgm:pt>
+    <dgm:pt modelId="{67394E67-0841-7341-B886-26A149EACC10}">
+      <dgm:prSet phldrT="[Text]"/>
+      <dgm:spPr/>
+      <dgm:t>
+        <a:bodyPr/>
+        <a:lstStyle/>
+        <a:p>
+          <a:r>
+            <a:rPr lang="en-US" dirty="0"/>
+            <a:t>Java Procedural</a:t>
+          </a:r>
+        </a:p>
+      </dgm:t>
+    </dgm:pt>
+    <dgm:pt modelId="{77473F5D-1F13-4243-87DF-33ED578CA243}" type="parTrans" cxnId="{3DC63B3F-CF9D-FF40-82F7-F12C3351A4E7}">
+      <dgm:prSet/>
+      <dgm:spPr/>
+      <dgm:t>
+        <a:bodyPr/>
+        <a:lstStyle/>
+        <a:p>
+          <a:endParaRPr lang="en-US"/>
+        </a:p>
+      </dgm:t>
+    </dgm:pt>
+    <dgm:pt modelId="{9C9EAA60-E33F-9246-8D5E-4F7B9EF5166C}" type="sibTrans" cxnId="{3DC63B3F-CF9D-FF40-82F7-F12C3351A4E7}">
+      <dgm:prSet/>
+      <dgm:spPr/>
+      <dgm:t>
+        <a:bodyPr/>
+        <a:lstStyle/>
+        <a:p>
+          <a:endParaRPr lang="en-US"/>
+        </a:p>
+      </dgm:t>
+    </dgm:pt>
+    <dgm:pt modelId="{D07689CC-1743-1541-A04C-2CB5CE47F8EC}">
+      <dgm:prSet phldrT="[Text]"/>
+      <dgm:spPr/>
+      <dgm:t>
+        <a:bodyPr/>
+        <a:lstStyle/>
+        <a:p>
+          <a:r>
+            <a:rPr lang="en-US" dirty="0" err="1"/>
+            <a:t>Tipos</a:t>
+          </a:r>
+          <a:r>
+            <a:rPr lang="en-US" dirty="0"/>
+            <a:t> de Dato</a:t>
+          </a:r>
+        </a:p>
+      </dgm:t>
+    </dgm:pt>
+    <dgm:pt modelId="{EC2380BB-6178-E947-BA9F-C37B914D957D}" type="parTrans" cxnId="{C00C9AF7-3513-0740-BAE1-97035840FA98}">
+      <dgm:prSet/>
+      <dgm:spPr/>
+      <dgm:t>
+        <a:bodyPr/>
+        <a:lstStyle/>
+        <a:p>
+          <a:endParaRPr lang="en-US"/>
+        </a:p>
+      </dgm:t>
+    </dgm:pt>
+    <dgm:pt modelId="{57A6CFF8-3811-DC44-AB07-B15F2FF8D893}" type="sibTrans" cxnId="{C00C9AF7-3513-0740-BAE1-97035840FA98}">
+      <dgm:prSet/>
+      <dgm:spPr/>
+      <dgm:t>
+        <a:bodyPr/>
+        <a:lstStyle/>
+        <a:p>
+          <a:endParaRPr lang="en-US"/>
+        </a:p>
+      </dgm:t>
+    </dgm:pt>
+    <dgm:pt modelId="{570167F9-68B4-A04B-9093-D9FD93152405}">
+      <dgm:prSet phldrT="[Text]"/>
+      <dgm:spPr/>
+      <dgm:t>
+        <a:bodyPr/>
+        <a:lstStyle/>
+        <a:p>
+          <a:r>
+            <a:rPr lang="en-US" dirty="0" err="1"/>
+            <a:t>Ciclos</a:t>
+          </a:r>
+          <a:endParaRPr lang="en-US" dirty="0"/>
+        </a:p>
+      </dgm:t>
+    </dgm:pt>
+    <dgm:pt modelId="{8ABAEE1E-1A25-AB48-99A2-4E45AF908852}" type="parTrans" cxnId="{3285675A-1C1F-B446-9E8D-1D612EA5DD73}">
+      <dgm:prSet/>
+      <dgm:spPr/>
+      <dgm:t>
+        <a:bodyPr/>
+        <a:lstStyle/>
+        <a:p>
+          <a:endParaRPr lang="en-US"/>
+        </a:p>
+      </dgm:t>
+    </dgm:pt>
+    <dgm:pt modelId="{7EF1D1F3-99CD-CC42-961F-55738814F5B1}" type="sibTrans" cxnId="{3285675A-1C1F-B446-9E8D-1D612EA5DD73}">
+      <dgm:prSet/>
+      <dgm:spPr/>
+      <dgm:t>
+        <a:bodyPr/>
+        <a:lstStyle/>
+        <a:p>
+          <a:endParaRPr lang="en-US"/>
+        </a:p>
+      </dgm:t>
+    </dgm:pt>
+    <dgm:pt modelId="{398B1AD5-6584-1844-94D0-CF6E8AD78CFC}">
+      <dgm:prSet phldrT="[Text]"/>
+      <dgm:spPr/>
+      <dgm:t>
+        <a:bodyPr/>
+        <a:lstStyle/>
+        <a:p>
+          <a:r>
+            <a:rPr lang="en-US" dirty="0" err="1"/>
+            <a:t>Ciclos</a:t>
+          </a:r>
+          <a:endParaRPr lang="en-US" dirty="0"/>
+        </a:p>
+      </dgm:t>
+    </dgm:pt>
+    <dgm:pt modelId="{168219BE-8F03-DA42-9281-355BFB42F907}" type="parTrans" cxnId="{D901ECFA-8AF7-DF41-B376-BD2C753E7CF9}">
+      <dgm:prSet/>
+      <dgm:spPr/>
+      <dgm:t>
+        <a:bodyPr/>
+        <a:lstStyle/>
+        <a:p>
+          <a:endParaRPr lang="en-US"/>
+        </a:p>
+      </dgm:t>
+    </dgm:pt>
+    <dgm:pt modelId="{D889DE9E-4E7A-C14F-9E7E-A41B4628714B}" type="sibTrans" cxnId="{D901ECFA-8AF7-DF41-B376-BD2C753E7CF9}">
+      <dgm:prSet/>
+      <dgm:spPr/>
+      <dgm:t>
+        <a:bodyPr/>
+        <a:lstStyle/>
+        <a:p>
+          <a:endParaRPr lang="en-US"/>
+        </a:p>
+      </dgm:t>
+    </dgm:pt>
+    <dgm:pt modelId="{8BC04D1C-9843-354E-931B-EAC319E0B08A}">
+      <dgm:prSet phldrT="[Text]"/>
+      <dgm:spPr/>
+      <dgm:t>
+        <a:bodyPr/>
+        <a:lstStyle/>
+        <a:p>
+          <a:r>
+            <a:rPr lang="en-US" dirty="0" err="1"/>
+            <a:t>Condicionales</a:t>
+          </a:r>
+          <a:endParaRPr lang="en-US" dirty="0"/>
+        </a:p>
+      </dgm:t>
+    </dgm:pt>
+    <dgm:pt modelId="{2F0954B5-B9C7-3843-AB12-7A3BB8FFA691}" type="parTrans" cxnId="{0E5E5004-F8A3-AE4B-8634-15AB4019AC6D}">
+      <dgm:prSet/>
+      <dgm:spPr/>
+      <dgm:t>
+        <a:bodyPr/>
+        <a:lstStyle/>
+        <a:p>
+          <a:endParaRPr lang="en-US"/>
+        </a:p>
+      </dgm:t>
+    </dgm:pt>
+    <dgm:pt modelId="{5E99BA4F-0614-6241-8FAD-6C191B690D97}" type="sibTrans" cxnId="{0E5E5004-F8A3-AE4B-8634-15AB4019AC6D}">
+      <dgm:prSet/>
+      <dgm:spPr/>
+      <dgm:t>
+        <a:bodyPr/>
+        <a:lstStyle/>
+        <a:p>
+          <a:endParaRPr lang="en-US"/>
+        </a:p>
+      </dgm:t>
+    </dgm:pt>
+    <dgm:pt modelId="{729C452B-F169-634F-8784-F944A50C23EE}">
+      <dgm:prSet phldrT="[Text]"/>
+      <dgm:spPr/>
+      <dgm:t>
+        <a:bodyPr/>
+        <a:lstStyle/>
+        <a:p>
+          <a:r>
+            <a:rPr lang="en-US" dirty="0" err="1"/>
+            <a:t>Funciones</a:t>
+          </a:r>
+          <a:r>
+            <a:rPr lang="en-US" dirty="0"/>
+            <a:t> c/</a:t>
+          </a:r>
+          <a:r>
+            <a:rPr lang="en-US" dirty="0" err="1"/>
+            <a:t>datos</a:t>
+          </a:r>
+          <a:endParaRPr lang="en-US" dirty="0"/>
+        </a:p>
+      </dgm:t>
+    </dgm:pt>
+    <dgm:pt modelId="{F7FF85D0-C7AD-ED4D-8033-572EF2F26E94}" type="parTrans" cxnId="{C50477B3-1DB8-4646-A0C9-BA5C6F63AA55}">
+      <dgm:prSet/>
+      <dgm:spPr/>
+      <dgm:t>
+        <a:bodyPr/>
+        <a:lstStyle/>
+        <a:p>
+          <a:endParaRPr lang="en-US"/>
+        </a:p>
+      </dgm:t>
+    </dgm:pt>
+    <dgm:pt modelId="{EA3BDF38-83F2-1B48-AC39-176E484E01BA}" type="sibTrans" cxnId="{C50477B3-1DB8-4646-A0C9-BA5C6F63AA55}">
+      <dgm:prSet/>
+      <dgm:spPr/>
+      <dgm:t>
+        <a:bodyPr/>
+        <a:lstStyle/>
+        <a:p>
+          <a:endParaRPr lang="en-US"/>
+        </a:p>
+      </dgm:t>
+    </dgm:pt>
+    <dgm:pt modelId="{DF0C1B17-F3B4-9B45-A4C3-2A2E89BEDDF9}">
+      <dgm:prSet phldrT="[Text]"/>
+      <dgm:spPr/>
+      <dgm:t>
+        <a:bodyPr/>
+        <a:lstStyle/>
+        <a:p>
+          <a:r>
+            <a:rPr lang="en-US" dirty="0" err="1"/>
+            <a:t>Operadores</a:t>
+          </a:r>
+          <a:endParaRPr lang="en-US" dirty="0"/>
+        </a:p>
+      </dgm:t>
+    </dgm:pt>
+    <dgm:pt modelId="{01A9E29C-D8C9-6940-B92D-61C7BA0E007D}" type="parTrans" cxnId="{9FC42929-48F9-144A-A1A3-0628DAF1AB37}">
+      <dgm:prSet/>
+      <dgm:spPr/>
+      <dgm:t>
+        <a:bodyPr/>
+        <a:lstStyle/>
+        <a:p>
+          <a:endParaRPr lang="en-US"/>
+        </a:p>
+      </dgm:t>
+    </dgm:pt>
+    <dgm:pt modelId="{CCF29D57-D08E-4C4C-9A9F-042E60451A45}" type="sibTrans" cxnId="{9FC42929-48F9-144A-A1A3-0628DAF1AB37}">
+      <dgm:prSet/>
+      <dgm:spPr/>
+      <dgm:t>
+        <a:bodyPr/>
+        <a:lstStyle/>
+        <a:p>
+          <a:endParaRPr lang="en-US"/>
+        </a:p>
+      </dgm:t>
+    </dgm:pt>
+    <dgm:pt modelId="{96856544-1C25-AE47-9D00-723F355C82CC}">
+      <dgm:prSet phldrT="[Text]"/>
+      <dgm:spPr/>
+      <dgm:t>
+        <a:bodyPr/>
+        <a:lstStyle/>
+        <a:p>
+          <a:r>
+            <a:rPr lang="en-US" dirty="0" err="1"/>
+            <a:t>Condicionales</a:t>
+          </a:r>
+          <a:endParaRPr lang="en-US" dirty="0"/>
+        </a:p>
+      </dgm:t>
+    </dgm:pt>
+    <dgm:pt modelId="{A9CCC29F-4E84-7542-942F-32E4498CEF55}" type="parTrans" cxnId="{E3614CD7-5286-AD43-8A48-03B4A48BCA80}">
+      <dgm:prSet/>
+      <dgm:spPr/>
+      <dgm:t>
+        <a:bodyPr/>
+        <a:lstStyle/>
+        <a:p>
+          <a:endParaRPr lang="en-US"/>
+        </a:p>
+      </dgm:t>
+    </dgm:pt>
+    <dgm:pt modelId="{8C6D5AB0-6C25-BC4F-AB7E-CA1DC4449D61}" type="sibTrans" cxnId="{E3614CD7-5286-AD43-8A48-03B4A48BCA80}">
+      <dgm:prSet/>
+      <dgm:spPr/>
+      <dgm:t>
+        <a:bodyPr/>
+        <a:lstStyle/>
+        <a:p>
+          <a:endParaRPr lang="en-US"/>
+        </a:p>
+      </dgm:t>
+    </dgm:pt>
+    <dgm:pt modelId="{3CE002B4-67EF-6547-B8AD-5F73A9F94454}">
+      <dgm:prSet phldrT="[Text]"/>
+      <dgm:spPr/>
+      <dgm:t>
+        <a:bodyPr/>
+        <a:lstStyle/>
+        <a:p>
+          <a:r>
+            <a:rPr lang="en-US" dirty="0"/>
+            <a:t>Strings</a:t>
+          </a:r>
+        </a:p>
+      </dgm:t>
+    </dgm:pt>
+    <dgm:pt modelId="{47B0C2F8-538D-3D46-97BE-B354CF00BF21}" type="parTrans" cxnId="{7698349B-BDC8-BF4B-BB86-0AF42C0D67DD}">
+      <dgm:prSet/>
+      <dgm:spPr/>
+      <dgm:t>
+        <a:bodyPr/>
+        <a:lstStyle/>
+        <a:p>
+          <a:endParaRPr lang="en-US"/>
+        </a:p>
+      </dgm:t>
+    </dgm:pt>
+    <dgm:pt modelId="{5DC29AB1-83E3-D247-8F4C-768526ADF297}" type="sibTrans" cxnId="{7698349B-BDC8-BF4B-BB86-0AF42C0D67DD}">
+      <dgm:prSet/>
+      <dgm:spPr/>
+      <dgm:t>
+        <a:bodyPr/>
+        <a:lstStyle/>
+        <a:p>
+          <a:endParaRPr lang="en-US"/>
+        </a:p>
+      </dgm:t>
+    </dgm:pt>
+    <dgm:pt modelId="{9348A8F1-61EC-4147-B590-81707D3F67E7}">
+      <dgm:prSet phldrT="[Text]"/>
+      <dgm:spPr/>
+      <dgm:t>
+        <a:bodyPr/>
+        <a:lstStyle/>
+        <a:p>
+          <a:r>
+            <a:rPr lang="en-US" dirty="0" err="1"/>
+            <a:t>Arreglos</a:t>
+          </a:r>
+          <a:endParaRPr lang="en-US" dirty="0"/>
+        </a:p>
+      </dgm:t>
+    </dgm:pt>
+    <dgm:pt modelId="{C0F85FA6-BCCA-E540-8456-AB1D132515EE}" type="parTrans" cxnId="{BA3AB0FC-884C-994C-99FF-183056245A62}">
+      <dgm:prSet/>
+      <dgm:spPr/>
+      <dgm:t>
+        <a:bodyPr/>
+        <a:lstStyle/>
+        <a:p>
+          <a:endParaRPr lang="en-US"/>
+        </a:p>
+      </dgm:t>
+    </dgm:pt>
+    <dgm:pt modelId="{00C52843-CC28-BD42-8920-C0BBEB9B4250}" type="sibTrans" cxnId="{BA3AB0FC-884C-994C-99FF-183056245A62}">
+      <dgm:prSet/>
+      <dgm:spPr/>
+      <dgm:t>
+        <a:bodyPr/>
+        <a:lstStyle/>
+        <a:p>
+          <a:endParaRPr lang="en-US"/>
+        </a:p>
+      </dgm:t>
+    </dgm:pt>
+    <dgm:pt modelId="{C3D4B62D-5BD7-D04D-9D48-6CEB7FAB367B}">
+      <dgm:prSet phldrT="[Text]"/>
+      <dgm:spPr/>
+      <dgm:t>
+        <a:bodyPr/>
+        <a:lstStyle/>
+        <a:p>
+          <a:r>
+            <a:rPr lang="en-US" dirty="0" err="1"/>
+            <a:t>Excepciones</a:t>
+          </a:r>
+          <a:endParaRPr lang="en-US" dirty="0"/>
+        </a:p>
+      </dgm:t>
+    </dgm:pt>
+    <dgm:pt modelId="{3A5BDC1C-0296-DC4C-A595-457AB9D00816}" type="parTrans" cxnId="{18E69D39-DCDB-9E4C-BC8F-0837D4FC6376}">
+      <dgm:prSet/>
+      <dgm:spPr/>
+      <dgm:t>
+        <a:bodyPr/>
+        <a:lstStyle/>
+        <a:p>
+          <a:endParaRPr lang="en-US"/>
+        </a:p>
+      </dgm:t>
+    </dgm:pt>
+    <dgm:pt modelId="{B6E986C3-1CB0-EC4F-AD95-FB21B2E5020D}" type="sibTrans" cxnId="{18E69D39-DCDB-9E4C-BC8F-0837D4FC6376}">
+      <dgm:prSet/>
+      <dgm:spPr/>
+      <dgm:t>
+        <a:bodyPr/>
+        <a:lstStyle/>
+        <a:p>
+          <a:endParaRPr lang="en-US"/>
+        </a:p>
+      </dgm:t>
+    </dgm:pt>
+    <dgm:pt modelId="{4D73DA62-3350-F04F-B1D1-6128F97CC6E1}" type="pres">
+      <dgm:prSet presAssocID="{C242D152-3DF2-D548-8EEE-B9B22E4F93CD}" presName="Name0" presStyleCnt="0">
+        <dgm:presLayoutVars>
+          <dgm:dir/>
+          <dgm:animLvl val="lvl"/>
+          <dgm:resizeHandles val="exact"/>
+        </dgm:presLayoutVars>
+      </dgm:prSet>
+      <dgm:spPr/>
+    </dgm:pt>
+    <dgm:pt modelId="{997C31CC-0948-2140-BC7F-EA7040EA9DA6}" type="pres">
+      <dgm:prSet presAssocID="{A9C8E855-F256-9D48-8F59-24DDA61C5A85}" presName="composite" presStyleCnt="0"/>
+      <dgm:spPr/>
+    </dgm:pt>
+    <dgm:pt modelId="{190D1B6B-7148-F34B-A09B-2EF58520B67E}" type="pres">
+      <dgm:prSet presAssocID="{A9C8E855-F256-9D48-8F59-24DDA61C5A85}" presName="parTx" presStyleLbl="alignNode1" presStyleIdx="0" presStyleCnt="2">
+        <dgm:presLayoutVars>
+          <dgm:chMax val="0"/>
+          <dgm:chPref val="0"/>
+          <dgm:bulletEnabled val="1"/>
+        </dgm:presLayoutVars>
+      </dgm:prSet>
+      <dgm:spPr/>
+    </dgm:pt>
+    <dgm:pt modelId="{83B3767F-354D-D14C-8BB5-A558EF9415F3}" type="pres">
+      <dgm:prSet presAssocID="{A9C8E855-F256-9D48-8F59-24DDA61C5A85}" presName="desTx" presStyleLbl="alignAccFollowNode1" presStyleIdx="0" presStyleCnt="2">
+        <dgm:presLayoutVars>
+          <dgm:bulletEnabled val="1"/>
+        </dgm:presLayoutVars>
+      </dgm:prSet>
+      <dgm:spPr/>
+    </dgm:pt>
+    <dgm:pt modelId="{42DC92E3-8D7F-7946-BBD9-25ECDEC684E3}" type="pres">
+      <dgm:prSet presAssocID="{873101A3-3B71-9B44-A576-753EE2F53106}" presName="space" presStyleCnt="0"/>
+      <dgm:spPr/>
+    </dgm:pt>
+    <dgm:pt modelId="{DDFC3070-FC24-2C4F-B377-160874EEB45B}" type="pres">
+      <dgm:prSet presAssocID="{67394E67-0841-7341-B886-26A149EACC10}" presName="composite" presStyleCnt="0"/>
+      <dgm:spPr/>
+    </dgm:pt>
+    <dgm:pt modelId="{4E552492-634D-2449-9BEC-2CD838DA0C80}" type="pres">
+      <dgm:prSet presAssocID="{67394E67-0841-7341-B886-26A149EACC10}" presName="parTx" presStyleLbl="alignNode1" presStyleIdx="1" presStyleCnt="2">
+        <dgm:presLayoutVars>
+          <dgm:chMax val="0"/>
+          <dgm:chPref val="0"/>
+          <dgm:bulletEnabled val="1"/>
+        </dgm:presLayoutVars>
+      </dgm:prSet>
+      <dgm:spPr/>
+    </dgm:pt>
+    <dgm:pt modelId="{60DD2336-8F5F-4C42-8949-8E520204A833}" type="pres">
+      <dgm:prSet presAssocID="{67394E67-0841-7341-B886-26A149EACC10}" presName="desTx" presStyleLbl="alignAccFollowNode1" presStyleIdx="1" presStyleCnt="2">
+        <dgm:presLayoutVars>
+          <dgm:bulletEnabled val="1"/>
+        </dgm:presLayoutVars>
+      </dgm:prSet>
+      <dgm:spPr/>
+    </dgm:pt>
+  </dgm:ptLst>
+  <dgm:cxnLst>
+    <dgm:cxn modelId="{0E5E5004-F8A3-AE4B-8634-15AB4019AC6D}" srcId="{A9C8E855-F256-9D48-8F59-24DDA61C5A85}" destId="{8BC04D1C-9843-354E-931B-EAC319E0B08A}" srcOrd="2" destOrd="0" parTransId="{2F0954B5-B9C7-3843-AB12-7A3BB8FFA691}" sibTransId="{5E99BA4F-0614-6241-8FAD-6C191B690D97}"/>
+    <dgm:cxn modelId="{978FF305-67A8-A943-A0C4-3957E23203AF}" type="presOf" srcId="{DF0C1B17-F3B4-9B45-A4C3-2A2E89BEDDF9}" destId="{60DD2336-8F5F-4C42-8949-8E520204A833}" srcOrd="0" destOrd="1" presId="urn:microsoft.com/office/officeart/2005/8/layout/hList1"/>
+    <dgm:cxn modelId="{8A8AFC0A-16B5-0449-803D-146ECCE0107F}" type="presOf" srcId="{570167F9-68B4-A04B-9093-D9FD93152405}" destId="{60DD2336-8F5F-4C42-8949-8E520204A833}" srcOrd="0" destOrd="3" presId="urn:microsoft.com/office/officeart/2005/8/layout/hList1"/>
+    <dgm:cxn modelId="{68E60F11-10AD-5F40-A570-8A8133DE1A98}" type="presOf" srcId="{8BC04D1C-9843-354E-931B-EAC319E0B08A}" destId="{83B3767F-354D-D14C-8BB5-A558EF9415F3}" srcOrd="0" destOrd="2" presId="urn:microsoft.com/office/officeart/2005/8/layout/hList1"/>
+    <dgm:cxn modelId="{24161416-27B6-E14D-BD06-959BB574BD06}" type="presOf" srcId="{96856544-1C25-AE47-9D00-723F355C82CC}" destId="{60DD2336-8F5F-4C42-8949-8E520204A833}" srcOrd="0" destOrd="2" presId="urn:microsoft.com/office/officeart/2005/8/layout/hList1"/>
+    <dgm:cxn modelId="{9FC42929-48F9-144A-A1A3-0628DAF1AB37}" srcId="{67394E67-0841-7341-B886-26A149EACC10}" destId="{DF0C1B17-F3B4-9B45-A4C3-2A2E89BEDDF9}" srcOrd="1" destOrd="0" parTransId="{01A9E29C-D8C9-6940-B92D-61C7BA0E007D}" sibTransId="{CCF29D57-D08E-4C4C-9A9F-042E60451A45}"/>
+    <dgm:cxn modelId="{1534B231-316B-024F-A5DB-27C4330F1DBC}" srcId="{C242D152-3DF2-D548-8EEE-B9B22E4F93CD}" destId="{A9C8E855-F256-9D48-8F59-24DDA61C5A85}" srcOrd="0" destOrd="0" parTransId="{B82ECAF6-1097-DB43-83B0-57E475040981}" sibTransId="{873101A3-3B71-9B44-A576-753EE2F53106}"/>
+    <dgm:cxn modelId="{18E69D39-DCDB-9E4C-BC8F-0837D4FC6376}" srcId="{67394E67-0841-7341-B886-26A149EACC10}" destId="{C3D4B62D-5BD7-D04D-9D48-6CEB7FAB367B}" srcOrd="6" destOrd="0" parTransId="{3A5BDC1C-0296-DC4C-A595-457AB9D00816}" sibTransId="{B6E986C3-1CB0-EC4F-AD95-FB21B2E5020D}"/>
+    <dgm:cxn modelId="{3DC63B3F-CF9D-FF40-82F7-F12C3351A4E7}" srcId="{C242D152-3DF2-D548-8EEE-B9B22E4F93CD}" destId="{67394E67-0841-7341-B886-26A149EACC10}" srcOrd="1" destOrd="0" parTransId="{77473F5D-1F13-4243-87DF-33ED578CA243}" sibTransId="{9C9EAA60-E33F-9246-8D5E-4F7B9EF5166C}"/>
+    <dgm:cxn modelId="{9F3B1B46-6D57-1D40-8BC5-8E5C095F44FB}" type="presOf" srcId="{A9C8E855-F256-9D48-8F59-24DDA61C5A85}" destId="{190D1B6B-7148-F34B-A09B-2EF58520B67E}" srcOrd="0" destOrd="0" presId="urn:microsoft.com/office/officeart/2005/8/layout/hList1"/>
+    <dgm:cxn modelId="{9D2BC357-C12B-E545-BB2E-3E39501E486D}" type="presOf" srcId="{398B1AD5-6584-1844-94D0-CF6E8AD78CFC}" destId="{83B3767F-354D-D14C-8BB5-A558EF9415F3}" srcOrd="0" destOrd="1" presId="urn:microsoft.com/office/officeart/2005/8/layout/hList1"/>
+    <dgm:cxn modelId="{3285675A-1C1F-B446-9E8D-1D612EA5DD73}" srcId="{67394E67-0841-7341-B886-26A149EACC10}" destId="{570167F9-68B4-A04B-9093-D9FD93152405}" srcOrd="3" destOrd="0" parTransId="{8ABAEE1E-1A25-AB48-99A2-4E45AF908852}" sibTransId="{7EF1D1F3-99CD-CC42-961F-55738814F5B1}"/>
+    <dgm:cxn modelId="{DA0EDD6F-DF82-3A44-813C-49B1962A1108}" srcId="{A9C8E855-F256-9D48-8F59-24DDA61C5A85}" destId="{9562C37C-B3C8-3244-A2FA-81E29B5C090A}" srcOrd="0" destOrd="0" parTransId="{F9AC1F39-3B4B-4C48-B780-9449C533BB4F}" sibTransId="{A214A30E-6132-2E40-8780-164889E58137}"/>
+    <dgm:cxn modelId="{AA5C6673-B06D-484E-8324-FB4C98B01FC0}" type="presOf" srcId="{67394E67-0841-7341-B886-26A149EACC10}" destId="{4E552492-634D-2449-9BEC-2CD838DA0C80}" srcOrd="0" destOrd="0" presId="urn:microsoft.com/office/officeart/2005/8/layout/hList1"/>
+    <dgm:cxn modelId="{9C20F984-A0C1-5C42-8485-1E75F5F4883E}" type="presOf" srcId="{C242D152-3DF2-D548-8EEE-B9B22E4F93CD}" destId="{4D73DA62-3350-F04F-B1D1-6128F97CC6E1}" srcOrd="0" destOrd="0" presId="urn:microsoft.com/office/officeart/2005/8/layout/hList1"/>
+    <dgm:cxn modelId="{CA4C028E-E3AD-1944-86B4-025703ACD5BA}" type="presOf" srcId="{9562C37C-B3C8-3244-A2FA-81E29B5C090A}" destId="{83B3767F-354D-D14C-8BB5-A558EF9415F3}" srcOrd="0" destOrd="0" presId="urn:microsoft.com/office/officeart/2005/8/layout/hList1"/>
+    <dgm:cxn modelId="{F7301891-4185-0E47-BCE1-A75CF355957E}" type="presOf" srcId="{9348A8F1-61EC-4147-B590-81707D3F67E7}" destId="{60DD2336-8F5F-4C42-8949-8E520204A833}" srcOrd="0" destOrd="5" presId="urn:microsoft.com/office/officeart/2005/8/layout/hList1"/>
+    <dgm:cxn modelId="{7698349B-BDC8-BF4B-BB86-0AF42C0D67DD}" srcId="{67394E67-0841-7341-B886-26A149EACC10}" destId="{3CE002B4-67EF-6547-B8AD-5F73A9F94454}" srcOrd="4" destOrd="0" parTransId="{47B0C2F8-538D-3D46-97BE-B354CF00BF21}" sibTransId="{5DC29AB1-83E3-D247-8F4C-768526ADF297}"/>
+    <dgm:cxn modelId="{38ACBB9B-CF25-7E4F-94A3-344A43190DFC}" type="presOf" srcId="{729C452B-F169-634F-8784-F944A50C23EE}" destId="{83B3767F-354D-D14C-8BB5-A558EF9415F3}" srcOrd="0" destOrd="3" presId="urn:microsoft.com/office/officeart/2005/8/layout/hList1"/>
+    <dgm:cxn modelId="{C50477B3-1DB8-4646-A0C9-BA5C6F63AA55}" srcId="{A9C8E855-F256-9D48-8F59-24DDA61C5A85}" destId="{729C452B-F169-634F-8784-F944A50C23EE}" srcOrd="3" destOrd="0" parTransId="{F7FF85D0-C7AD-ED4D-8033-572EF2F26E94}" sibTransId="{EA3BDF38-83F2-1B48-AC39-176E484E01BA}"/>
+    <dgm:cxn modelId="{F88DC0B6-B05C-6A4F-BCD4-94EF3380B640}" type="presOf" srcId="{C3D4B62D-5BD7-D04D-9D48-6CEB7FAB367B}" destId="{60DD2336-8F5F-4C42-8949-8E520204A833}" srcOrd="0" destOrd="6" presId="urn:microsoft.com/office/officeart/2005/8/layout/hList1"/>
+    <dgm:cxn modelId="{4F5AB7C9-5F72-F145-B5E2-42F83AFB066C}" type="presOf" srcId="{D07689CC-1743-1541-A04C-2CB5CE47F8EC}" destId="{60DD2336-8F5F-4C42-8949-8E520204A833}" srcOrd="0" destOrd="0" presId="urn:microsoft.com/office/officeart/2005/8/layout/hList1"/>
+    <dgm:cxn modelId="{8C48AFCA-A4F6-8F4E-8727-788B4295F583}" type="presOf" srcId="{3CE002B4-67EF-6547-B8AD-5F73A9F94454}" destId="{60DD2336-8F5F-4C42-8949-8E520204A833}" srcOrd="0" destOrd="4" presId="urn:microsoft.com/office/officeart/2005/8/layout/hList1"/>
+    <dgm:cxn modelId="{E3614CD7-5286-AD43-8A48-03B4A48BCA80}" srcId="{67394E67-0841-7341-B886-26A149EACC10}" destId="{96856544-1C25-AE47-9D00-723F355C82CC}" srcOrd="2" destOrd="0" parTransId="{A9CCC29F-4E84-7542-942F-32E4498CEF55}" sibTransId="{8C6D5AB0-6C25-BC4F-AB7E-CA1DC4449D61}"/>
+    <dgm:cxn modelId="{C00C9AF7-3513-0740-BAE1-97035840FA98}" srcId="{67394E67-0841-7341-B886-26A149EACC10}" destId="{D07689CC-1743-1541-A04C-2CB5CE47F8EC}" srcOrd="0" destOrd="0" parTransId="{EC2380BB-6178-E947-BA9F-C37B914D957D}" sibTransId="{57A6CFF8-3811-DC44-AB07-B15F2FF8D893}"/>
+    <dgm:cxn modelId="{D901ECFA-8AF7-DF41-B376-BD2C753E7CF9}" srcId="{A9C8E855-F256-9D48-8F59-24DDA61C5A85}" destId="{398B1AD5-6584-1844-94D0-CF6E8AD78CFC}" srcOrd="1" destOrd="0" parTransId="{168219BE-8F03-DA42-9281-355BFB42F907}" sibTransId="{D889DE9E-4E7A-C14F-9E7E-A41B4628714B}"/>
+    <dgm:cxn modelId="{BA3AB0FC-884C-994C-99FF-183056245A62}" srcId="{67394E67-0841-7341-B886-26A149EACC10}" destId="{9348A8F1-61EC-4147-B590-81707D3F67E7}" srcOrd="5" destOrd="0" parTransId="{C0F85FA6-BCCA-E540-8456-AB1D132515EE}" sibTransId="{00C52843-CC28-BD42-8920-C0BBEB9B4250}"/>
+    <dgm:cxn modelId="{DB81D764-C245-B64F-9F2C-025D16DFC06C}" type="presParOf" srcId="{4D73DA62-3350-F04F-B1D1-6128F97CC6E1}" destId="{997C31CC-0948-2140-BC7F-EA7040EA9DA6}" srcOrd="0" destOrd="0" presId="urn:microsoft.com/office/officeart/2005/8/layout/hList1"/>
+    <dgm:cxn modelId="{EA7D397E-CD7A-494D-B160-D77D7E1BF76D}" type="presParOf" srcId="{997C31CC-0948-2140-BC7F-EA7040EA9DA6}" destId="{190D1B6B-7148-F34B-A09B-2EF58520B67E}" srcOrd="0" destOrd="0" presId="urn:microsoft.com/office/officeart/2005/8/layout/hList1"/>
+    <dgm:cxn modelId="{B64E35C3-F553-1B49-9F04-48E393C3AC68}" type="presParOf" srcId="{997C31CC-0948-2140-BC7F-EA7040EA9DA6}" destId="{83B3767F-354D-D14C-8BB5-A558EF9415F3}" srcOrd="1" destOrd="0" presId="urn:microsoft.com/office/officeart/2005/8/layout/hList1"/>
+    <dgm:cxn modelId="{F5957396-3E85-1B4A-94CE-B3BA035716F5}" type="presParOf" srcId="{4D73DA62-3350-F04F-B1D1-6128F97CC6E1}" destId="{42DC92E3-8D7F-7946-BBD9-25ECDEC684E3}" srcOrd="1" destOrd="0" presId="urn:microsoft.com/office/officeart/2005/8/layout/hList1"/>
+    <dgm:cxn modelId="{00DAECBF-0D9E-B141-933F-EC53DF749265}" type="presParOf" srcId="{4D73DA62-3350-F04F-B1D1-6128F97CC6E1}" destId="{DDFC3070-FC24-2C4F-B377-160874EEB45B}" srcOrd="2" destOrd="0" presId="urn:microsoft.com/office/officeart/2005/8/layout/hList1"/>
+    <dgm:cxn modelId="{D6566075-6472-3B4B-B9CB-4FDEA310C024}" type="presParOf" srcId="{DDFC3070-FC24-2C4F-B377-160874EEB45B}" destId="{4E552492-634D-2449-9BEC-2CD838DA0C80}" srcOrd="0" destOrd="0" presId="urn:microsoft.com/office/officeart/2005/8/layout/hList1"/>
+    <dgm:cxn modelId="{A9A0681F-EC5A-784E-95FE-A5C0E73E3F56}" type="presParOf" srcId="{DDFC3070-FC24-2C4F-B377-160874EEB45B}" destId="{60DD2336-8F5F-4C42-8949-8E520204A833}" srcOrd="1" destOrd="0" presId="urn:microsoft.com/office/officeart/2005/8/layout/hList1"/>
+  </dgm:cxnLst>
+  <dgm:bg/>
+  <dgm:whole/>
+  <dgm:extLst>
+    <a:ext uri="http://schemas.microsoft.com/office/drawing/2008/diagram">
+      <dsp:dataModelExt xmlns:dsp="http://schemas.microsoft.com/office/drawing/2008/diagram" relId="rId6" minVer="http://schemas.openxmlformats.org/drawingml/2006/diagram"/>
+    </a:ext>
+  </dgm:extLst>
+</dgm:dataModel>
+</file>
+
+<file path=ppt/diagrams/drawing1.xml><?xml version="1.0" encoding="utf-8"?>
+<dsp:drawing xmlns:dgm="http://schemas.openxmlformats.org/drawingml/2006/diagram" xmlns:dsp="http://schemas.microsoft.com/office/drawing/2008/diagram" xmlns:a="http://schemas.openxmlformats.org/drawingml/2006/main">
+  <dsp:spTree>
+    <dsp:nvGrpSpPr>
+      <dsp:cNvPr id="0" name=""/>
+      <dsp:cNvGrpSpPr/>
+    </dsp:nvGrpSpPr>
+    <dsp:grpSpPr/>
+    <dsp:sp modelId="{190D1B6B-7148-F34B-A09B-2EF58520B67E}">
+      <dsp:nvSpPr>
+        <dsp:cNvPr id="0" name=""/>
+        <dsp:cNvSpPr/>
+      </dsp:nvSpPr>
+      <dsp:spPr>
+        <a:xfrm>
+          <a:off x="37" y="23182"/>
+          <a:ext cx="3563987" cy="892800"/>
+        </a:xfrm>
+        <a:prstGeom prst="rect">
+          <a:avLst/>
+        </a:prstGeom>
+        <a:solidFill>
+          <a:schemeClr val="accent1">
+            <a:hueOff val="0"/>
+            <a:satOff val="0"/>
+            <a:lumOff val="0"/>
+            <a:alphaOff val="0"/>
+          </a:schemeClr>
+        </a:solidFill>
+        <a:ln w="25400" cap="flat" cmpd="sng" algn="ctr">
+          <a:solidFill>
+            <a:schemeClr val="accent1">
+              <a:hueOff val="0"/>
+              <a:satOff val="0"/>
+              <a:lumOff val="0"/>
+              <a:alphaOff val="0"/>
+            </a:schemeClr>
+          </a:solidFill>
+          <a:prstDash val="solid"/>
+        </a:ln>
+        <a:effectLst/>
+      </dsp:spPr>
+      <dsp:style>
+        <a:lnRef idx="2">
+          <a:scrgbClr r="0" g="0" b="0"/>
+        </a:lnRef>
+        <a:fillRef idx="1">
+          <a:scrgbClr r="0" g="0" b="0"/>
+        </a:fillRef>
+        <a:effectRef idx="0">
+          <a:scrgbClr r="0" g="0" b="0"/>
+        </a:effectRef>
+        <a:fontRef idx="minor">
+          <a:schemeClr val="lt1"/>
+        </a:fontRef>
+      </dsp:style>
+      <dsp:txBody>
+        <a:bodyPr spcFirstLastPara="0" vert="horz" wrap="square" lIns="220472" tIns="125984" rIns="220472" bIns="125984" numCol="1" spcCol="1270" anchor="ctr" anchorCtr="0">
+          <a:noAutofit/>
+        </a:bodyPr>
+        <a:lstStyle/>
+        <a:p>
+          <a:pPr marL="0" lvl="0" indent="0" algn="ctr" defTabSz="1377950">
+            <a:lnSpc>
+              <a:spcPct val="90000"/>
+            </a:lnSpc>
+            <a:spcBef>
+              <a:spcPct val="0"/>
+            </a:spcBef>
+            <a:spcAft>
+              <a:spcPct val="35000"/>
+            </a:spcAft>
+            <a:buNone/>
+          </a:pPr>
+          <a:r>
+            <a:rPr lang="en-US" sz="3100" kern="1200" dirty="0" err="1"/>
+            <a:t>Pseudocódigo</a:t>
+          </a:r>
+          <a:endParaRPr lang="en-US" sz="3100" kern="1200" dirty="0"/>
+        </a:p>
+      </dsp:txBody>
+      <dsp:txXfrm>
+        <a:off x="37" y="23182"/>
+        <a:ext cx="3563987" cy="892800"/>
+      </dsp:txXfrm>
+    </dsp:sp>
+    <dsp:sp modelId="{83B3767F-354D-D14C-8BB5-A558EF9415F3}">
+      <dsp:nvSpPr>
+        <dsp:cNvPr id="0" name=""/>
+        <dsp:cNvSpPr/>
+      </dsp:nvSpPr>
+      <dsp:spPr>
+        <a:xfrm>
+          <a:off x="37" y="915982"/>
+          <a:ext cx="3563987" cy="3685677"/>
+        </a:xfrm>
+        <a:prstGeom prst="rect">
+          <a:avLst/>
+        </a:prstGeom>
+        <a:solidFill>
+          <a:schemeClr val="accent1">
+            <a:alpha val="90000"/>
+            <a:tint val="40000"/>
+            <a:hueOff val="0"/>
+            <a:satOff val="0"/>
+            <a:lumOff val="0"/>
+            <a:alphaOff val="0"/>
+          </a:schemeClr>
+        </a:solidFill>
+        <a:ln w="25400" cap="flat" cmpd="sng" algn="ctr">
+          <a:solidFill>
+            <a:schemeClr val="accent1">
+              <a:alpha val="90000"/>
+              <a:tint val="40000"/>
+              <a:hueOff val="0"/>
+              <a:satOff val="0"/>
+              <a:lumOff val="0"/>
+              <a:alphaOff val="0"/>
+            </a:schemeClr>
+          </a:solidFill>
+          <a:prstDash val="solid"/>
+        </a:ln>
+        <a:effectLst/>
+      </dsp:spPr>
+      <dsp:style>
+        <a:lnRef idx="2">
+          <a:scrgbClr r="0" g="0" b="0"/>
+        </a:lnRef>
+        <a:fillRef idx="1">
+          <a:scrgbClr r="0" g="0" b="0"/>
+        </a:fillRef>
+        <a:effectRef idx="0">
+          <a:scrgbClr r="0" g="0" b="0"/>
+        </a:effectRef>
+        <a:fontRef idx="minor"/>
+      </dsp:style>
+      <dsp:txBody>
+        <a:bodyPr spcFirstLastPara="0" vert="horz" wrap="square" lIns="165354" tIns="165354" rIns="220472" bIns="248031" numCol="1" spcCol="1270" anchor="t" anchorCtr="0">
+          <a:noAutofit/>
+        </a:bodyPr>
+        <a:lstStyle/>
+        <a:p>
+          <a:pPr marL="285750" lvl="1" indent="-285750" algn="l" defTabSz="1377950">
+            <a:lnSpc>
+              <a:spcPct val="90000"/>
+            </a:lnSpc>
+            <a:spcBef>
+              <a:spcPct val="0"/>
+            </a:spcBef>
+            <a:spcAft>
+              <a:spcPct val="15000"/>
+            </a:spcAft>
+            <a:buChar char="•"/>
+          </a:pPr>
+          <a:r>
+            <a:rPr lang="en-US" sz="3100" kern="1200" dirty="0" err="1"/>
+            <a:t>Funciones</a:t>
+          </a:r>
+          <a:endParaRPr lang="en-US" sz="3100" kern="1200" dirty="0"/>
+        </a:p>
+        <a:p>
+          <a:pPr marL="285750" lvl="1" indent="-285750" algn="l" defTabSz="1377950">
+            <a:lnSpc>
+              <a:spcPct val="90000"/>
+            </a:lnSpc>
+            <a:spcBef>
+              <a:spcPct val="0"/>
+            </a:spcBef>
+            <a:spcAft>
+              <a:spcPct val="15000"/>
+            </a:spcAft>
+            <a:buChar char="•"/>
+          </a:pPr>
+          <a:r>
+            <a:rPr lang="en-US" sz="3100" kern="1200" dirty="0" err="1"/>
+            <a:t>Ciclos</a:t>
+          </a:r>
+          <a:endParaRPr lang="en-US" sz="3100" kern="1200" dirty="0"/>
+        </a:p>
+        <a:p>
+          <a:pPr marL="285750" lvl="1" indent="-285750" algn="l" defTabSz="1377950">
+            <a:lnSpc>
+              <a:spcPct val="90000"/>
+            </a:lnSpc>
+            <a:spcBef>
+              <a:spcPct val="0"/>
+            </a:spcBef>
+            <a:spcAft>
+              <a:spcPct val="15000"/>
+            </a:spcAft>
+            <a:buChar char="•"/>
+          </a:pPr>
+          <a:r>
+            <a:rPr lang="en-US" sz="3100" kern="1200" dirty="0" err="1"/>
+            <a:t>Condicionales</a:t>
+          </a:r>
+          <a:endParaRPr lang="en-US" sz="3100" kern="1200" dirty="0"/>
+        </a:p>
+        <a:p>
+          <a:pPr marL="285750" lvl="1" indent="-285750" algn="l" defTabSz="1377950">
+            <a:lnSpc>
+              <a:spcPct val="90000"/>
+            </a:lnSpc>
+            <a:spcBef>
+              <a:spcPct val="0"/>
+            </a:spcBef>
+            <a:spcAft>
+              <a:spcPct val="15000"/>
+            </a:spcAft>
+            <a:buChar char="•"/>
+          </a:pPr>
+          <a:r>
+            <a:rPr lang="en-US" sz="3100" kern="1200" dirty="0" err="1"/>
+            <a:t>Funciones</a:t>
+          </a:r>
+          <a:r>
+            <a:rPr lang="en-US" sz="3100" kern="1200" dirty="0"/>
+            <a:t> c/</a:t>
+          </a:r>
+          <a:r>
+            <a:rPr lang="en-US" sz="3100" kern="1200" dirty="0" err="1"/>
+            <a:t>datos</a:t>
+          </a:r>
+          <a:endParaRPr lang="en-US" sz="3100" kern="1200" dirty="0"/>
+        </a:p>
+      </dsp:txBody>
+      <dsp:txXfrm>
+        <a:off x="37" y="915982"/>
+        <a:ext cx="3563987" cy="3685677"/>
+      </dsp:txXfrm>
+    </dsp:sp>
+    <dsp:sp modelId="{4E552492-634D-2449-9BEC-2CD838DA0C80}">
+      <dsp:nvSpPr>
+        <dsp:cNvPr id="0" name=""/>
+        <dsp:cNvSpPr/>
+      </dsp:nvSpPr>
+      <dsp:spPr>
+        <a:xfrm>
+          <a:off x="4062982" y="23182"/>
+          <a:ext cx="3563987" cy="892800"/>
+        </a:xfrm>
+        <a:prstGeom prst="rect">
+          <a:avLst/>
+        </a:prstGeom>
+        <a:solidFill>
+          <a:schemeClr val="accent1">
+            <a:hueOff val="0"/>
+            <a:satOff val="0"/>
+            <a:lumOff val="0"/>
+            <a:alphaOff val="0"/>
+          </a:schemeClr>
+        </a:solidFill>
+        <a:ln w="25400" cap="flat" cmpd="sng" algn="ctr">
+          <a:solidFill>
+            <a:schemeClr val="accent1">
+              <a:hueOff val="0"/>
+              <a:satOff val="0"/>
+              <a:lumOff val="0"/>
+              <a:alphaOff val="0"/>
+            </a:schemeClr>
+          </a:solidFill>
+          <a:prstDash val="solid"/>
+        </a:ln>
+        <a:effectLst/>
+      </dsp:spPr>
+      <dsp:style>
+        <a:lnRef idx="2">
+          <a:scrgbClr r="0" g="0" b="0"/>
+        </a:lnRef>
+        <a:fillRef idx="1">
+          <a:scrgbClr r="0" g="0" b="0"/>
+        </a:fillRef>
+        <a:effectRef idx="0">
+          <a:scrgbClr r="0" g="0" b="0"/>
+        </a:effectRef>
+        <a:fontRef idx="minor">
+          <a:schemeClr val="lt1"/>
+        </a:fontRef>
+      </dsp:style>
+      <dsp:txBody>
+        <a:bodyPr spcFirstLastPara="0" vert="horz" wrap="square" lIns="220472" tIns="125984" rIns="220472" bIns="125984" numCol="1" spcCol="1270" anchor="ctr" anchorCtr="0">
+          <a:noAutofit/>
+        </a:bodyPr>
+        <a:lstStyle/>
+        <a:p>
+          <a:pPr marL="0" lvl="0" indent="0" algn="ctr" defTabSz="1377950">
+            <a:lnSpc>
+              <a:spcPct val="90000"/>
+            </a:lnSpc>
+            <a:spcBef>
+              <a:spcPct val="0"/>
+            </a:spcBef>
+            <a:spcAft>
+              <a:spcPct val="35000"/>
+            </a:spcAft>
+            <a:buNone/>
+          </a:pPr>
+          <a:r>
+            <a:rPr lang="en-US" sz="3100" kern="1200" dirty="0"/>
+            <a:t>Java Procedural</a:t>
+          </a:r>
+        </a:p>
+      </dsp:txBody>
+      <dsp:txXfrm>
+        <a:off x="4062982" y="23182"/>
+        <a:ext cx="3563987" cy="892800"/>
+      </dsp:txXfrm>
+    </dsp:sp>
+    <dsp:sp modelId="{60DD2336-8F5F-4C42-8949-8E520204A833}">
+      <dsp:nvSpPr>
+        <dsp:cNvPr id="0" name=""/>
+        <dsp:cNvSpPr/>
+      </dsp:nvSpPr>
+      <dsp:spPr>
+        <a:xfrm>
+          <a:off x="4062982" y="915982"/>
+          <a:ext cx="3563987" cy="3685677"/>
+        </a:xfrm>
+        <a:prstGeom prst="rect">
+          <a:avLst/>
+        </a:prstGeom>
+        <a:solidFill>
+          <a:schemeClr val="accent1">
+            <a:alpha val="90000"/>
+            <a:tint val="40000"/>
+            <a:hueOff val="0"/>
+            <a:satOff val="0"/>
+            <a:lumOff val="0"/>
+            <a:alphaOff val="0"/>
+          </a:schemeClr>
+        </a:solidFill>
+        <a:ln w="25400" cap="flat" cmpd="sng" algn="ctr">
+          <a:solidFill>
+            <a:schemeClr val="accent1">
+              <a:alpha val="90000"/>
+              <a:tint val="40000"/>
+              <a:hueOff val="0"/>
+              <a:satOff val="0"/>
+              <a:lumOff val="0"/>
+              <a:alphaOff val="0"/>
+            </a:schemeClr>
+          </a:solidFill>
+          <a:prstDash val="solid"/>
+        </a:ln>
+        <a:effectLst/>
+      </dsp:spPr>
+      <dsp:style>
+        <a:lnRef idx="2">
+          <a:scrgbClr r="0" g="0" b="0"/>
+        </a:lnRef>
+        <a:fillRef idx="1">
+          <a:scrgbClr r="0" g="0" b="0"/>
+        </a:fillRef>
+        <a:effectRef idx="0">
+          <a:scrgbClr r="0" g="0" b="0"/>
+        </a:effectRef>
+        <a:fontRef idx="minor"/>
+      </dsp:style>
+      <dsp:txBody>
+        <a:bodyPr spcFirstLastPara="0" vert="horz" wrap="square" lIns="165354" tIns="165354" rIns="220472" bIns="248031" numCol="1" spcCol="1270" anchor="t" anchorCtr="0">
+          <a:noAutofit/>
+        </a:bodyPr>
+        <a:lstStyle/>
+        <a:p>
+          <a:pPr marL="285750" lvl="1" indent="-285750" algn="l" defTabSz="1377950">
+            <a:lnSpc>
+              <a:spcPct val="90000"/>
+            </a:lnSpc>
+            <a:spcBef>
+              <a:spcPct val="0"/>
+            </a:spcBef>
+            <a:spcAft>
+              <a:spcPct val="15000"/>
+            </a:spcAft>
+            <a:buChar char="•"/>
+          </a:pPr>
+          <a:r>
+            <a:rPr lang="en-US" sz="3100" kern="1200" dirty="0" err="1"/>
+            <a:t>Tipos</a:t>
+          </a:r>
+          <a:r>
+            <a:rPr lang="en-US" sz="3100" kern="1200" dirty="0"/>
+            <a:t> de Dato</a:t>
+          </a:r>
+        </a:p>
+        <a:p>
+          <a:pPr marL="285750" lvl="1" indent="-285750" algn="l" defTabSz="1377950">
+            <a:lnSpc>
+              <a:spcPct val="90000"/>
+            </a:lnSpc>
+            <a:spcBef>
+              <a:spcPct val="0"/>
+            </a:spcBef>
+            <a:spcAft>
+              <a:spcPct val="15000"/>
+            </a:spcAft>
+            <a:buChar char="•"/>
+          </a:pPr>
+          <a:r>
+            <a:rPr lang="en-US" sz="3100" kern="1200" dirty="0" err="1"/>
+            <a:t>Operadores</a:t>
+          </a:r>
+          <a:endParaRPr lang="en-US" sz="3100" kern="1200" dirty="0"/>
+        </a:p>
+        <a:p>
+          <a:pPr marL="285750" lvl="1" indent="-285750" algn="l" defTabSz="1377950">
+            <a:lnSpc>
+              <a:spcPct val="90000"/>
+            </a:lnSpc>
+            <a:spcBef>
+              <a:spcPct val="0"/>
+            </a:spcBef>
+            <a:spcAft>
+              <a:spcPct val="15000"/>
+            </a:spcAft>
+            <a:buChar char="•"/>
+          </a:pPr>
+          <a:r>
+            <a:rPr lang="en-US" sz="3100" kern="1200" dirty="0" err="1"/>
+            <a:t>Condicionales</a:t>
+          </a:r>
+          <a:endParaRPr lang="en-US" sz="3100" kern="1200" dirty="0"/>
+        </a:p>
+        <a:p>
+          <a:pPr marL="285750" lvl="1" indent="-285750" algn="l" defTabSz="1377950">
+            <a:lnSpc>
+              <a:spcPct val="90000"/>
+            </a:lnSpc>
+            <a:spcBef>
+              <a:spcPct val="0"/>
+            </a:spcBef>
+            <a:spcAft>
+              <a:spcPct val="15000"/>
+            </a:spcAft>
+            <a:buChar char="•"/>
+          </a:pPr>
+          <a:r>
+            <a:rPr lang="en-US" sz="3100" kern="1200" dirty="0" err="1"/>
+            <a:t>Ciclos</a:t>
+          </a:r>
+          <a:endParaRPr lang="en-US" sz="3100" kern="1200" dirty="0"/>
+        </a:p>
+        <a:p>
+          <a:pPr marL="285750" lvl="1" indent="-285750" algn="l" defTabSz="1377950">
+            <a:lnSpc>
+              <a:spcPct val="90000"/>
+            </a:lnSpc>
+            <a:spcBef>
+              <a:spcPct val="0"/>
+            </a:spcBef>
+            <a:spcAft>
+              <a:spcPct val="15000"/>
+            </a:spcAft>
+            <a:buChar char="•"/>
+          </a:pPr>
+          <a:r>
+            <a:rPr lang="en-US" sz="3100" kern="1200" dirty="0"/>
+            <a:t>Strings</a:t>
+          </a:r>
+        </a:p>
+        <a:p>
+          <a:pPr marL="285750" lvl="1" indent="-285750" algn="l" defTabSz="1377950">
+            <a:lnSpc>
+              <a:spcPct val="90000"/>
+            </a:lnSpc>
+            <a:spcBef>
+              <a:spcPct val="0"/>
+            </a:spcBef>
+            <a:spcAft>
+              <a:spcPct val="15000"/>
+            </a:spcAft>
+            <a:buChar char="•"/>
+          </a:pPr>
+          <a:r>
+            <a:rPr lang="en-US" sz="3100" kern="1200" dirty="0" err="1"/>
+            <a:t>Arreglos</a:t>
+          </a:r>
+          <a:endParaRPr lang="en-US" sz="3100" kern="1200" dirty="0"/>
+        </a:p>
+        <a:p>
+          <a:pPr marL="285750" lvl="1" indent="-285750" algn="l" defTabSz="1377950">
+            <a:lnSpc>
+              <a:spcPct val="90000"/>
+            </a:lnSpc>
+            <a:spcBef>
+              <a:spcPct val="0"/>
+            </a:spcBef>
+            <a:spcAft>
+              <a:spcPct val="15000"/>
+            </a:spcAft>
+            <a:buChar char="•"/>
+          </a:pPr>
+          <a:r>
+            <a:rPr lang="en-US" sz="3100" kern="1200" dirty="0" err="1"/>
+            <a:t>Excepciones</a:t>
+          </a:r>
+          <a:endParaRPr lang="en-US" sz="3100" kern="1200" dirty="0"/>
+        </a:p>
+      </dsp:txBody>
+      <dsp:txXfrm>
+        <a:off x="4062982" y="915982"/>
+        <a:ext cx="3563987" cy="3685677"/>
+      </dsp:txXfrm>
+    </dsp:sp>
+  </dsp:spTree>
+</dsp:drawing>
+</file>
+
+<file path=ppt/diagrams/layout1.xml><?xml version="1.0" encoding="utf-8"?>
+<dgm:layoutDef xmlns:dgm="http://schemas.openxmlformats.org/drawingml/2006/diagram" xmlns:a="http://schemas.openxmlformats.org/drawingml/2006/main" uniqueId="urn:microsoft.com/office/officeart/2005/8/layout/hList1">
+  <dgm:title val=""/>
+  <dgm:desc val=""/>
+  <dgm:catLst>
+    <dgm:cat type="list" pri="5000"/>
+    <dgm:cat type="convert" pri="5000"/>
+  </dgm:catLst>
+  <dgm:sampData>
+    <dgm:dataModel>
+      <dgm:ptLst>
+        <dgm:pt modelId="0" type="doc"/>
+        <dgm:pt modelId="1">
+          <dgm:prSet phldr="1"/>
+        </dgm:pt>
+        <dgm:pt modelId="11">
+          <dgm:prSet phldr="1"/>
+        </dgm:pt>
+        <dgm:pt modelId="12">
+          <dgm:prSet phldr="1"/>
+        </dgm:pt>
+        <dgm:pt modelId="2">
+          <dgm:prSet phldr="1"/>
+        </dgm:pt>
+        <dgm:pt modelId="21">
+          <dgm:prSet phldr="1"/>
+        </dgm:pt>
+        <dgm:pt modelId="22">
+          <dgm:prSet phldr="1"/>
+        </dgm:pt>
+        <dgm:pt modelId="3">
+          <dgm:prSet phldr="1"/>
+        </dgm:pt>
+        <dgm:pt modelId="31">
+          <dgm:prSet phldr="1"/>
+        </dgm:pt>
+        <dgm:pt modelId="32">
+          <dgm:prSet phldr="1"/>
+        </dgm:pt>
+      </dgm:ptLst>
+      <dgm:cxnLst>
+        <dgm:cxn modelId="4" srcId="0" destId="1" srcOrd="0" destOrd="0"/>
+        <dgm:cxn modelId="5" srcId="0" destId="2" srcOrd="1" destOrd="0"/>
+        <dgm:cxn modelId="6" srcId="0" destId="3" srcOrd="2" destOrd="0"/>
+        <dgm:cxn modelId="13" srcId="1" destId="11" srcOrd="0" destOrd="0"/>
+        <dgm:cxn modelId="14" srcId="1" destId="12" srcOrd="1" destOrd="0"/>
+        <dgm:cxn modelId="23" srcId="2" destId="21" srcOrd="0" destOrd="0"/>
+        <dgm:cxn modelId="24" srcId="2" destId="22" srcOrd="1" destOrd="0"/>
+        <dgm:cxn modelId="33" srcId="3" destId="31" srcOrd="0" destOrd="0"/>
+        <dgm:cxn modelId="34" srcId="3" destId="32" srcOrd="1" destOrd="0"/>
+      </dgm:cxnLst>
+      <dgm:bg/>
+      <dgm:whole/>
+    </dgm:dataModel>
+  </dgm:sampData>
+  <dgm:styleData>
+    <dgm:dataModel>
+      <dgm:ptLst>
+        <dgm:pt modelId="0" type="doc"/>
+        <dgm:pt modelId="1">
+          <dgm:prSet phldr="1"/>
+        </dgm:pt>
+        <dgm:pt modelId="2">
+          <dgm:prSet phldr="1"/>
+        </dgm:pt>
+      </dgm:ptLst>
+      <dgm:cxnLst>
+        <dgm:cxn modelId="3" srcId="0" destId="1" srcOrd="0" destOrd="0"/>
+        <dgm:cxn modelId="4" srcId="0" destId="2" srcOrd="1" destOrd="0"/>
+      </dgm:cxnLst>
+      <dgm:bg/>
+      <dgm:whole/>
+    </dgm:dataModel>
+  </dgm:styleData>
+  <dgm:clrData>
+    <dgm:dataModel>
+      <dgm:ptLst>
+        <dgm:pt modelId="0" type="doc"/>
+        <dgm:pt modelId="1">
+          <dgm:prSet phldr="1"/>
+        </dgm:pt>
+        <dgm:pt modelId="2">
+          <dgm:prSet phldr="1"/>
+        </dgm:pt>
+        <dgm:pt modelId="3">
+          <dgm:prSet phldr="1"/>
+        </dgm:pt>
+        <dgm:pt modelId="4">
+          <dgm:prSet phldr="1"/>
+        </dgm:pt>
+      </dgm:ptLst>
+      <dgm:cxnLst>
+        <dgm:cxn modelId="5" srcId="0" destId="1" srcOrd="0" destOrd="0"/>
+        <dgm:cxn modelId="6" srcId="0" destId="2" srcOrd="1" destOrd="0"/>
+        <dgm:cxn modelId="7" srcId="0" destId="3" srcOrd="2" destOrd="0"/>
+        <dgm:cxn modelId="8" srcId="0" destId="4" srcOrd="3" destOrd="0"/>
+      </dgm:cxnLst>
+      <dgm:bg/>
+      <dgm:whole/>
+    </dgm:dataModel>
+  </dgm:clrData>
+  <dgm:layoutNode name="Name0">
+    <dgm:varLst>
+      <dgm:dir/>
+      <dgm:animLvl val="lvl"/>
+      <dgm:resizeHandles val="exact"/>
+    </dgm:varLst>
+    <dgm:choose name="Name1">
+      <dgm:if name="Name2" func="var" arg="dir" op="equ" val="norm">
+        <dgm:alg type="lin"/>
+      </dgm:if>
+      <dgm:else name="Name3">
+        <dgm:alg type="lin">
+          <dgm:param type="linDir" val="fromR"/>
+        </dgm:alg>
+      </dgm:else>
+    </dgm:choose>
+    <dgm:shape xmlns:r="http://schemas.openxmlformats.org/officeDocument/2006/relationships" r:blip="">
+      <dgm:adjLst/>
+    </dgm:shape>
+    <dgm:presOf/>
+    <dgm:constrLst>
+      <dgm:constr type="h" for="ch" forName="composite" refType="h"/>
+      <dgm:constr type="w" for="ch" forName="composite" refType="w"/>
+      <dgm:constr type="w" for="des" forName="parTx"/>
+      <dgm:constr type="h" for="des" forName="parTx" op="equ"/>
+      <dgm:constr type="w" for="des" forName="desTx"/>
+      <dgm:constr type="h" for="des" forName="desTx" op="equ"/>
+      <dgm:constr type="primFontSz" for="des" forName="parTx" val="65"/>
+      <dgm:constr type="secFontSz" for="des" forName="desTx" refType="primFontSz" refFor="des" refForName="parTx" op="equ"/>
+      <dgm:constr type="h" for="des" forName="parTx" refType="primFontSz" refFor="des" refForName="parTx" fact="0.8"/>
+      <dgm:constr type="h" for="des" forName="desTx" refType="primFontSz" refFor="des" refForName="parTx" fact="1.22"/>
+      <dgm:constr type="w" for="ch" forName="space" refType="w" refFor="ch" refForName="composite" op="equ" fact="0.14"/>
+    </dgm:constrLst>
+    <dgm:ruleLst>
+      <dgm:rule type="w" for="ch" forName="composite" val="0" fact="NaN" max="NaN"/>
+      <dgm:rule type="primFontSz" for="des" forName="parTx" val="5" fact="NaN" max="NaN"/>
+    </dgm:ruleLst>
+    <dgm:forEach name="Name4" axis="ch" ptType="node">
+      <dgm:layoutNode name="composite">
+        <dgm:alg type="composite"/>
+        <dgm:shape xmlns:r="http://schemas.openxmlformats.org/officeDocument/2006/relationships" r:blip="">
+          <dgm:adjLst/>
+        </dgm:shape>
+        <dgm:presOf/>
+        <dgm:constrLst>
+          <dgm:constr type="l" for="ch" forName="parTx"/>
+          <dgm:constr type="w" for="ch" forName="parTx" refType="w"/>
+          <dgm:constr type="t" for="ch" forName="parTx"/>
+          <dgm:constr type="l" for="ch" forName="desTx"/>
+          <dgm:constr type="w" for="ch" forName="desTx" refType="w" refFor="ch" refForName="parTx"/>
+          <dgm:constr type="t" for="ch" forName="desTx" refType="h" refFor="ch" refForName="parTx"/>
+        </dgm:constrLst>
+        <dgm:ruleLst>
+          <dgm:rule type="h" val="INF" fact="NaN" max="NaN"/>
+        </dgm:ruleLst>
+        <dgm:layoutNode name="parTx" styleLbl="alignNode1">
+          <dgm:varLst>
+            <dgm:chMax val="0"/>
+            <dgm:chPref val="0"/>
+            <dgm:bulletEnabled val="1"/>
+          </dgm:varLst>
+          <dgm:alg type="tx"/>
+          <dgm:shape xmlns:r="http://schemas.openxmlformats.org/officeDocument/2006/relationships" type="rect" r:blip="">
+            <dgm:adjLst/>
+          </dgm:shape>
+          <dgm:presOf axis="self" ptType="node"/>
+          <dgm:constrLst>
+            <dgm:constr type="h" refType="w" op="lte" fact="0.4"/>
+            <dgm:constr type="h"/>
+            <dgm:constr type="tMarg" refType="primFontSz" fact="0.32"/>
+            <dgm:constr type="bMarg" refType="primFontSz" fact="0.32"/>
+          </dgm:constrLst>
+          <dgm:ruleLst>
+            <dgm:rule type="h" val="INF" fact="NaN" max="NaN"/>
+          </dgm:ruleLst>
+        </dgm:layoutNode>
+        <dgm:layoutNode name="desTx" styleLbl="alignAccFollowNode1">
+          <dgm:varLst>
+            <dgm:bulletEnabled val="1"/>
+          </dgm:varLst>
+          <dgm:alg type="tx">
+            <dgm:param type="stBulletLvl" val="1"/>
+          </dgm:alg>
+          <dgm:shape xmlns:r="http://schemas.openxmlformats.org/officeDocument/2006/relationships" type="rect" r:blip="">
+            <dgm:adjLst/>
+          </dgm:shape>
+          <dgm:presOf axis="des" ptType="node"/>
+          <dgm:constrLst>
+            <dgm:constr type="secFontSz" val="65"/>
+            <dgm:constr type="primFontSz" refType="secFontSz"/>
+            <dgm:constr type="h"/>
+            <dgm:constr type="lMarg" refType="primFontSz" fact="0.42"/>
+            <dgm:constr type="tMarg" refType="primFontSz" fact="0.42"/>
+            <dgm:constr type="bMarg" refType="primFontSz" fact="0.63"/>
+          </dgm:constrLst>
+          <dgm:ruleLst>
+            <dgm:rule type="h" val="INF" fact="NaN" max="NaN"/>
+          </dgm:ruleLst>
+        </dgm:layoutNode>
+      </dgm:layoutNode>
+      <dgm:forEach name="Name5" axis="followSib" ptType="sibTrans" cnt="1">
+        <dgm:layoutNode name="space">
+          <dgm:alg type="sp"/>
+          <dgm:shape xmlns:r="http://schemas.openxmlformats.org/officeDocument/2006/relationships" r:blip="">
+            <dgm:adjLst/>
+          </dgm:shape>
+          <dgm:presOf/>
+          <dgm:constrLst/>
+          <dgm:ruleLst/>
+        </dgm:layoutNode>
+      </dgm:forEach>
+    </dgm:forEach>
+  </dgm:layoutNode>
+</dgm:layoutDef>
+</file>
+
+<file path=ppt/diagrams/quickStyle1.xml><?xml version="1.0" encoding="utf-8"?>
+<dgm:styleDef xmlns:dgm="http://schemas.openxmlformats.org/drawingml/2006/diagram" xmlns:a="http://schemas.openxmlformats.org/drawingml/2006/main" uniqueId="urn:microsoft.com/office/officeart/2005/8/quickstyle/simple1">
+  <dgm:title val=""/>
+  <dgm:desc val=""/>
+  <dgm:catLst>
+    <dgm:cat type="simple" pri="10100"/>
+  </dgm:catLst>
+  <dgm:scene3d>
+    <a:camera prst="orthographicFront"/>
+    <a:lightRig rig="threePt" dir="t"/>
+  </dgm:scene3d>
+  <dgm:styleLbl name="node0">
+    <dgm:scene3d>
+      <a:camera prst="orthographicFront"/>
+      <a:lightRig rig="threePt" dir="t"/>
+    </dgm:scene3d>
+    <dgm:sp3d/>
+    <dgm:txPr/>
+    <dgm:style>
+      <a:lnRef idx="2">
+        <a:scrgbClr r="0" g="0" b="0"/>
+      </a:lnRef>
+      <a:fillRef idx="1">
+        <a:scrgbClr r="0" g="0" b="0"/>
+      </a:fillRef>
+      <a:effectRef idx="0">
+        <a:scrgbClr r="0" g="0" b="0"/>
+      </a:effectRef>
+      <a:fontRef idx="minor">
+        <a:schemeClr val="lt1"/>
+      </a:fontRef>
+    </dgm:style>
+  </dgm:styleLbl>
+  <dgm:styleLbl name="lnNode1">
+    <dgm:scene3d>
+      <a:camera prst="orthographicFront"/>
+      <a:lightRig rig="threePt" dir="t"/>
+    </dgm:scene3d>
+    <dgm:sp3d/>
+    <dgm:txPr/>
+    <dgm:style>
+      <a:lnRef idx="2">
+        <a:scrgbClr r="0" g="0" b="0"/>
+      </a:lnRef>
+      <a:fillRef idx="1">
+        <a:scrgbClr r="0" g="0" b="0"/>
+      </a:fillRef>
+      <a:effectRef idx="0">
+        <a:scrgbClr r="0" g="0" b="0"/>
+      </a:effectRef>
+      <a:fontRef idx="minor">
+        <a:schemeClr val="lt1"/>
+      </a:fontRef>
+    </dgm:style>
+  </dgm:styleLbl>
+  <dgm:styleLbl name="vennNode1">
+    <dgm:scene3d>
+      <a:camera prst="orthographicFront"/>
+      <a:lightRig rig="threePt" dir="t"/>
+    </dgm:scene3d>
+    <dgm:sp3d/>
+    <dgm:txPr/>
+    <dgm:style>
+      <a:lnRef idx="2">
+        <a:scrgbClr r="0" g="0" b="0"/>
+      </a:lnRef>
+      <a:fillRef idx="1">
+        <a:scrgbClr r="0" g="0" b="0"/>
+      </a:fillRef>
+      <a:effectRef idx="0">
+        <a:scrgbClr r="0" g="0" b="0"/>
+      </a:effectRef>
+      <a:fontRef idx="minor">
+        <a:schemeClr val="tx1"/>
+      </a:fontRef>
+    </dgm:style>
+  </dgm:styleLbl>
+  <dgm:styleLbl name="alignNode1">
+    <dgm:scene3d>
+      <a:camera prst="orthographicFront"/>
+      <a:lightRig rig="threePt" dir="t"/>
+    </dgm:scene3d>
+    <dgm:sp3d/>
+    <dgm:txPr/>
+    <dgm:style>
+      <a:lnRef idx="2">
+        <a:scrgbClr r="0" g="0" b="0"/>
+      </a:lnRef>
+      <a:fillRef idx="1">
+        <a:scrgbClr r="0" g="0" b="0"/>
+      </a:fillRef>
+      <a:effectRef idx="0">
+        <a:scrgbClr r="0" g="0" b="0"/>
+      </a:effectRef>
+      <a:fontRef idx="minor">
+        <a:schemeClr val="lt1"/>
+      </a:fontRef>
+    </dgm:style>
+  </dgm:styleLbl>
+  <dgm:styleLbl name="node1">
+    <dgm:scene3d>
+      <a:camera prst="orthographicFront"/>
+      <a:lightRig rig="threePt" dir="t"/>
+    </dgm:scene3d>
+    <dgm:sp3d/>
+    <dgm:txPr/>
+    <dgm:style>
+      <a:lnRef idx="2">
+        <a:scrgbClr r="0" g="0" b="0"/>
+      </a:lnRef>
+      <a:fillRef idx="1">
+        <a:scrgbClr r="0" g="0" b="0"/>
+      </a:fillRef>
+      <a:effectRef idx="0">
+        <a:scrgbClr r="0" g="0" b="0"/>
+      </a:effectRef>
+      <a:fontRef idx="minor">
+        <a:schemeClr val="lt1"/>
+      </a:fontRef>
+    </dgm:style>
+  </dgm:styleLbl>
+  <dgm:styleLbl name="node2">
+    <dgm:scene3d>
+      <a:camera prst="orthographicFront"/>
+      <a:lightRig rig="threePt" dir="t"/>
+    </dgm:scene3d>
+    <dgm:sp3d/>
+    <dgm:txPr/>
+    <dgm:style>
+      <a:lnRef idx="2">
+        <a:scrgbClr r="0" g="0" b="0"/>
+      </a:lnRef>
+      <a:fillRef idx="1">
+        <a:scrgbClr r="0" g="0" b="0"/>
+      </a:fillRef>
+      <a:effectRef idx="0">
+        <a:scrgbClr r="0" g="0" b="0"/>
+      </a:effectRef>
+      <a:fontRef idx="minor">
+        <a:schemeClr val="lt1"/>
+      </a:fontRef>
+    </dgm:style>
+  </dgm:styleLbl>
+  <dgm:styleLbl name="node3">
+    <dgm:scene3d>
+      <a:camera prst="orthographicFront"/>
+      <a:lightRig rig="threePt" dir="t"/>
+    </dgm:scene3d>
+    <dgm:sp3d/>
+    <dgm:txPr/>
+    <dgm:style>
+      <a:lnRef idx="2">
+        <a:scrgbClr r="0" g="0" b="0"/>
+      </a:lnRef>
+      <a:fillRef idx="1">
+        <a:scrgbClr r="0" g="0" b="0"/>
+      </a:fillRef>
+      <a:effectRef idx="0">
+        <a:scrgbClr r="0" g="0" b="0"/>
+      </a:effectRef>
+      <a:fontRef idx="minor">
+        <a:schemeClr val="lt1"/>
+      </a:fontRef>
+    </dgm:style>
+  </dgm:styleLbl>
+  <dgm:styleLbl name="node4">
+    <dgm:scene3d>
+      <a:camera prst="orthographicFront"/>
+      <a:lightRig rig="threePt" dir="t"/>
+    </dgm:scene3d>
+    <dgm:sp3d/>
+    <dgm:txPr/>
+    <dgm:style>
+      <a:lnRef idx="2">
+        <a:scrgbClr r="0" g="0" b="0"/>
+      </a:lnRef>
+      <a:fillRef idx="1">
+        <a:scrgbClr r="0" g="0" b="0"/>
+      </a:fillRef>
+      <a:effectRef idx="0">
+        <a:scrgbClr r="0" g="0" b="0"/>
+      </a:effectRef>
+      <a:fontRef idx="minor">
+        <a:schemeClr val="lt1"/>
+      </a:fontRef>
+    </dgm:style>
+  </dgm:styleLbl>
+  <dgm:styleLbl name="fgImgPlace1">
+    <dgm:scene3d>
+      <a:camera prst="orthographicFront"/>
+      <a:lightRig rig="threePt" dir="t"/>
+    </dgm:scene3d>
+    <dgm:sp3d/>
+    <dgm:txPr/>
+    <dgm:style>
+      <a:lnRef idx="2">
+        <a:scrgbClr r="0" g="0" b="0"/>
+      </a:lnRef>
+      <a:fillRef idx="1">
+        <a:scrgbClr r="0" g="0" b="0"/>
+      </a:fillRef>
+      <a:effectRef idx="0">
+        <a:scrgbClr r="0" g="0" b="0"/>
+      </a:effectRef>
+      <a:fontRef idx="minor"/>
+    </dgm:style>
+  </dgm:styleLbl>
+  <dgm:styleLbl name="alignImgPlace1">
+    <dgm:scene3d>
+      <a:camera prst="orthographicFront"/>
+      <a:lightRig rig="threePt" dir="t"/>
+    </dgm:scene3d>
+    <dgm:sp3d/>
+    <dgm:txPr/>
+    <dgm:style>
+      <a:lnRef idx="2">
+        <a:scrgbClr r="0" g="0" b="0"/>
+      </a:lnRef>
+      <a:fillRef idx="1">
+        <a:scrgbClr r="0" g="0" b="0"/>
+      </a:fillRef>
+      <a:effectRef idx="0">
+        <a:scrgbClr r="0" g="0" b="0"/>
+      </a:effectRef>
+      <a:fontRef idx="minor"/>
+    </dgm:style>
+  </dgm:styleLbl>
+  <dgm:styleLbl name="bgImgPlace1">
+    <dgm:scene3d>
+      <a:camera prst="orthographicFront"/>
+      <a:lightRig rig="threePt" dir="t"/>
+    </dgm:scene3d>
+    <dgm:sp3d/>
+    <dgm:txPr/>
+    <dgm:style>
+      <a:lnRef idx="2">
+        <a:scrgbClr r="0" g="0" b="0"/>
+      </a:lnRef>
+      <a:fillRef idx="1">
+        <a:scrgbClr r="0" g="0" b="0"/>
+      </a:fillRef>
+      <a:effectRef idx="0">
+        <a:scrgbClr r="0" g="0" b="0"/>
+      </a:effectRef>
+      <a:fontRef idx="minor"/>
+    </dgm:style>
+  </dgm:styleLbl>
+  <dgm:styleLbl name="sibTrans2D1">
+    <dgm:scene3d>
+      <a:camera prst="orthographicFront"/>
+      <a:lightRig rig="threePt" dir="t"/>
+    </dgm:scene3d>
+    <dgm:sp3d/>
+    <dgm:txPr/>
+    <dgm:style>
+      <a:lnRef idx="0">
+        <a:scrgbClr r="0" g="0" b="0"/>
+      </a:lnRef>
+      <a:fillRef idx="1">
+        <a:scrgbClr r="0" g="0" b="0"/>
+      </a:fillRef>
+      <a:effectRef idx="0">
+        <a:scrgbClr r="0" g="0" b="0"/>
+      </a:effectRef>
+      <a:fontRef idx="minor">
+        <a:schemeClr val="lt1"/>
+      </a:fontRef>
+    </dgm:style>
+  </dgm:styleLbl>
+  <dgm:styleLbl name="fgSibTrans2D1">
+    <dgm:scene3d>
+      <a:camera prst="orthographicFront"/>
+      <a:lightRig rig="threePt" dir="t"/>
+    </dgm:scene3d>
+    <dgm:sp3d/>
+    <dgm:txPr/>
+    <dgm:style>
+      <a:lnRef idx="0">
+        <a:scrgbClr r="0" g="0" b="0"/>
+      </a:lnRef>
+      <a:fillRef idx="1">
+        <a:scrgbClr r="0" g="0" b="0"/>
+      </a:fillRef>
+      <a:effectRef idx="0">
+        <a:scrgbClr r="0" g="0" b="0"/>
+      </a:effectRef>
+      <a:fontRef idx="minor">
+        <a:schemeClr val="lt1"/>
+      </a:fontRef>
+    </dgm:style>
+  </dgm:styleLbl>
+  <dgm:styleLbl name="bgSibTrans2D1">
+    <dgm:scene3d>
+      <a:camera prst="orthographicFront"/>
+      <a:lightRig rig="threePt" dir="t"/>
+    </dgm:scene3d>
+    <dgm:sp3d/>
+    <dgm:txPr/>
+    <dgm:style>
+      <a:lnRef idx="0">
+        <a:scrgbClr r="0" g="0" b="0"/>
+      </a:lnRef>
+      <a:fillRef idx="1">
+        <a:scrgbClr r="0" g="0" b="0"/>
+      </a:fillRef>
+      <a:effectRef idx="0">
+        <a:scrgbClr r="0" g="0" b="0"/>
+      </a:effectRef>
+      <a:fontRef idx="minor">
+        <a:schemeClr val="lt1"/>
+      </a:fontRef>
+    </dgm:style>
+  </dgm:styleLbl>
+  <dgm:styleLbl name="sibTrans1D1">
+    <dgm:scene3d>
+      <a:camera prst="orthographicFront"/>
+      <a:lightRig rig="threePt" dir="t"/>
+    </dgm:scene3d>
+    <dgm:sp3d/>
+    <dgm:txPr/>
+    <dgm:style>
+      <a:lnRef idx="1">
+        <a:scrgbClr r="0" g="0" b="0"/>
+      </a:lnRef>
+      <a:fillRef idx="0">
+        <a:scrgbClr r="0" g="0" b="0"/>
+      </a:fillRef>
+      <a:effectRef idx="0">
+        <a:scrgbClr r="0" g="0" b="0"/>
+      </a:effectRef>
+      <a:fontRef idx="minor"/>
+    </dgm:style>
+  </dgm:styleLbl>
+  <dgm:styleLbl name="callout">
+    <dgm:scene3d>
+      <a:camera prst="orthographicFront"/>
+      <a:lightRig rig="threePt" dir="t"/>
+    </dgm:scene3d>
+    <dgm:sp3d/>
+    <dgm:txPr/>
+    <dgm:style>
+      <a:lnRef idx="2">
+        <a:scrgbClr r="0" g="0" b="0"/>
+      </a:lnRef>
+      <a:fillRef idx="1">
+        <a:scrgbClr r="0" g="0" b="0"/>
+      </a:fillRef>
+      <a:effectRef idx="0">
+        <a:scrgbClr r="0" g="0" b="0"/>
+      </a:effectRef>
+      <a:fontRef idx="minor"/>
+    </dgm:style>
+  </dgm:styleLbl>
+  <dgm:styleLbl name="asst0">
+    <dgm:scene3d>
+      <a:camera prst="orthographicFront"/>
+      <a:lightRig rig="threePt" dir="t"/>
+    </dgm:scene3d>
+    <dgm:sp3d/>
+    <dgm:txPr/>
+    <dgm:style>
+      <a:lnRef idx="2">
+        <a:scrgbClr r="0" g="0" b="0"/>
+      </a:lnRef>
+      <a:fillRef idx="1">
+        <a:scrgbClr r="0" g="0" b="0"/>
+      </a:fillRef>
+      <a:effectRef idx="0">
+        <a:scrgbClr r="0" g="0" b="0"/>
+      </a:effectRef>
+      <a:fontRef idx="minor">
+        <a:schemeClr val="lt1"/>
+      </a:fontRef>
+    </dgm:style>
+  </dgm:styleLbl>
+  <dgm:styleLbl name="asst1">
+    <dgm:scene3d>
+      <a:camera prst="orthographicFront"/>
+      <a:lightRig rig="threePt" dir="t"/>
+    </dgm:scene3d>
+    <dgm:sp3d/>
+    <dgm:txPr/>
+    <dgm:style>
+      <a:lnRef idx="2">
+        <a:scrgbClr r="0" g="0" b="0"/>
+      </a:lnRef>
+      <a:fillRef idx="1">
+        <a:scrgbClr r="0" g="0" b="0"/>
+      </a:fillRef>
+      <a:effectRef idx="0">
+        <a:scrgbClr r="0" g="0" b="0"/>
+      </a:effectRef>
+      <a:fontRef idx="minor">
+        <a:schemeClr val="lt1"/>
+      </a:fontRef>
+    </dgm:style>
+  </dgm:styleLbl>
+  <dgm:styleLbl name="asst2">
+    <dgm:scene3d>
+      <a:camera prst="orthographicFront"/>
+      <a:lightRig rig="threePt" dir="t"/>
+    </dgm:scene3d>
+    <dgm:sp3d/>
+    <dgm:txPr/>
+    <dgm:style>
+      <a:lnRef idx="2">
+        <a:scrgbClr r="0" g="0" b="0"/>
+      </a:lnRef>
+      <a:fillRef idx="1">
+        <a:scrgbClr r="0" g="0" b="0"/>
+      </a:fillRef>
+      <a:effectRef idx="0">
+        <a:scrgbClr r="0" g="0" b="0"/>
+      </a:effectRef>
+      <a:fontRef idx="minor">
+        <a:schemeClr val="lt1"/>
+      </a:fontRef>
+    </dgm:style>
+  </dgm:styleLbl>
+  <dgm:styleLbl name="asst3">
+    <dgm:scene3d>
+      <a:camera prst="orthographicFront"/>
+      <a:lightRig rig="threePt" dir="t"/>
+    </dgm:scene3d>
+    <dgm:sp3d/>
+    <dgm:txPr/>
+    <dgm:style>
+      <a:lnRef idx="2">
+        <a:scrgbClr r="0" g="0" b="0"/>
+      </a:lnRef>
+      <a:fillRef idx="1">
+        <a:scrgbClr r="0" g="0" b="0"/>
+      </a:fillRef>
+      <a:effectRef idx="0">
+        <a:scrgbClr r="0" g="0" b="0"/>
+      </a:effectRef>
+      <a:fontRef idx="minor">
+        <a:schemeClr val="lt1"/>
+      </a:fontRef>
+    </dgm:style>
+  </dgm:styleLbl>
+  <dgm:styleLbl name="asst4">
+    <dgm:scene3d>
+      <a:camera prst="orthographicFront"/>
+      <a:lightRig rig="threePt" dir="t"/>
+    </dgm:scene3d>
+    <dgm:sp3d/>
+    <dgm:txPr/>
+    <dgm:style>
+      <a:lnRef idx="2">
+        <a:scrgbClr r="0" g="0" b="0"/>
+      </a:lnRef>
+      <a:fillRef idx="1">
+        <a:scrgbClr r="0" g="0" b="0"/>
+      </a:fillRef>
+      <a:effectRef idx="0">
+        <a:scrgbClr r="0" g="0" b="0"/>
+      </a:effectRef>
+      <a:fontRef idx="minor">
+        <a:schemeClr val="lt1"/>
+      </a:fontRef>
+    </dgm:style>
+  </dgm:styleLbl>
+  <dgm:styleLbl name="parChTrans2D1">
+    <dgm:scene3d>
+      <a:camera prst="orthographicFront"/>
+      <a:lightRig rig="threePt" dir="t"/>
+    </dgm:scene3d>
+    <dgm:sp3d/>
+    <dgm:txPr/>
+    <dgm:style>
+      <a:lnRef idx="2">
+        <a:scrgbClr r="0" g="0" b="0"/>
+      </a:lnRef>
+      <a:fillRef idx="1">
+        <a:scrgbClr r="0" g="0" b="0"/>
+      </a:fillRef>
+      <a:effectRef idx="0">
+        <a:scrgbClr r="0" g="0" b="0"/>
+      </a:effectRef>
+      <a:fontRef idx="minor">
+        <a:schemeClr val="lt1"/>
+      </a:fontRef>
+    </dgm:style>
+  </dgm:styleLbl>
+  <dgm:styleLbl name="parChTrans2D2">
+    <dgm:scene3d>
+      <a:camera prst="orthographicFront"/>
+      <a:lightRig rig="threePt" dir="t"/>
+    </dgm:scene3d>
+    <dgm:sp3d/>
+    <dgm:txPr/>
+    <dgm:style>
+      <a:lnRef idx="2">
+        <a:scrgbClr r="0" g="0" b="0"/>
+      </a:lnRef>
+      <a:fillRef idx="1">
+        <a:scrgbClr r="0" g="0" b="0"/>
+      </a:fillRef>
+      <a:effectRef idx="0">
+        <a:scrgbClr r="0" g="0" b="0"/>
+      </a:effectRef>
+      <a:fontRef idx="minor">
+        <a:schemeClr val="lt1"/>
+      </a:fontRef>
+    </dgm:style>
+  </dgm:styleLbl>
+  <dgm:styleLbl name="parChTrans2D3">
+    <dgm:scene3d>
+      <a:camera prst="orthographicFront"/>
+      <a:lightRig rig="threePt" dir="t"/>
+    </dgm:scene3d>
+    <dgm:sp3d/>
+    <dgm:txPr/>
+    <dgm:style>
+      <a:lnRef idx="2">
+        <a:scrgbClr r="0" g="0" b="0"/>
+      </a:lnRef>
+      <a:fillRef idx="1">
+        <a:scrgbClr r="0" g="0" b="0"/>
+      </a:fillRef>
+      <a:effectRef idx="0">
+        <a:scrgbClr r="0" g="0" b="0"/>
+      </a:effectRef>
+      <a:fontRef idx="minor">
+        <a:schemeClr val="lt1"/>
+      </a:fontRef>
+    </dgm:style>
+  </dgm:styleLbl>
+  <dgm:styleLbl name="parChTrans2D4">
+    <dgm:scene3d>
+      <a:camera prst="orthographicFront"/>
+      <a:lightRig rig="threePt" dir="t"/>
+    </dgm:scene3d>
+    <dgm:sp3d/>
+    <dgm:txPr/>
+    <dgm:style>
+      <a:lnRef idx="2">
+        <a:scrgbClr r="0" g="0" b="0"/>
+      </a:lnRef>
+      <a:fillRef idx="1">
+        <a:scrgbClr r="0" g="0" b="0"/>
+      </a:fillRef>
+      <a:effectRef idx="0">
+        <a:scrgbClr r="0" g="0" b="0"/>
+      </a:effectRef>
+      <a:fontRef idx="minor">
+        <a:schemeClr val="lt1"/>
+      </a:fontRef>
+    </dgm:style>
+  </dgm:styleLbl>
+  <dgm:styleLbl name="parChTrans1D1">
+    <dgm:scene3d>
+      <a:camera prst="orthographicFront"/>
+      <a:lightRig rig="threePt" dir="t"/>
+    </dgm:scene3d>
+    <dgm:sp3d/>
+    <dgm:txPr/>
+    <dgm:style>
+      <a:lnRef idx="2">
+        <a:scrgbClr r="0" g="0" b="0"/>
+      </a:lnRef>
+      <a:fillRef idx="0">
+        <a:scrgbClr r="0" g="0" b="0"/>
+      </a:fillRef>
+      <a:effectRef idx="0">
+        <a:scrgbClr r="0" g="0" b="0"/>
+      </a:effectRef>
+      <a:fontRef idx="minor"/>
+    </dgm:style>
+  </dgm:styleLbl>
+  <dgm:styleLbl name="parChTrans1D2">
+    <dgm:scene3d>
+      <a:camera prst="orthographicFront"/>
+      <a:lightRig rig="threePt" dir="t"/>
+    </dgm:scene3d>
+    <dgm:sp3d/>
+    <dgm:txPr/>
+    <dgm:style>
+      <a:lnRef idx="2">
+        <a:scrgbClr r="0" g="0" b="0"/>
+      </a:lnRef>
+      <a:fillRef idx="0">
+        <a:scrgbClr r="0" g="0" b="0"/>
+      </a:fillRef>
+      <a:effectRef idx="0">
+        <a:scrgbClr r="0" g="0" b="0"/>
+      </a:effectRef>
+      <a:fontRef idx="minor"/>
+    </dgm:style>
+  </dgm:styleLbl>
+  <dgm:styleLbl name="parChTrans1D3">
+    <dgm:scene3d>
+      <a:camera prst="orthographicFront"/>
+      <a:lightRig rig="threePt" dir="t"/>
+    </dgm:scene3d>
+    <dgm:sp3d/>
+    <dgm:txPr/>
+    <dgm:style>
+      <a:lnRef idx="2">
+        <a:scrgbClr r="0" g="0" b="0"/>
+      </a:lnRef>
+      <a:fillRef idx="0">
+        <a:scrgbClr r="0" g="0" b="0"/>
+      </a:fillRef>
+      <a:effectRef idx="0">
+        <a:scrgbClr r="0" g="0" b="0"/>
+      </a:effectRef>
+      <a:fontRef idx="minor"/>
+    </dgm:style>
+  </dgm:styleLbl>
+  <dgm:styleLbl name="parChTrans1D4">
+    <dgm:scene3d>
+      <a:camera prst="orthographicFront"/>
+      <a:lightRig rig="threePt" dir="t"/>
+    </dgm:scene3d>
+    <dgm:sp3d/>
+    <dgm:txPr/>
+    <dgm:style>
+      <a:lnRef idx="2">
+        <a:scrgbClr r="0" g="0" b="0"/>
+      </a:lnRef>
+      <a:fillRef idx="0">
+        <a:scrgbClr r="0" g="0" b="0"/>
+      </a:fillRef>
+      <a:effectRef idx="0">
+        <a:scrgbClr r="0" g="0" b="0"/>
+      </a:effectRef>
+      <a:fontRef idx="minor"/>
+    </dgm:style>
+  </dgm:styleLbl>
+  <dgm:styleLbl name="fgAcc1">
+    <dgm:scene3d>
+      <a:camera prst="orthographicFront"/>
+      <a:lightRig rig="threePt" dir="t"/>
+    </dgm:scene3d>
+    <dgm:sp3d/>
+    <dgm:txPr/>
+    <dgm:style>
+      <a:lnRef idx="2">
+        <a:scrgbClr r="0" g="0" b="0"/>
+      </a:lnRef>
+      <a:fillRef idx="1">
+        <a:scrgbClr r="0" g="0" b="0"/>
+      </a:fillRef>
+      <a:effectRef idx="0">
+        <a:scrgbClr r="0" g="0" b="0"/>
+      </a:effectRef>
+      <a:fontRef idx="minor"/>
+    </dgm:style>
+  </dgm:styleLbl>
+  <dgm:styleLbl name="conFgAcc1">
+    <dgm:scene3d>
+      <a:camera prst="orthographicFront"/>
+      <a:lightRig rig="threePt" dir="t"/>
+    </dgm:scene3d>
+    <dgm:sp3d/>
+    <dgm:txPr/>
+    <dgm:style>
+      <a:lnRef idx="2">
+        <a:scrgbClr r="0" g="0" b="0"/>
+      </a:lnRef>
+      <a:fillRef idx="1">
+        <a:scrgbClr r="0" g="0" b="0"/>
+      </a:fillRef>
+      <a:effectRef idx="0">
+        <a:scrgbClr r="0" g="0" b="0"/>
+      </a:effectRef>
+      <a:fontRef idx="minor"/>
+    </dgm:style>
+  </dgm:styleLbl>
+  <dgm:styleLbl name="alignAcc1">
+    <dgm:scene3d>
+      <a:camera prst="orthographicFront"/>
+      <a:lightRig rig="threePt" dir="t"/>
+    </dgm:scene3d>
+    <dgm:sp3d/>
+    <dgm:txPr/>
+    <dgm:style>
+      <a:lnRef idx="2">
+        <a:scrgbClr r="0" g="0" b="0"/>
+      </a:lnRef>
+      <a:fillRef idx="1">
+        <a:scrgbClr r="0" g="0" b="0"/>
+      </a:fillRef>
+      <a:effectRef idx="0">
+        <a:scrgbClr r="0" g="0" b="0"/>
+      </a:effectRef>
+      <a:fontRef idx="minor"/>
+    </dgm:style>
+  </dgm:styleLbl>
+  <dgm:styleLbl name="trAlignAcc1">
+    <dgm:scene3d>
+      <a:camera prst="orthographicFront"/>
+      <a:lightRig rig="threePt" dir="t"/>
+    </dgm:scene3d>
+    <dgm:sp3d/>
+    <dgm:txPr/>
+    <dgm:style>
+      <a:lnRef idx="1">
+        <a:scrgbClr r="0" g="0" b="0"/>
+      </a:lnRef>
+      <a:fillRef idx="1">
+        <a:scrgbClr r="0" g="0" b="0"/>
+      </a:fillRef>
+      <a:effectRef idx="0">
+        <a:scrgbClr r="0" g="0" b="0"/>
+      </a:effectRef>
+      <a:fontRef idx="minor"/>
+    </dgm:style>
+  </dgm:styleLbl>
+  <dgm:styleLbl name="bgAcc1">
+    <dgm:scene3d>
+      <a:camera prst="orthographicFront"/>
+      <a:lightRig rig="threePt" dir="t"/>
+    </dgm:scene3d>
+    <dgm:sp3d/>
+    <dgm:txPr/>
+    <dgm:style>
+      <a:lnRef idx="2">
+        <a:scrgbClr r="0" g="0" b="0"/>
+      </a:lnRef>
+      <a:fillRef idx="1">
+        <a:scrgbClr r="0" g="0" b="0"/>
+      </a:fillRef>
+      <a:effectRef idx="0">
+        <a:scrgbClr r="0" g="0" b="0"/>
+      </a:effectRef>
+      <a:fontRef idx="minor"/>
+    </dgm:style>
+  </dgm:styleLbl>
+  <dgm:styleLbl name="solidFgAcc1">
+    <dgm:scene3d>
+      <a:camera prst="orthographicFront"/>
+      <a:lightRig rig="threePt" dir="t"/>
+    </dgm:scene3d>
+    <dgm:sp3d/>
+    <dgm:txPr/>
+    <dgm:style>
+      <a:lnRef idx="2">
+        <a:scrgbClr r="0" g="0" b="0"/>
+      </a:lnRef>
+      <a:fillRef idx="1">
+        <a:scrgbClr r="0" g="0" b="0"/>
+      </a:fillRef>
+      <a:effectRef idx="0">
+        <a:scrgbClr r="0" g="0" b="0"/>
+      </a:effectRef>
+      <a:fontRef idx="minor"/>
+    </dgm:style>
+  </dgm:styleLbl>
+  <dgm:styleLbl name="solidAlignAcc1">
+    <dgm:scene3d>
+      <a:camera prst="orthographicFront"/>
+      <a:lightRig rig="threePt" dir="t"/>
+    </dgm:scene3d>
+    <dgm:sp3d/>
+    <dgm:txPr/>
+    <dgm:style>
+      <a:lnRef idx="2">
+        <a:scrgbClr r="0" g="0" b="0"/>
+      </a:lnRef>
+      <a:fillRef idx="1">
+        <a:scrgbClr r="0" g="0" b="0"/>
+      </a:fillRef>
+      <a:effectRef idx="0">
+        <a:scrgbClr r="0" g="0" b="0"/>
+      </a:effectRef>
+      <a:fontRef idx="minor"/>
+    </dgm:style>
+  </dgm:styleLbl>
+  <dgm:styleLbl name="solidBgAcc1">
+    <dgm:scene3d>
+      <a:camera prst="orthographicFront"/>
+      <a:lightRig rig="threePt" dir="t"/>
+    </dgm:scene3d>
+    <dgm:sp3d/>
+    <dgm:txPr/>
+    <dgm:style>
+      <a:lnRef idx="2">
+        <a:scrgbClr r="0" g="0" b="0"/>
+      </a:lnRef>
+      <a:fillRef idx="1">
+        <a:scrgbClr r="0" g="0" b="0"/>
+      </a:fillRef>
+      <a:effectRef idx="0">
+        <a:scrgbClr r="0" g="0" b="0"/>
+      </a:effectRef>
+      <a:fontRef idx="minor"/>
+    </dgm:style>
+  </dgm:styleLbl>
+  <dgm:styleLbl name="fgAccFollowNode1">
+    <dgm:scene3d>
+      <a:camera prst="orthographicFront"/>
+      <a:lightRig rig="threePt" dir="t"/>
+    </dgm:scene3d>
+    <dgm:sp3d/>
+    <dgm:txPr/>
+    <dgm:style>
+      <a:lnRef idx="2">
+        <a:scrgbClr r="0" g="0" b="0"/>
+      </a:lnRef>
+      <a:fillRef idx="1">
+        <a:scrgbClr r="0" g="0" b="0"/>
+      </a:fillRef>
+      <a:effectRef idx="0">
+        <a:scrgbClr r="0" g="0" b="0"/>
+      </a:effectRef>
+      <a:fontRef idx="minor"/>
+    </dgm:style>
+  </dgm:styleLbl>
+  <dgm:styleLbl name="alignAccFollowNode1">
+    <dgm:scene3d>
+      <a:camera prst="orthographicFront"/>
+      <a:lightRig rig="threePt" dir="t"/>
+    </dgm:scene3d>
+    <dgm:sp3d/>
+    <dgm:txPr/>
+    <dgm:style>
+      <a:lnRef idx="2">
+        <a:scrgbClr r="0" g="0" b="0"/>
+      </a:lnRef>
+      <a:fillRef idx="1">
+        <a:scrgbClr r="0" g="0" b="0"/>
+      </a:fillRef>
+      <a:effectRef idx="0">
+        <a:scrgbClr r="0" g="0" b="0"/>
+      </a:effectRef>
+      <a:fontRef idx="minor"/>
+    </dgm:style>
+  </dgm:styleLbl>
+  <dgm:styleLbl name="bgAccFollowNode1">
+    <dgm:scene3d>
+      <a:camera prst="orthographicFront"/>
+      <a:lightRig rig="threePt" dir="t"/>
+    </dgm:scene3d>
+    <dgm:sp3d/>
+    <dgm:txPr/>
+    <dgm:style>
+      <a:lnRef idx="2">
+        <a:scrgbClr r="0" g="0" b="0"/>
+      </a:lnRef>
+      <a:fillRef idx="1">
+        <a:scrgbClr r="0" g="0" b="0"/>
+      </a:fillRef>
+      <a:effectRef idx="0">
+        <a:scrgbClr r="0" g="0" b="0"/>
+      </a:effectRef>
+      <a:fontRef idx="minor"/>
+    </dgm:style>
+  </dgm:styleLbl>
+  <dgm:styleLbl name="fgAcc0">
+    <dgm:scene3d>
+      <a:camera prst="orthographicFront"/>
+      <a:lightRig rig="threePt" dir="t"/>
+    </dgm:scene3d>
+    <dgm:sp3d/>
+    <dgm:txPr/>
+    <dgm:style>
+      <a:lnRef idx="2">
+        <a:scrgbClr r="0" g="0" b="0"/>
+      </a:lnRef>
+      <a:fillRef idx="1">
+        <a:scrgbClr r="0" g="0" b="0"/>
+      </a:fillRef>
+      <a:effectRef idx="0">
+        <a:scrgbClr r="0" g="0" b="0"/>
+      </a:effectRef>
+      <a:fontRef idx="minor"/>
+    </dgm:style>
+  </dgm:styleLbl>
+  <dgm:styleLbl name="fgAcc2">
+    <dgm:scene3d>
+      <a:camera prst="orthographicFront"/>
+      <a:lightRig rig="threePt" dir="t"/>
+    </dgm:scene3d>
+    <dgm:sp3d/>
+    <dgm:txPr/>
+    <dgm:style>
+      <a:lnRef idx="2">
+        <a:scrgbClr r="0" g="0" b="0"/>
+      </a:lnRef>
+      <a:fillRef idx="1">
+        <a:scrgbClr r="0" g="0" b="0"/>
+      </a:fillRef>
+      <a:effectRef idx="0">
+        <a:scrgbClr r="0" g="0" b="0"/>
+      </a:effectRef>
+      <a:fontRef idx="minor"/>
+    </dgm:style>
+  </dgm:styleLbl>
+  <dgm:styleLbl name="fgAcc3">
+    <dgm:scene3d>
+      <a:camera prst="orthographicFront"/>
+      <a:lightRig rig="threePt" dir="t"/>
+    </dgm:scene3d>
+    <dgm:sp3d/>
+    <dgm:txPr/>
+    <dgm:style>
+      <a:lnRef idx="2">
+        <a:scrgbClr r="0" g="0" b="0"/>
+      </a:lnRef>
+      <a:fillRef idx="1">
+        <a:scrgbClr r="0" g="0" b="0"/>
+      </a:fillRef>
+      <a:effectRef idx="0">
+        <a:scrgbClr r="0" g="0" b="0"/>
+      </a:effectRef>
+      <a:fontRef idx="minor"/>
+    </dgm:style>
+  </dgm:styleLbl>
+  <dgm:styleLbl name="fgAcc4">
+    <dgm:scene3d>
+      <a:camera prst="orthographicFront"/>
+      <a:lightRig rig="threePt" dir="t"/>
+    </dgm:scene3d>
+    <dgm:sp3d/>
+    <dgm:txPr/>
+    <dgm:style>
+      <a:lnRef idx="2">
+        <a:scrgbClr r="0" g="0" b="0"/>
+      </a:lnRef>
+      <a:fillRef idx="1">
+        <a:scrgbClr r="0" g="0" b="0"/>
+      </a:fillRef>
+      <a:effectRef idx="0">
+        <a:scrgbClr r="0" g="0" b="0"/>
+      </a:effectRef>
+      <a:fontRef idx="minor"/>
+    </dgm:style>
+  </dgm:styleLbl>
+  <dgm:styleLbl name="bgShp">
+    <dgm:scene3d>
+      <a:camera prst="orthographicFront"/>
+      <a:lightRig rig="threePt" dir="t"/>
+    </dgm:scene3d>
+    <dgm:sp3d/>
+    <dgm:txPr/>
+    <dgm:style>
+      <a:lnRef idx="0">
+        <a:scrgbClr r="0" g="0" b="0"/>
+      </a:lnRef>
+      <a:fillRef idx="1">
+        <a:scrgbClr r="0" g="0" b="0"/>
+      </a:fillRef>
+      <a:effectRef idx="0">
+        <a:scrgbClr r="0" g="0" b="0"/>
+      </a:effectRef>
+      <a:fontRef idx="minor"/>
+    </dgm:style>
+  </dgm:styleLbl>
+  <dgm:styleLbl name="dkBgShp">
+    <dgm:scene3d>
+      <a:camera prst="orthographicFront"/>
+      <a:lightRig rig="threePt" dir="t"/>
+    </dgm:scene3d>
+    <dgm:sp3d/>
+    <dgm:txPr/>
+    <dgm:style>
+      <a:lnRef idx="0">
+        <a:scrgbClr r="0" g="0" b="0"/>
+      </a:lnRef>
+      <a:fillRef idx="1">
+        <a:scrgbClr r="0" g="0" b="0"/>
+      </a:fillRef>
+      <a:effectRef idx="0">
+        <a:scrgbClr r="0" g="0" b="0"/>
+      </a:effectRef>
+      <a:fontRef idx="minor"/>
+    </dgm:style>
+  </dgm:styleLbl>
+  <dgm:styleLbl name="trBgShp">
+    <dgm:scene3d>
+      <a:camera prst="orthographicFront"/>
+      <a:lightRig rig="threePt" dir="t"/>
+    </dgm:scene3d>
+    <dgm:sp3d/>
+    <dgm:txPr/>
+    <dgm:style>
+      <a:lnRef idx="0">
+        <a:scrgbClr r="0" g="0" b="0"/>
+      </a:lnRef>
+      <a:fillRef idx="1">
+        <a:scrgbClr r="0" g="0" b="0"/>
+      </a:fillRef>
+      <a:effectRef idx="0">
+        <a:scrgbClr r="0" g="0" b="0"/>
+      </a:effectRef>
+      <a:fontRef idx="minor"/>
+    </dgm:style>
+  </dgm:styleLbl>
+  <dgm:styleLbl name="fgShp">
+    <dgm:scene3d>
+      <a:camera prst="orthographicFront"/>
+      <a:lightRig rig="threePt" dir="t"/>
+    </dgm:scene3d>
+    <dgm:sp3d/>
+    <dgm:txPr/>
+    <dgm:style>
+      <a:lnRef idx="2">
+        <a:scrgbClr r="0" g="0" b="0"/>
+      </a:lnRef>
+      <a:fillRef idx="1">
+        <a:scrgbClr r="0" g="0" b="0"/>
+      </a:fillRef>
+      <a:effectRef idx="0">
+        <a:scrgbClr r="0" g="0" b="0"/>
+      </a:effectRef>
+      <a:fontRef idx="minor"/>
+    </dgm:style>
+  </dgm:styleLbl>
+  <dgm:styleLbl name="revTx">
+    <dgm:scene3d>
+      <a:camera prst="orthographicFront"/>
+      <a:lightRig rig="threePt" dir="t"/>
+    </dgm:scene3d>
+    <dgm:sp3d/>
+    <dgm:txPr/>
+    <dgm:style>
+      <a:lnRef idx="0">
+        <a:scrgbClr r="0" g="0" b="0"/>
+      </a:lnRef>
+      <a:fillRef idx="0">
+        <a:scrgbClr r="0" g="0" b="0"/>
+      </a:fillRef>
+      <a:effectRef idx="0">
+        <a:scrgbClr r="0" g="0" b="0"/>
+      </a:effectRef>
+      <a:fontRef idx="minor"/>
+    </dgm:style>
+  </dgm:styleLbl>
+</dgm:styleDef>
 </file>
 
 <file path=ppt/notesMasters/notesMaster1.xml><?xml version="1.0" encoding="utf-8"?>
@@ -838,114 +3953,6 @@
   <p:cSld>
     <p:spTree>
       <p:nvGrpSpPr>
-        <p:cNvPr id="1" name="Shape 146"/>
-        <p:cNvGrpSpPr/>
-        <p:nvPr/>
-      </p:nvGrpSpPr>
-      <p:grpSpPr>
-        <a:xfrm>
-          <a:off x="0" y="0"/>
-          <a:ext cx="0" cy="0"/>
-          <a:chOff x="0" y="0"/>
-          <a:chExt cx="0" cy="0"/>
-        </a:xfrm>
-      </p:grpSpPr>
-      <p:sp>
-        <p:nvSpPr>
-          <p:cNvPr id="147" name="Shape 147"/>
-          <p:cNvSpPr txBox="1">
-            <a:spLocks noGrp="1"/>
-          </p:cNvSpPr>
-          <p:nvPr>
-            <p:ph type="body" idx="1"/>
-          </p:nvPr>
-        </p:nvSpPr>
-        <p:spPr>
-          <a:xfrm>
-            <a:off x="685800" y="4343400"/>
-            <a:ext cx="5486400" cy="4114800"/>
-          </a:xfrm>
-          <a:prstGeom prst="rect">
-            <a:avLst/>
-          </a:prstGeom>
-          <a:noFill/>
-          <a:ln>
-            <a:noFill/>
-          </a:ln>
-        </p:spPr>
-        <p:txBody>
-          <a:bodyPr spcFirstLastPara="1" wrap="square" lIns="91425" tIns="91425" rIns="91425" bIns="91425" anchor="ctr" anchorCtr="0">
-            <a:noAutofit/>
-          </a:bodyPr>
-          <a:lstStyle/>
-          <a:p>
-            <a:pPr marL="0" lvl="0" indent="0">
-              <a:spcBef>
-                <a:spcPts val="0"/>
-              </a:spcBef>
-              <a:spcAft>
-                <a:spcPts val="0"/>
-              </a:spcAft>
-              <a:buNone/>
-            </a:pPr>
-            <a:endParaRPr/>
-          </a:p>
-        </p:txBody>
-      </p:sp>
-      <p:sp>
-        <p:nvSpPr>
-          <p:cNvPr id="148" name="Shape 148"/>
-          <p:cNvSpPr>
-            <a:spLocks noGrp="1" noRot="1" noChangeAspect="1"/>
-          </p:cNvSpPr>
-          <p:nvPr>
-            <p:ph type="sldImg" idx="2"/>
-          </p:nvPr>
-        </p:nvSpPr>
-        <p:spPr>
-          <a:xfrm>
-            <a:off x="381000" y="685800"/>
-            <a:ext cx="6096000" cy="3429000"/>
-          </a:xfrm>
-          <a:custGeom>
-            <a:avLst/>
-            <a:gdLst/>
-            <a:ahLst/>
-            <a:cxnLst/>
-            <a:rect l="0" t="0" r="0" b="0"/>
-            <a:pathLst>
-              <a:path w="120000" h="120000" extrusionOk="0">
-                <a:moveTo>
-                  <a:pt x="0" y="0"/>
-                </a:moveTo>
-                <a:lnTo>
-                  <a:pt x="120000" y="0"/>
-                </a:lnTo>
-                <a:lnTo>
-                  <a:pt x="120000" y="120000"/>
-                </a:lnTo>
-                <a:lnTo>
-                  <a:pt x="0" y="120000"/>
-                </a:lnTo>
-                <a:close/>
-              </a:path>
-            </a:pathLst>
-          </a:custGeom>
-        </p:spPr>
-      </p:sp>
-    </p:spTree>
-  </p:cSld>
-  <p:clrMapOvr>
-    <a:masterClrMapping/>
-  </p:clrMapOvr>
-</p:notes>
-</file>
-
-<file path=ppt/notesSlides/notesSlide3.xml><?xml version="1.0" encoding="utf-8"?>
-<p:notes xmlns:a="http://schemas.openxmlformats.org/drawingml/2006/main" xmlns:r="http://schemas.openxmlformats.org/officeDocument/2006/relationships" xmlns:p="http://schemas.openxmlformats.org/presentationml/2006/main" showMasterSp="0" showMasterPhAnim="0">
-  <p:cSld>
-    <p:spTree>
-      <p:nvGrpSpPr>
         <p:cNvPr id="1" name="Shape 159"/>
         <p:cNvGrpSpPr/>
         <p:nvPr/>
@@ -1045,7 +4052,7 @@
 </p:notes>
 </file>
 
-<file path=ppt/notesSlides/notesSlide4.xml><?xml version="1.0" encoding="utf-8"?>
+<file path=ppt/notesSlides/notesSlide3.xml><?xml version="1.0" encoding="utf-8"?>
 <p:notes xmlns:a="http://schemas.openxmlformats.org/drawingml/2006/main" xmlns:r="http://schemas.openxmlformats.org/officeDocument/2006/relationships" xmlns:p="http://schemas.openxmlformats.org/presentationml/2006/main" showMasterSp="0" showMasterPhAnim="0">
   <p:cSld>
     <p:spTree>
@@ -1149,7 +4156,7 @@
 </p:notes>
 </file>
 
-<file path=ppt/notesSlides/notesSlide5.xml><?xml version="1.0" encoding="utf-8"?>
+<file path=ppt/notesSlides/notesSlide4.xml><?xml version="1.0" encoding="utf-8"?>
 <p:notes xmlns:a="http://schemas.openxmlformats.org/drawingml/2006/main" xmlns:r="http://schemas.openxmlformats.org/officeDocument/2006/relationships" xmlns:p="http://schemas.openxmlformats.org/presentationml/2006/main" showMasterSp="0" showMasterPhAnim="0">
   <p:cSld>
     <p:spTree>
@@ -1253,7 +4260,7 @@
 </p:notes>
 </file>
 
-<file path=ppt/notesSlides/notesSlide6.xml><?xml version="1.0" encoding="utf-8"?>
+<file path=ppt/notesSlides/notesSlide5.xml><?xml version="1.0" encoding="utf-8"?>
 <p:notes xmlns:a="http://schemas.openxmlformats.org/drawingml/2006/main" xmlns:r="http://schemas.openxmlformats.org/officeDocument/2006/relationships" xmlns:p="http://schemas.openxmlformats.org/presentationml/2006/main" showMasterSp="0" showMasterPhAnim="0">
   <p:cSld>
     <p:spTree>
@@ -1357,7 +4364,7 @@
 </p:notes>
 </file>
 
-<file path=ppt/notesSlides/notesSlide7.xml><?xml version="1.0" encoding="utf-8"?>
+<file path=ppt/notesSlides/notesSlide6.xml><?xml version="1.0" encoding="utf-8"?>
 <p:notes xmlns:a="http://schemas.openxmlformats.org/drawingml/2006/main" xmlns:r="http://schemas.openxmlformats.org/officeDocument/2006/relationships" xmlns:p="http://schemas.openxmlformats.org/presentationml/2006/main" showMasterSp="0" showMasterPhAnim="0">
   <p:cSld>
     <p:spTree>
@@ -1509,7 +4516,7 @@
 </p:notes>
 </file>
 
-<file path=ppt/notesSlides/notesSlide8.xml><?xml version="1.0" encoding="utf-8"?>
+<file path=ppt/notesSlides/notesSlide7.xml><?xml version="1.0" encoding="utf-8"?>
 <p:notes xmlns:a="http://schemas.openxmlformats.org/drawingml/2006/main" xmlns:r="http://schemas.openxmlformats.org/officeDocument/2006/relationships" xmlns:p="http://schemas.openxmlformats.org/presentationml/2006/main" showMasterSp="0" showMasterPhAnim="0">
   <p:cSld>
     <p:spTree>
@@ -1613,7 +4620,7 @@
 </p:notes>
 </file>
 
-<file path=ppt/notesSlides/notesSlide9.xml><?xml version="1.0" encoding="utf-8"?>
+<file path=ppt/notesSlides/notesSlide8.xml><?xml version="1.0" encoding="utf-8"?>
 <p:notes xmlns:a="http://schemas.openxmlformats.org/drawingml/2006/main" xmlns:r="http://schemas.openxmlformats.org/officeDocument/2006/relationships" xmlns:p="http://schemas.openxmlformats.org/presentationml/2006/main" showMasterSp="0" showMasterPhAnim="0">
   <p:cSld>
     <p:spTree>
@@ -3169,7 +6176,7 @@
             </a:pPr>
             <a:fld id="{00000000-1234-1234-1234-123412341234}" type="slidenum">
               <a:rPr lang="es-ES"/>
-              <a:t>‹Nº›</a:t>
+              <a:t>‹#›</a:t>
             </a:fld>
             <a:endParaRPr/>
           </a:p>
@@ -4196,7 +7203,7 @@
             </a:pPr>
             <a:fld id="{00000000-1234-1234-1234-123412341234}" type="slidenum">
               <a:rPr lang="es-ES"/>
-              <a:t>‹Nº›</a:t>
+              <a:t>‹#›</a:t>
             </a:fld>
             <a:endParaRPr/>
           </a:p>
@@ -5462,7 +8469,7 @@
             </a:pPr>
             <a:fld id="{00000000-1234-1234-1234-123412341234}" type="slidenum">
               <a:rPr lang="es-ES"/>
-              <a:t>‹Nº›</a:t>
+              <a:t>‹#›</a:t>
             </a:fld>
             <a:endParaRPr/>
           </a:p>
@@ -6597,7 +9604,7 @@
             </a:pPr>
             <a:fld id="{00000000-1234-1234-1234-123412341234}" type="slidenum">
               <a:rPr lang="es-ES"/>
-              <a:t>‹Nº›</a:t>
+              <a:t>‹#›</a:t>
             </a:fld>
             <a:endParaRPr/>
           </a:p>
@@ -7863,7 +10870,7 @@
             </a:pPr>
             <a:fld id="{00000000-1234-1234-1234-123412341234}" type="slidenum">
               <a:rPr lang="es-ES"/>
-              <a:t>‹Nº›</a:t>
+              <a:t>‹#›</a:t>
             </a:fld>
             <a:endParaRPr/>
           </a:p>
@@ -9229,7 +12236,7 @@
             </a:pPr>
             <a:fld id="{00000000-1234-1234-1234-123412341234}" type="slidenum">
               <a:rPr lang="es-ES"/>
-              <a:t>‹Nº›</a:t>
+              <a:t>‹#›</a:t>
             </a:fld>
             <a:endParaRPr/>
           </a:p>
@@ -10256,7 +13263,7 @@
             </a:pPr>
             <a:fld id="{00000000-1234-1234-1234-123412341234}" type="slidenum">
               <a:rPr lang="es-ES"/>
-              <a:t>‹Nº›</a:t>
+              <a:t>‹#›</a:t>
             </a:fld>
             <a:endParaRPr/>
           </a:p>
@@ -11283,7 +14290,7 @@
             </a:pPr>
             <a:fld id="{00000000-1234-1234-1234-123412341234}" type="slidenum">
               <a:rPr lang="es-ES"/>
-              <a:t>‹Nº›</a:t>
+              <a:t>‹#›</a:t>
             </a:fld>
             <a:endParaRPr/>
           </a:p>
@@ -12310,7 +15317,7 @@
             </a:pPr>
             <a:fld id="{00000000-1234-1234-1234-123412341234}" type="slidenum">
               <a:rPr lang="es-ES"/>
-              <a:t>‹Nº›</a:t>
+              <a:t>‹#›</a:t>
             </a:fld>
             <a:endParaRPr/>
           </a:p>
@@ -13337,7 +16344,7 @@
             </a:pPr>
             <a:fld id="{00000000-1234-1234-1234-123412341234}" type="slidenum">
               <a:rPr lang="es-ES"/>
-              <a:t>‹Nº›</a:t>
+              <a:t>‹#›</a:t>
             </a:fld>
             <a:endParaRPr/>
           </a:p>
@@ -14603,7 +17610,7 @@
             </a:pPr>
             <a:fld id="{00000000-1234-1234-1234-123412341234}" type="slidenum">
               <a:rPr lang="es-ES"/>
-              <a:t>‹Nº›</a:t>
+              <a:t>‹#›</a:t>
             </a:fld>
             <a:endParaRPr/>
           </a:p>
@@ -16347,7 +19354,7 @@
             </a:pPr>
             <a:fld id="{00000000-1234-1234-1234-123412341234}" type="slidenum">
               <a:rPr lang="es-ES"/>
-              <a:t>‹Nº›</a:t>
+              <a:t>‹#›</a:t>
             </a:fld>
             <a:endParaRPr/>
           </a:p>
@@ -17135,7 +20142,7 @@
             </a:pPr>
             <a:fld id="{00000000-1234-1234-1234-123412341234}" type="slidenum">
               <a:rPr lang="es-ES"/>
-              <a:t>‹Nº›</a:t>
+              <a:t>‹#›</a:t>
             </a:fld>
             <a:endParaRPr/>
           </a:p>
@@ -17748,7 +20755,7 @@
             </a:pPr>
             <a:fld id="{00000000-1234-1234-1234-123412341234}" type="slidenum">
               <a:rPr lang="es-ES"/>
-              <a:t>‹Nº›</a:t>
+              <a:t>‹#›</a:t>
             </a:fld>
             <a:endParaRPr/>
           </a:p>
@@ -19014,7 +22021,7 @@
             </a:pPr>
             <a:fld id="{00000000-1234-1234-1234-123412341234}" type="slidenum">
               <a:rPr lang="es-ES"/>
-              <a:t>‹Nº›</a:t>
+              <a:t>‹#›</a:t>
             </a:fld>
             <a:endParaRPr/>
           </a:p>
@@ -20280,7 +23287,7 @@
             </a:pPr>
             <a:fld id="{00000000-1234-1234-1234-123412341234}" type="slidenum">
               <a:rPr lang="es-ES"/>
-              <a:t>‹Nº›</a:t>
+              <a:t>‹#›</a:t>
             </a:fld>
             <a:endParaRPr/>
           </a:p>
@@ -21754,7 +24761,7 @@
             </a:pPr>
             <a:fld id="{00000000-1234-1234-1234-123412341234}" type="slidenum">
               <a:rPr lang="es-ES"/>
-              <a:t>‹Nº›</a:t>
+              <a:t>‹#›</a:t>
             </a:fld>
             <a:endParaRPr/>
           </a:p>
@@ -22747,7 +25754,7 @@
           <a:graphicData uri="http://schemas.openxmlformats.org/presentationml/2006/ole">
             <mc:AlternateContent xmlns:mc="http://schemas.openxmlformats.org/markup-compatibility/2006">
               <mc:Choice xmlns:v="urn:schemas-microsoft-com:vml" Requires="v">
-                <p:oleObj spid="_x0000_s2060" name="Worksheet" showAsIcon="1" r:id="rId3" imgW="914400" imgH="771480" progId="Excel.Sheet.12">
+                <p:oleObj spid="_x0000_s2063" name="Worksheet" showAsIcon="1" r:id="rId3" imgW="914400" imgH="771480" progId="Excel.Sheet.12">
                   <p:embed/>
                 </p:oleObj>
               </mc:Choice>
@@ -22880,7 +25887,7 @@
           <a:graphicData uri="http://schemas.openxmlformats.org/presentationml/2006/ole">
             <mc:AlternateContent xmlns:mc="http://schemas.openxmlformats.org/markup-compatibility/2006">
               <mc:Choice xmlns:v="urn:schemas-microsoft-com:vml" Requires="v">
-                <p:oleObj spid="_x0000_s3084" name="Worksheet" showAsIcon="1" r:id="rId3" imgW="914400" imgH="771480" progId="Excel.Sheet.12">
+                <p:oleObj spid="_x0000_s3087" name="Worksheet" showAsIcon="1" r:id="rId3" imgW="914400" imgH="771480" progId="Excel.Sheet.12">
                   <p:embed/>
                 </p:oleObj>
               </mc:Choice>
@@ -23627,7 +26634,7 @@
           <a:graphicData uri="http://schemas.openxmlformats.org/presentationml/2006/ole">
             <mc:AlternateContent xmlns:mc="http://schemas.openxmlformats.org/markup-compatibility/2006">
               <mc:Choice xmlns:v="urn:schemas-microsoft-com:vml" Requires="v">
-                <p:oleObj spid="_x0000_s5133" name="Worksheet" showAsIcon="1" r:id="rId3" imgW="914400" imgH="771480" progId="Excel.Sheet.12">
+                <p:oleObj spid="_x0000_s5136" name="Worksheet" showAsIcon="1" r:id="rId3" imgW="914400" imgH="771480" progId="Excel.Sheet.12">
                   <p:embed/>
                 </p:oleObj>
               </mc:Choice>
@@ -23768,7 +26775,7 @@
           <a:graphicData uri="http://schemas.openxmlformats.org/presentationml/2006/ole">
             <mc:AlternateContent xmlns:mc="http://schemas.openxmlformats.org/markup-compatibility/2006">
               <mc:Choice xmlns:v="urn:schemas-microsoft-com:vml" Requires="v">
-                <p:oleObj spid="_x0000_s4108" name="Worksheet" showAsIcon="1" r:id="rId3" imgW="914400" imgH="771480" progId="Excel.Sheet.12">
+                <p:oleObj spid="_x0000_s4111" name="Worksheet" showAsIcon="1" r:id="rId3" imgW="914400" imgH="771480" progId="Excel.Sheet.12">
                   <p:embed/>
                 </p:oleObj>
               </mc:Choice>
@@ -24364,7 +27371,7 @@
   <p:cSld>
     <p:spTree>
       <p:nvGrpSpPr>
-        <p:cNvPr id="1" name="Shape 149"/>
+        <p:cNvPr id="1" name=""/>
         <p:cNvGrpSpPr/>
         <p:nvPr/>
       </p:nvGrpSpPr>
@@ -24378,526 +27385,66 @@
       </p:grpSpPr>
       <p:sp>
         <p:nvSpPr>
-          <p:cNvPr id="150" name="Shape 150"/>
-          <p:cNvSpPr txBox="1">
+          <p:cNvPr id="2" name="Title 1">
+            <a:extLst>
+              <a:ext uri="{FF2B5EF4-FFF2-40B4-BE49-F238E27FC236}">
+                <a16:creationId xmlns:a16="http://schemas.microsoft.com/office/drawing/2014/main" id="{BF6F622E-7B14-A54D-9B0A-6495E90286C9}"/>
+              </a:ext>
+            </a:extLst>
+          </p:cNvPr>
+          <p:cNvSpPr>
             <a:spLocks noGrp="1"/>
           </p:cNvSpPr>
           <p:nvPr>
             <p:ph type="title"/>
           </p:nvPr>
         </p:nvSpPr>
-        <p:spPr>
-          <a:xfrm>
-            <a:off x="677334" y="609600"/>
-            <a:ext cx="8596668" cy="1320800"/>
-          </a:xfrm>
-          <a:prstGeom prst="rect">
-            <a:avLst/>
-          </a:prstGeom>
-          <a:noFill/>
-          <a:ln>
-            <a:noFill/>
-          </a:ln>
-        </p:spPr>
+        <p:spPr/>
         <p:txBody>
-          <a:bodyPr spcFirstLastPara="1" wrap="square" lIns="91425" tIns="45700" rIns="91425" bIns="45700" anchor="t" anchorCtr="0">
-            <a:noAutofit/>
-          </a:bodyPr>
+          <a:bodyPr/>
           <a:lstStyle/>
           <a:p>
-            <a:pPr marL="0" marR="0" lvl="0" indent="0" algn="l" rtl="0">
-              <a:spcBef>
-                <a:spcPts val="0"/>
-              </a:spcBef>
-              <a:spcAft>
-                <a:spcPts val="0"/>
-              </a:spcAft>
-              <a:buClr>
-                <a:schemeClr val="accent1"/>
-              </a:buClr>
-              <a:buFont typeface="Trebuchet MS"/>
-              <a:buNone/>
-            </a:pPr>
-            <a:r>
-              <a:rPr lang="es-ES" sz="3600" b="0" i="0" u="none" strike="noStrike" cap="none">
-                <a:solidFill>
-                  <a:schemeClr val="accent1"/>
-                </a:solidFill>
-                <a:latin typeface="Trebuchet MS"/>
-                <a:ea typeface="Trebuchet MS"/>
-                <a:cs typeface="Trebuchet MS"/>
-                <a:sym typeface="Trebuchet MS"/>
-              </a:rPr>
-              <a:t>Objetivos</a:t>
-            </a:r>
-            <a:endParaRPr sz="3600" b="0" i="0" u="none" strike="noStrike" cap="none">
-              <a:solidFill>
-                <a:schemeClr val="accent1"/>
-              </a:solidFill>
-              <a:latin typeface="Trebuchet MS"/>
-              <a:ea typeface="Trebuchet MS"/>
-              <a:cs typeface="Trebuchet MS"/>
-              <a:sym typeface="Trebuchet MS"/>
-            </a:endParaRPr>
+            <a:r>
+              <a:rPr lang="en-MX" dirty="0"/>
+              <a:t>Agenda</a:t>
+            </a:r>
           </a:p>
         </p:txBody>
       </p:sp>
-      <p:grpSp>
-        <p:nvGrpSpPr>
-          <p:cNvPr id="151" name="Shape 151"/>
-          <p:cNvGrpSpPr/>
-          <p:nvPr/>
-        </p:nvGrpSpPr>
-        <p:grpSpPr>
-          <a:xfrm>
-            <a:off x="2141878" y="2717340"/>
-            <a:ext cx="7132124" cy="2897580"/>
-            <a:chOff x="732029" y="133"/>
-            <a:chExt cx="7132124" cy="2897580"/>
-          </a:xfrm>
-        </p:grpSpPr>
-        <p:sp>
-          <p:nvSpPr>
-            <p:cNvPr id="152" name="Shape 152"/>
-            <p:cNvSpPr/>
-            <p:nvPr/>
-          </p:nvSpPr>
-          <p:spPr>
-            <a:xfrm>
-              <a:off x="732029" y="133"/>
-              <a:ext cx="2228700" cy="1337400"/>
-            </a:xfrm>
-            <a:prstGeom prst="rect">
-              <a:avLst/>
-            </a:prstGeom>
-            <a:solidFill>
-              <a:srgbClr val="90C223"/>
-            </a:solidFill>
-            <a:ln w="19050" cap="rnd" cmpd="sng">
-              <a:solidFill>
-                <a:schemeClr val="lt1"/>
-              </a:solidFill>
-              <a:prstDash val="solid"/>
-              <a:round/>
-              <a:headEnd type="none" w="sm" len="sm"/>
-              <a:tailEnd type="none" w="sm" len="sm"/>
-            </a:ln>
-          </p:spPr>
-          <p:txBody>
-            <a:bodyPr spcFirstLastPara="1" wrap="square" lIns="91425" tIns="91425" rIns="91425" bIns="91425" anchor="ctr" anchorCtr="0">
-              <a:noAutofit/>
-            </a:bodyPr>
-            <a:lstStyle/>
-            <a:p>
-              <a:pPr marL="0" lvl="0" indent="0">
-                <a:spcBef>
-                  <a:spcPts val="0"/>
-                </a:spcBef>
-                <a:spcAft>
-                  <a:spcPts val="0"/>
-                </a:spcAft>
-                <a:buNone/>
-              </a:pPr>
-              <a:endParaRPr/>
-            </a:p>
-          </p:txBody>
-        </p:sp>
-        <p:sp>
-          <p:nvSpPr>
-            <p:cNvPr id="153" name="Shape 153"/>
-            <p:cNvSpPr txBox="1"/>
-            <p:nvPr/>
-          </p:nvSpPr>
-          <p:spPr>
-            <a:xfrm>
-              <a:off x="732029" y="133"/>
-              <a:ext cx="2228700" cy="1337400"/>
-            </a:xfrm>
-            <a:prstGeom prst="rect">
-              <a:avLst/>
-            </a:prstGeom>
-            <a:noFill/>
-            <a:ln>
-              <a:noFill/>
-            </a:ln>
-          </p:spPr>
-          <p:txBody>
-            <a:bodyPr spcFirstLastPara="1" wrap="square" lIns="95250" tIns="95250" rIns="95250" bIns="95250" anchor="ctr" anchorCtr="0">
-              <a:noAutofit/>
-            </a:bodyPr>
-            <a:lstStyle/>
-            <a:p>
-              <a:pPr marL="0" marR="0" lvl="0" indent="0" algn="ctr" rtl="0">
-                <a:lnSpc>
-                  <a:spcPct val="90000"/>
-                </a:lnSpc>
-                <a:spcBef>
-                  <a:spcPts val="0"/>
-                </a:spcBef>
-                <a:spcAft>
-                  <a:spcPts val="0"/>
-                </a:spcAft>
-                <a:buNone/>
-              </a:pPr>
-              <a:r>
-                <a:rPr lang="es-ES" sz="2500" dirty="0" err="1">
-                  <a:solidFill>
-                    <a:schemeClr val="lt1"/>
-                  </a:solidFill>
-                  <a:latin typeface="Calibri"/>
-                  <a:ea typeface="Calibri"/>
-                  <a:cs typeface="Calibri"/>
-                  <a:sym typeface="Calibri"/>
-                </a:rPr>
-                <a:t>PseudoCodigo</a:t>
-              </a:r>
-              <a:endParaRPr sz="2500" b="0" i="0" u="none" strike="noStrike" cap="none" dirty="0">
-                <a:solidFill>
-                  <a:schemeClr val="lt1"/>
-                </a:solidFill>
-                <a:latin typeface="Trebuchet MS"/>
-                <a:ea typeface="Trebuchet MS"/>
-                <a:cs typeface="Trebuchet MS"/>
-                <a:sym typeface="Trebuchet MS"/>
-              </a:endParaRPr>
-            </a:p>
-          </p:txBody>
-        </p:sp>
-        <p:sp>
-          <p:nvSpPr>
-            <p:cNvPr id="154" name="Shape 154"/>
-            <p:cNvSpPr/>
-            <p:nvPr/>
-          </p:nvSpPr>
-          <p:spPr>
-            <a:xfrm>
-              <a:off x="3183741" y="133"/>
-              <a:ext cx="2228700" cy="1337400"/>
-            </a:xfrm>
-            <a:prstGeom prst="rect">
-              <a:avLst/>
-            </a:prstGeom>
-            <a:solidFill>
-              <a:srgbClr val="90C223"/>
-            </a:solidFill>
-            <a:ln w="19050" cap="rnd" cmpd="sng">
-              <a:solidFill>
-                <a:schemeClr val="lt1"/>
-              </a:solidFill>
-              <a:prstDash val="solid"/>
-              <a:round/>
-              <a:headEnd type="none" w="sm" len="sm"/>
-              <a:tailEnd type="none" w="sm" len="sm"/>
-            </a:ln>
-          </p:spPr>
-          <p:txBody>
-            <a:bodyPr spcFirstLastPara="1" wrap="square" lIns="91425" tIns="91425" rIns="91425" bIns="91425" anchor="ctr" anchorCtr="0">
-              <a:noAutofit/>
-            </a:bodyPr>
-            <a:lstStyle/>
-            <a:p>
-              <a:pPr marL="0" lvl="0" indent="0">
-                <a:spcBef>
-                  <a:spcPts val="0"/>
-                </a:spcBef>
-                <a:spcAft>
-                  <a:spcPts val="0"/>
-                </a:spcAft>
-                <a:buNone/>
-              </a:pPr>
-              <a:endParaRPr/>
-            </a:p>
-          </p:txBody>
-        </p:sp>
-        <p:sp>
-          <p:nvSpPr>
-            <p:cNvPr id="155" name="Shape 155"/>
-            <p:cNvSpPr txBox="1"/>
-            <p:nvPr/>
-          </p:nvSpPr>
-          <p:spPr>
-            <a:xfrm>
-              <a:off x="3183741" y="133"/>
-              <a:ext cx="2228700" cy="1337400"/>
-            </a:xfrm>
-            <a:prstGeom prst="rect">
-              <a:avLst/>
-            </a:prstGeom>
-            <a:noFill/>
-            <a:ln>
-              <a:noFill/>
-            </a:ln>
-          </p:spPr>
-          <p:txBody>
-            <a:bodyPr spcFirstLastPara="1" wrap="square" lIns="95250" tIns="95250" rIns="95250" bIns="95250" anchor="ctr" anchorCtr="0">
-              <a:noAutofit/>
-            </a:bodyPr>
-            <a:lstStyle/>
-            <a:p>
-              <a:pPr marL="0" lvl="0" indent="0" algn="ctr" rtl="0">
-                <a:lnSpc>
-                  <a:spcPct val="90000"/>
-                </a:lnSpc>
-                <a:spcBef>
-                  <a:spcPts val="0"/>
-                </a:spcBef>
-                <a:spcAft>
-                  <a:spcPts val="0"/>
-                </a:spcAft>
-                <a:buClr>
-                  <a:schemeClr val="dk1"/>
-                </a:buClr>
-                <a:buFont typeface="Arial"/>
-                <a:buNone/>
-              </a:pPr>
-              <a:r>
-                <a:rPr lang="es-ES" sz="2500" dirty="0">
-                  <a:solidFill>
-                    <a:schemeClr val="lt1"/>
-                  </a:solidFill>
-                  <a:latin typeface="Calibri"/>
-                  <a:ea typeface="Calibri"/>
-                  <a:cs typeface="Calibri"/>
-                  <a:sym typeface="Calibri"/>
-                </a:rPr>
-                <a:t>Java Procedural</a:t>
-              </a:r>
-              <a:endParaRPr sz="2500" b="0" i="0" u="none" strike="noStrike" cap="none" dirty="0">
-                <a:solidFill>
-                  <a:schemeClr val="lt1"/>
-                </a:solidFill>
-                <a:latin typeface="Calibri"/>
-                <a:ea typeface="Calibri"/>
-                <a:cs typeface="Calibri"/>
-                <a:sym typeface="Calibri"/>
-              </a:endParaRPr>
-            </a:p>
-          </p:txBody>
-        </p:sp>
-        <p:sp>
-          <p:nvSpPr>
-            <p:cNvPr id="156" name="Shape 156"/>
-            <p:cNvSpPr/>
-            <p:nvPr/>
-          </p:nvSpPr>
-          <p:spPr>
-            <a:xfrm>
-              <a:off x="5635453" y="133"/>
-              <a:ext cx="2228700" cy="1337400"/>
-            </a:xfrm>
-            <a:prstGeom prst="rect">
-              <a:avLst/>
-            </a:prstGeom>
-            <a:solidFill>
-              <a:srgbClr val="90C223"/>
-            </a:solidFill>
-            <a:ln w="19050" cap="rnd" cmpd="sng">
-              <a:solidFill>
-                <a:schemeClr val="lt1"/>
-              </a:solidFill>
-              <a:prstDash val="solid"/>
-              <a:round/>
-              <a:headEnd type="none" w="sm" len="sm"/>
-              <a:tailEnd type="none" w="sm" len="sm"/>
-            </a:ln>
-          </p:spPr>
-          <p:txBody>
-            <a:bodyPr spcFirstLastPara="1" wrap="square" lIns="91425" tIns="91425" rIns="91425" bIns="91425" anchor="ctr" anchorCtr="0">
-              <a:noAutofit/>
-            </a:bodyPr>
-            <a:lstStyle/>
-            <a:p>
-              <a:pPr marL="0" lvl="0" indent="0">
-                <a:spcBef>
-                  <a:spcPts val="0"/>
-                </a:spcBef>
-                <a:spcAft>
-                  <a:spcPts val="0"/>
-                </a:spcAft>
-                <a:buNone/>
-              </a:pPr>
-              <a:endParaRPr/>
-            </a:p>
-          </p:txBody>
-        </p:sp>
-        <p:sp>
-          <p:nvSpPr>
-            <p:cNvPr id="157" name="Shape 157"/>
-            <p:cNvSpPr txBox="1"/>
-            <p:nvPr/>
-          </p:nvSpPr>
-          <p:spPr>
-            <a:xfrm>
-              <a:off x="5635453" y="133"/>
-              <a:ext cx="2228700" cy="1337400"/>
-            </a:xfrm>
-            <a:prstGeom prst="rect">
-              <a:avLst/>
-            </a:prstGeom>
-            <a:noFill/>
-            <a:ln>
-              <a:noFill/>
-            </a:ln>
-          </p:spPr>
-          <p:txBody>
-            <a:bodyPr spcFirstLastPara="1" wrap="square" lIns="95250" tIns="95250" rIns="95250" bIns="95250" anchor="ctr" anchorCtr="0">
-              <a:noAutofit/>
-            </a:bodyPr>
-            <a:lstStyle/>
-            <a:p>
-              <a:pPr marL="0" lvl="0" indent="0" algn="ctr" rtl="0">
-                <a:lnSpc>
-                  <a:spcPct val="90000"/>
-                </a:lnSpc>
-                <a:spcBef>
-                  <a:spcPts val="0"/>
-                </a:spcBef>
-                <a:spcAft>
-                  <a:spcPts val="0"/>
-                </a:spcAft>
-                <a:buNone/>
-              </a:pPr>
-              <a:r>
-                <a:rPr lang="es-ES" sz="2500" dirty="0">
-                  <a:solidFill>
-                    <a:schemeClr val="lt1"/>
-                  </a:solidFill>
-                  <a:latin typeface="Calibri"/>
-                  <a:ea typeface="Calibri"/>
-                  <a:cs typeface="Calibri"/>
-                  <a:sym typeface="Calibri"/>
-                </a:rPr>
-                <a:t>Java Orientado a Objetos</a:t>
-              </a:r>
-              <a:endParaRPr sz="2500" dirty="0">
-                <a:solidFill>
-                  <a:schemeClr val="lt1"/>
-                </a:solidFill>
-                <a:latin typeface="Calibri"/>
-                <a:ea typeface="Calibri"/>
-                <a:cs typeface="Calibri"/>
-                <a:sym typeface="Calibri"/>
-              </a:endParaRPr>
-            </a:p>
-          </p:txBody>
-        </p:sp>
-        <p:sp>
-          <p:nvSpPr>
-            <p:cNvPr id="158" name="Shape 158"/>
-            <p:cNvSpPr/>
-            <p:nvPr/>
-          </p:nvSpPr>
-          <p:spPr>
-            <a:xfrm>
-              <a:off x="3183741" y="1560313"/>
-              <a:ext cx="2228700" cy="1337400"/>
-            </a:xfrm>
-            <a:prstGeom prst="roundRect">
-              <a:avLst>
-                <a:gd name="adj" fmla="val 16667"/>
-              </a:avLst>
-            </a:prstGeom>
-            <a:solidFill>
-              <a:srgbClr val="90C223"/>
-            </a:solidFill>
-            <a:ln w="19050" cap="rnd" cmpd="sng">
-              <a:solidFill>
-                <a:schemeClr val="lt1"/>
-              </a:solidFill>
-              <a:prstDash val="solid"/>
-              <a:round/>
-              <a:headEnd type="none" w="sm" len="sm"/>
-              <a:tailEnd type="none" w="sm" len="sm"/>
-            </a:ln>
-          </p:spPr>
-          <p:txBody>
-            <a:bodyPr spcFirstLastPara="1" wrap="square" lIns="91425" tIns="91425" rIns="91425" bIns="91425" anchor="ctr" anchorCtr="0">
-              <a:noAutofit/>
-            </a:bodyPr>
-            <a:lstStyle/>
-            <a:p>
-              <a:pPr marL="0" lvl="0" indent="0" rtl="0">
-                <a:spcBef>
-                  <a:spcPts val="0"/>
-                </a:spcBef>
-                <a:spcAft>
-                  <a:spcPts val="0"/>
-                </a:spcAft>
-                <a:buNone/>
-              </a:pPr>
-              <a:endParaRPr dirty="0"/>
-            </a:p>
-          </p:txBody>
-        </p:sp>
-      </p:grpSp>
-      <p:sp>
-        <p:nvSpPr>
-          <p:cNvPr id="16" name="Shape 157">
+      <p:graphicFrame>
+        <p:nvGraphicFramePr>
+          <p:cNvPr id="4" name="Diagram 3">
             <a:extLst>
               <a:ext uri="{FF2B5EF4-FFF2-40B4-BE49-F238E27FC236}">
-                <a16:creationId xmlns:a16="http://schemas.microsoft.com/office/drawing/2014/main" id="{386CF87B-76E5-4FA6-818C-8454317786B2}"/>
+                <a16:creationId xmlns:a16="http://schemas.microsoft.com/office/drawing/2014/main" id="{3A1DF169-37E5-D24F-A161-88A48748EBEA}"/>
               </a:ext>
             </a:extLst>
           </p:cNvPr>
-          <p:cNvSpPr txBox="1"/>
-          <p:nvPr/>
-        </p:nvSpPr>
-        <p:spPr>
-          <a:xfrm>
-            <a:off x="4593590" y="4277520"/>
-            <a:ext cx="2228700" cy="1337400"/>
-          </a:xfrm>
-          <a:prstGeom prst="rect">
-            <a:avLst/>
-          </a:prstGeom>
-          <a:noFill/>
-          <a:ln>
-            <a:noFill/>
-          </a:ln>
-        </p:spPr>
-        <p:txBody>
-          <a:bodyPr spcFirstLastPara="1" wrap="square" lIns="95250" tIns="95250" rIns="95250" bIns="95250" anchor="ctr" anchorCtr="0">
-            <a:noAutofit/>
-          </a:bodyPr>
-          <a:lstStyle/>
-          <a:p>
-            <a:pPr marL="0" lvl="0" indent="0" algn="ctr" rtl="0">
-              <a:lnSpc>
-                <a:spcPct val="90000"/>
-              </a:lnSpc>
-              <a:spcBef>
-                <a:spcPts val="0"/>
-              </a:spcBef>
-              <a:spcAft>
-                <a:spcPts val="0"/>
-              </a:spcAft>
-              <a:buNone/>
-            </a:pPr>
-            <a:r>
-              <a:rPr lang="es-ES" sz="2500" dirty="0">
-                <a:solidFill>
-                  <a:schemeClr val="lt1"/>
-                </a:solidFill>
-                <a:latin typeface="Calibri"/>
-                <a:ea typeface="Calibri"/>
-                <a:cs typeface="Calibri"/>
-                <a:sym typeface="Calibri"/>
-              </a:rPr>
-              <a:t>Selenium WebDriver</a:t>
-            </a:r>
-            <a:endParaRPr sz="2500" dirty="0">
-              <a:solidFill>
-                <a:schemeClr val="lt1"/>
-              </a:solidFill>
-              <a:latin typeface="Calibri"/>
-              <a:ea typeface="Calibri"/>
-              <a:cs typeface="Calibri"/>
-              <a:sym typeface="Calibri"/>
-            </a:endParaRPr>
-          </a:p>
-        </p:txBody>
-      </p:sp>
+          <p:cNvGraphicFramePr/>
+          <p:nvPr>
+            <p:extLst>
+              <p:ext uri="{D42A27DB-BD31-4B8C-83A1-F6EECF244321}">
+                <p14:modId xmlns:p14="http://schemas.microsoft.com/office/powerpoint/2010/main" val="1401269622"/>
+              </p:ext>
+            </p:extLst>
+          </p:nvPr>
+        </p:nvGraphicFramePr>
+        <p:xfrm>
+          <a:off x="2032000" y="1513490"/>
+          <a:ext cx="7627007" cy="4624843"/>
+        </p:xfrm>
+        <a:graphic>
+          <a:graphicData uri="http://schemas.openxmlformats.org/drawingml/2006/diagram">
+            <dgm:relIds xmlns:dgm="http://schemas.openxmlformats.org/drawingml/2006/diagram" xmlns:r="http://schemas.openxmlformats.org/officeDocument/2006/relationships" r:dm="rId2" r:lo="rId3" r:qs="rId4" r:cs="rId5"/>
+          </a:graphicData>
+        </a:graphic>
+      </p:graphicFrame>
     </p:spTree>
+    <p:extLst>
+      <p:ext uri="{BB962C8B-B14F-4D97-AF65-F5344CB8AC3E}">
+        <p14:creationId xmlns:p14="http://schemas.microsoft.com/office/powerpoint/2010/main" val="3931905941"/>
+      </p:ext>
+    </p:extLst>
   </p:cSld>
   <p:clrMapOvr>
     <a:masterClrMapping/>
@@ -25410,7 +27957,7 @@
           <a:graphicData uri="http://schemas.openxmlformats.org/presentationml/2006/ole">
             <mc:AlternateContent xmlns:mc="http://schemas.openxmlformats.org/markup-compatibility/2006">
               <mc:Choice xmlns:v="urn:schemas-microsoft-com:vml" Requires="v">
-                <p:oleObj spid="_x0000_s6156" name="Worksheet" showAsIcon="1" r:id="rId3" imgW="914400" imgH="771480" progId="Excel.Sheet.12">
+                <p:oleObj spid="_x0000_s6159" name="Worksheet" showAsIcon="1" r:id="rId3" imgW="914400" imgH="771480" progId="Excel.Sheet.12">
                   <p:embed/>
                 </p:oleObj>
               </mc:Choice>
@@ -27435,7 +29982,7 @@
           <a:graphicData uri="http://schemas.openxmlformats.org/presentationml/2006/ole">
             <mc:AlternateContent xmlns:mc="http://schemas.openxmlformats.org/markup-compatibility/2006">
               <mc:Choice xmlns:v="urn:schemas-microsoft-com:vml" Requires="v">
-                <p:oleObj spid="_x0000_s7180" name="Worksheet" showAsIcon="1" r:id="rId3" imgW="914400" imgH="771480" progId="Excel.Sheet.12">
+                <p:oleObj spid="_x0000_s7183" name="Worksheet" showAsIcon="1" r:id="rId3" imgW="914400" imgH="771480" progId="Excel.Sheet.12">
                   <p:embed/>
                 </p:oleObj>
               </mc:Choice>
@@ -27589,7 +30136,7 @@
           <a:graphicData uri="http://schemas.openxmlformats.org/presentationml/2006/ole">
             <mc:AlternateContent xmlns:mc="http://schemas.openxmlformats.org/markup-compatibility/2006">
               <mc:Choice xmlns:v="urn:schemas-microsoft-com:vml" Requires="v">
-                <p:oleObj spid="_x0000_s8204" name="Worksheet" showAsIcon="1" r:id="rId3" imgW="914400" imgH="771480" progId="Excel.Sheet.12">
+                <p:oleObj spid="_x0000_s8207" name="Worksheet" showAsIcon="1" r:id="rId3" imgW="914400" imgH="771480" progId="Excel.Sheet.12">
                   <p:embed/>
                 </p:oleObj>
               </mc:Choice>
@@ -30165,7 +32712,7 @@
                 <a:cs typeface="Arial"/>
                 <a:sym typeface="Arial"/>
               </a:rPr>
-              <a:t>suma + 20 * c / (mod % 3)</a:t>
+              <a:t>suma + 20 * c / 12(mod % 3)</a:t>
             </a:r>
             <a:endParaRPr sz="2400" dirty="0">
               <a:solidFill>

</xml_diff>

<commit_message>
Adds exercises and exceptions examples
</commit_message>
<xml_diff>
--- a/Selenium, module 2.pptx
+++ b/Selenium, module 2.pptx
@@ -5,7 +5,7 @@
     <p:sldMasterId id="2147483664" r:id="rId1"/>
   </p:sldMasterIdLst>
   <p:notesMasterIdLst>
-    <p:notesMasterId r:id="rId40"/>
+    <p:notesMasterId r:id="rId42"/>
   </p:notesMasterIdLst>
   <p:sldIdLst>
     <p:sldId id="256" r:id="rId2"/>
@@ -46,6 +46,8 @@
     <p:sldId id="264" r:id="rId37"/>
     <p:sldId id="309" r:id="rId38"/>
     <p:sldId id="310" r:id="rId39"/>
+    <p:sldId id="313" r:id="rId40"/>
+    <p:sldId id="314" r:id="rId41"/>
   </p:sldIdLst>
   <p:sldSz cx="12192000" cy="6858000"/>
   <p:notesSz cx="6858000" cy="9144000"/>
@@ -1607,10 +1609,10 @@
     <dgm:cxn modelId="{18E69D39-DCDB-9E4C-BC8F-0837D4FC6376}" srcId="{67394E67-0841-7341-B886-26A149EACC10}" destId="{C3D4B62D-5BD7-D04D-9D48-6CEB7FAB367B}" srcOrd="6" destOrd="0" parTransId="{3A5BDC1C-0296-DC4C-A595-457AB9D00816}" sibTransId="{B6E986C3-1CB0-EC4F-AD95-FB21B2E5020D}"/>
     <dgm:cxn modelId="{3DC63B3F-CF9D-FF40-82F7-F12C3351A4E7}" srcId="{C242D152-3DF2-D548-8EEE-B9B22E4F93CD}" destId="{67394E67-0841-7341-B886-26A149EACC10}" srcOrd="1" destOrd="0" parTransId="{77473F5D-1F13-4243-87DF-33ED578CA243}" sibTransId="{9C9EAA60-E33F-9246-8D5E-4F7B9EF5166C}"/>
     <dgm:cxn modelId="{9F3B1B46-6D57-1D40-8BC5-8E5C095F44FB}" type="presOf" srcId="{A9C8E855-F256-9D48-8F59-24DDA61C5A85}" destId="{190D1B6B-7148-F34B-A09B-2EF58520B67E}" srcOrd="0" destOrd="0" presId="urn:microsoft.com/office/officeart/2005/8/layout/hList1"/>
+    <dgm:cxn modelId="{DA0EDD6F-DF82-3A44-813C-49B1962A1108}" srcId="{A9C8E855-F256-9D48-8F59-24DDA61C5A85}" destId="{9562C37C-B3C8-3244-A2FA-81E29B5C090A}" srcOrd="0" destOrd="0" parTransId="{F9AC1F39-3B4B-4C48-B780-9449C533BB4F}" sibTransId="{A214A30E-6132-2E40-8780-164889E58137}"/>
+    <dgm:cxn modelId="{AA5C6673-B06D-484E-8324-FB4C98B01FC0}" type="presOf" srcId="{67394E67-0841-7341-B886-26A149EACC10}" destId="{4E552492-634D-2449-9BEC-2CD838DA0C80}" srcOrd="0" destOrd="0" presId="urn:microsoft.com/office/officeart/2005/8/layout/hList1"/>
     <dgm:cxn modelId="{9D2BC357-C12B-E545-BB2E-3E39501E486D}" type="presOf" srcId="{398B1AD5-6584-1844-94D0-CF6E8AD78CFC}" destId="{83B3767F-354D-D14C-8BB5-A558EF9415F3}" srcOrd="0" destOrd="1" presId="urn:microsoft.com/office/officeart/2005/8/layout/hList1"/>
     <dgm:cxn modelId="{3285675A-1C1F-B446-9E8D-1D612EA5DD73}" srcId="{67394E67-0841-7341-B886-26A149EACC10}" destId="{570167F9-68B4-A04B-9093-D9FD93152405}" srcOrd="3" destOrd="0" parTransId="{8ABAEE1E-1A25-AB48-99A2-4E45AF908852}" sibTransId="{7EF1D1F3-99CD-CC42-961F-55738814F5B1}"/>
-    <dgm:cxn modelId="{DA0EDD6F-DF82-3A44-813C-49B1962A1108}" srcId="{A9C8E855-F256-9D48-8F59-24DDA61C5A85}" destId="{9562C37C-B3C8-3244-A2FA-81E29B5C090A}" srcOrd="0" destOrd="0" parTransId="{F9AC1F39-3B4B-4C48-B780-9449C533BB4F}" sibTransId="{A214A30E-6132-2E40-8780-164889E58137}"/>
-    <dgm:cxn modelId="{AA5C6673-B06D-484E-8324-FB4C98B01FC0}" type="presOf" srcId="{67394E67-0841-7341-B886-26A149EACC10}" destId="{4E552492-634D-2449-9BEC-2CD838DA0C80}" srcOrd="0" destOrd="0" presId="urn:microsoft.com/office/officeart/2005/8/layout/hList1"/>
     <dgm:cxn modelId="{9C20F984-A0C1-5C42-8485-1E75F5F4883E}" type="presOf" srcId="{C242D152-3DF2-D548-8EEE-B9B22E4F93CD}" destId="{4D73DA62-3350-F04F-B1D1-6128F97CC6E1}" srcOrd="0" destOrd="0" presId="urn:microsoft.com/office/officeart/2005/8/layout/hList1"/>
     <dgm:cxn modelId="{CA4C028E-E3AD-1944-86B4-025703ACD5BA}" type="presOf" srcId="{9562C37C-B3C8-3244-A2FA-81E29B5C090A}" destId="{83B3767F-354D-D14C-8BB5-A558EF9415F3}" srcOrd="0" destOrd="0" presId="urn:microsoft.com/office/officeart/2005/8/layout/hList1"/>
     <dgm:cxn modelId="{F7301891-4185-0E47-BCE1-A75CF355957E}" type="presOf" srcId="{9348A8F1-61EC-4147-B590-81707D3F67E7}" destId="{60DD2336-8F5F-4C42-8949-8E520204A833}" srcOrd="0" destOrd="5" presId="urn:microsoft.com/office/officeart/2005/8/layout/hList1"/>
@@ -6176,7 +6178,7 @@
             </a:pPr>
             <a:fld id="{00000000-1234-1234-1234-123412341234}" type="slidenum">
               <a:rPr lang="es-ES"/>
-              <a:t>‹#›</a:t>
+              <a:t>‹Nº›</a:t>
             </a:fld>
             <a:endParaRPr/>
           </a:p>
@@ -7203,7 +7205,7 @@
             </a:pPr>
             <a:fld id="{00000000-1234-1234-1234-123412341234}" type="slidenum">
               <a:rPr lang="es-ES"/>
-              <a:t>‹#›</a:t>
+              <a:t>‹Nº›</a:t>
             </a:fld>
             <a:endParaRPr/>
           </a:p>
@@ -8469,7 +8471,7 @@
             </a:pPr>
             <a:fld id="{00000000-1234-1234-1234-123412341234}" type="slidenum">
               <a:rPr lang="es-ES"/>
-              <a:t>‹#›</a:t>
+              <a:t>‹Nº›</a:t>
             </a:fld>
             <a:endParaRPr/>
           </a:p>
@@ -9604,7 +9606,7 @@
             </a:pPr>
             <a:fld id="{00000000-1234-1234-1234-123412341234}" type="slidenum">
               <a:rPr lang="es-ES"/>
-              <a:t>‹#›</a:t>
+              <a:t>‹Nº›</a:t>
             </a:fld>
             <a:endParaRPr/>
           </a:p>
@@ -10870,7 +10872,7 @@
             </a:pPr>
             <a:fld id="{00000000-1234-1234-1234-123412341234}" type="slidenum">
               <a:rPr lang="es-ES"/>
-              <a:t>‹#›</a:t>
+              <a:t>‹Nº›</a:t>
             </a:fld>
             <a:endParaRPr/>
           </a:p>
@@ -12236,7 +12238,7 @@
             </a:pPr>
             <a:fld id="{00000000-1234-1234-1234-123412341234}" type="slidenum">
               <a:rPr lang="es-ES"/>
-              <a:t>‹#›</a:t>
+              <a:t>‹Nº›</a:t>
             </a:fld>
             <a:endParaRPr/>
           </a:p>
@@ -13263,7 +13265,7 @@
             </a:pPr>
             <a:fld id="{00000000-1234-1234-1234-123412341234}" type="slidenum">
               <a:rPr lang="es-ES"/>
-              <a:t>‹#›</a:t>
+              <a:t>‹Nº›</a:t>
             </a:fld>
             <a:endParaRPr/>
           </a:p>
@@ -14290,7 +14292,7 @@
             </a:pPr>
             <a:fld id="{00000000-1234-1234-1234-123412341234}" type="slidenum">
               <a:rPr lang="es-ES"/>
-              <a:t>‹#›</a:t>
+              <a:t>‹Nº›</a:t>
             </a:fld>
             <a:endParaRPr/>
           </a:p>
@@ -15317,7 +15319,7 @@
             </a:pPr>
             <a:fld id="{00000000-1234-1234-1234-123412341234}" type="slidenum">
               <a:rPr lang="es-ES"/>
-              <a:t>‹#›</a:t>
+              <a:t>‹Nº›</a:t>
             </a:fld>
             <a:endParaRPr/>
           </a:p>
@@ -16344,7 +16346,7 @@
             </a:pPr>
             <a:fld id="{00000000-1234-1234-1234-123412341234}" type="slidenum">
               <a:rPr lang="es-ES"/>
-              <a:t>‹#›</a:t>
+              <a:t>‹Nº›</a:t>
             </a:fld>
             <a:endParaRPr/>
           </a:p>
@@ -17610,7 +17612,7 @@
             </a:pPr>
             <a:fld id="{00000000-1234-1234-1234-123412341234}" type="slidenum">
               <a:rPr lang="es-ES"/>
-              <a:t>‹#›</a:t>
+              <a:t>‹Nº›</a:t>
             </a:fld>
             <a:endParaRPr/>
           </a:p>
@@ -19354,7 +19356,7 @@
             </a:pPr>
             <a:fld id="{00000000-1234-1234-1234-123412341234}" type="slidenum">
               <a:rPr lang="es-ES"/>
-              <a:t>‹#›</a:t>
+              <a:t>‹Nº›</a:t>
             </a:fld>
             <a:endParaRPr/>
           </a:p>
@@ -20142,7 +20144,7 @@
             </a:pPr>
             <a:fld id="{00000000-1234-1234-1234-123412341234}" type="slidenum">
               <a:rPr lang="es-ES"/>
-              <a:t>‹#›</a:t>
+              <a:t>‹Nº›</a:t>
             </a:fld>
             <a:endParaRPr/>
           </a:p>
@@ -20755,7 +20757,7 @@
             </a:pPr>
             <a:fld id="{00000000-1234-1234-1234-123412341234}" type="slidenum">
               <a:rPr lang="es-ES"/>
-              <a:t>‹#›</a:t>
+              <a:t>‹Nº›</a:t>
             </a:fld>
             <a:endParaRPr/>
           </a:p>
@@ -22021,7 +22023,7 @@
             </a:pPr>
             <a:fld id="{00000000-1234-1234-1234-123412341234}" type="slidenum">
               <a:rPr lang="es-ES"/>
-              <a:t>‹#›</a:t>
+              <a:t>‹Nº›</a:t>
             </a:fld>
             <a:endParaRPr/>
           </a:p>
@@ -23287,7 +23289,7 @@
             </a:pPr>
             <a:fld id="{00000000-1234-1234-1234-123412341234}" type="slidenum">
               <a:rPr lang="es-ES"/>
-              <a:t>‹#›</a:t>
+              <a:t>‹Nº›</a:t>
             </a:fld>
             <a:endParaRPr/>
           </a:p>
@@ -24761,7 +24763,7 @@
             </a:pPr>
             <a:fld id="{00000000-1234-1234-1234-123412341234}" type="slidenum">
               <a:rPr lang="es-ES"/>
-              <a:t>‹#›</a:t>
+              <a:t>‹Nº›</a:t>
             </a:fld>
             <a:endParaRPr/>
           </a:p>
@@ -25754,7 +25756,7 @@
           <a:graphicData uri="http://schemas.openxmlformats.org/presentationml/2006/ole">
             <mc:AlternateContent xmlns:mc="http://schemas.openxmlformats.org/markup-compatibility/2006">
               <mc:Choice xmlns:v="urn:schemas-microsoft-com:vml" Requires="v">
-                <p:oleObj spid="_x0000_s2063" name="Worksheet" showAsIcon="1" r:id="rId3" imgW="914400" imgH="771480" progId="Excel.Sheet.12">
+                <p:oleObj spid="_x0000_s2066" name="Worksheet" showAsIcon="1" r:id="rId3" imgW="914400" imgH="771480" progId="Excel.Sheet.12">
                   <p:embed/>
                 </p:oleObj>
               </mc:Choice>
@@ -25887,7 +25889,7 @@
           <a:graphicData uri="http://schemas.openxmlformats.org/presentationml/2006/ole">
             <mc:AlternateContent xmlns:mc="http://schemas.openxmlformats.org/markup-compatibility/2006">
               <mc:Choice xmlns:v="urn:schemas-microsoft-com:vml" Requires="v">
-                <p:oleObj spid="_x0000_s3087" name="Worksheet" showAsIcon="1" r:id="rId3" imgW="914400" imgH="771480" progId="Excel.Sheet.12">
+                <p:oleObj spid="_x0000_s3090" name="Worksheet" showAsIcon="1" r:id="rId3" imgW="914400" imgH="771480" progId="Excel.Sheet.12">
                   <p:embed/>
                 </p:oleObj>
               </mc:Choice>
@@ -26634,7 +26636,7 @@
           <a:graphicData uri="http://schemas.openxmlformats.org/presentationml/2006/ole">
             <mc:AlternateContent xmlns:mc="http://schemas.openxmlformats.org/markup-compatibility/2006">
               <mc:Choice xmlns:v="urn:schemas-microsoft-com:vml" Requires="v">
-                <p:oleObj spid="_x0000_s5136" name="Worksheet" showAsIcon="1" r:id="rId3" imgW="914400" imgH="771480" progId="Excel.Sheet.12">
+                <p:oleObj spid="_x0000_s5139" name="Worksheet" showAsIcon="1" r:id="rId3" imgW="914400" imgH="771480" progId="Excel.Sheet.12">
                   <p:embed/>
                 </p:oleObj>
               </mc:Choice>
@@ -26775,7 +26777,7 @@
           <a:graphicData uri="http://schemas.openxmlformats.org/presentationml/2006/ole">
             <mc:AlternateContent xmlns:mc="http://schemas.openxmlformats.org/markup-compatibility/2006">
               <mc:Choice xmlns:v="urn:schemas-microsoft-com:vml" Requires="v">
-                <p:oleObj spid="_x0000_s4111" name="Worksheet" showAsIcon="1" r:id="rId3" imgW="914400" imgH="771480" progId="Excel.Sheet.12">
+                <p:oleObj spid="_x0000_s4114" name="Worksheet" showAsIcon="1" r:id="rId3" imgW="914400" imgH="771480" progId="Excel.Sheet.12">
                   <p:embed/>
                 </p:oleObj>
               </mc:Choice>
@@ -27957,7 +27959,7 @@
           <a:graphicData uri="http://schemas.openxmlformats.org/presentationml/2006/ole">
             <mc:AlternateContent xmlns:mc="http://schemas.openxmlformats.org/markup-compatibility/2006">
               <mc:Choice xmlns:v="urn:schemas-microsoft-com:vml" Requires="v">
-                <p:oleObj spid="_x0000_s6159" name="Worksheet" showAsIcon="1" r:id="rId3" imgW="914400" imgH="771480" progId="Excel.Sheet.12">
+                <p:oleObj spid="_x0000_s6162" name="Worksheet" showAsIcon="1" r:id="rId3" imgW="914400" imgH="771480" progId="Excel.Sheet.12">
                   <p:embed/>
                 </p:oleObj>
               </mc:Choice>
@@ -29982,7 +29984,7 @@
           <a:graphicData uri="http://schemas.openxmlformats.org/presentationml/2006/ole">
             <mc:AlternateContent xmlns:mc="http://schemas.openxmlformats.org/markup-compatibility/2006">
               <mc:Choice xmlns:v="urn:schemas-microsoft-com:vml" Requires="v">
-                <p:oleObj spid="_x0000_s7183" name="Worksheet" showAsIcon="1" r:id="rId3" imgW="914400" imgH="771480" progId="Excel.Sheet.12">
+                <p:oleObj spid="_x0000_s7186" name="Worksheet" showAsIcon="1" r:id="rId3" imgW="914400" imgH="771480" progId="Excel.Sheet.12">
                   <p:embed/>
                 </p:oleObj>
               </mc:Choice>
@@ -30136,7 +30138,7 @@
           <a:graphicData uri="http://schemas.openxmlformats.org/presentationml/2006/ole">
             <mc:AlternateContent xmlns:mc="http://schemas.openxmlformats.org/markup-compatibility/2006">
               <mc:Choice xmlns:v="urn:schemas-microsoft-com:vml" Requires="v">
-                <p:oleObj spid="_x0000_s8207" name="Worksheet" showAsIcon="1" r:id="rId3" imgW="914400" imgH="771480" progId="Excel.Sheet.12">
+                <p:oleObj spid="_x0000_s8210" name="Worksheet" showAsIcon="1" r:id="rId3" imgW="914400" imgH="771480" progId="Excel.Sheet.12">
                   <p:embed/>
                 </p:oleObj>
               </mc:Choice>
@@ -35176,6 +35178,140 @@
 </p:sld>
 </file>
 
+<file path=ppt/slides/slide39.xml><?xml version="1.0" encoding="utf-8"?>
+<p:sld xmlns:a="http://schemas.openxmlformats.org/drawingml/2006/main" xmlns:r="http://schemas.openxmlformats.org/officeDocument/2006/relationships" xmlns:p="http://schemas.openxmlformats.org/presentationml/2006/main">
+  <p:cSld>
+    <p:spTree>
+      <p:nvGrpSpPr>
+        <p:cNvPr id="1" name=""/>
+        <p:cNvGrpSpPr/>
+        <p:nvPr/>
+      </p:nvGrpSpPr>
+      <p:grpSpPr>
+        <a:xfrm>
+          <a:off x="0" y="0"/>
+          <a:ext cx="0" cy="0"/>
+          <a:chOff x="0" y="0"/>
+          <a:chExt cx="0" cy="0"/>
+        </a:xfrm>
+      </p:grpSpPr>
+      <p:sp>
+        <p:nvSpPr>
+          <p:cNvPr id="2" name="Título 1">
+            <a:extLst>
+              <a:ext uri="{FF2B5EF4-FFF2-40B4-BE49-F238E27FC236}">
+                <a16:creationId xmlns:a16="http://schemas.microsoft.com/office/drawing/2014/main" id="{DA01599F-059A-4819-AD28-A5E341E66063}"/>
+              </a:ext>
+            </a:extLst>
+          </p:cNvPr>
+          <p:cNvSpPr>
+            <a:spLocks noGrp="1"/>
+          </p:cNvSpPr>
+          <p:nvPr>
+            <p:ph type="title"/>
+          </p:nvPr>
+        </p:nvSpPr>
+        <p:spPr/>
+        <p:txBody>
+          <a:bodyPr/>
+          <a:lstStyle/>
+          <a:p>
+            <a:r>
+              <a:rPr lang="es-MX" dirty="0"/>
+              <a:t>Excepciones</a:t>
+            </a:r>
+            <a:endParaRPr lang="en-US" dirty="0"/>
+          </a:p>
+        </p:txBody>
+      </p:sp>
+      <p:sp>
+        <p:nvSpPr>
+          <p:cNvPr id="3" name="Marcador de texto 2">
+            <a:extLst>
+              <a:ext uri="{FF2B5EF4-FFF2-40B4-BE49-F238E27FC236}">
+                <a16:creationId xmlns:a16="http://schemas.microsoft.com/office/drawing/2014/main" id="{96FA8692-ECD3-4821-B7C6-49FDA0544B95}"/>
+              </a:ext>
+            </a:extLst>
+          </p:cNvPr>
+          <p:cNvSpPr>
+            <a:spLocks noGrp="1"/>
+          </p:cNvSpPr>
+          <p:nvPr>
+            <p:ph type="body" idx="1"/>
+          </p:nvPr>
+        </p:nvSpPr>
+        <p:spPr/>
+        <p:txBody>
+          <a:bodyPr/>
+          <a:lstStyle/>
+          <a:p>
+            <a:r>
+              <a:rPr lang="es-MX" dirty="0"/>
+              <a:t>“Evento Excepcional”</a:t>
+            </a:r>
+          </a:p>
+          <a:p>
+            <a:r>
+              <a:rPr lang="es-MX" dirty="0"/>
+              <a:t> Error en la ejecución de un programa</a:t>
+            </a:r>
+          </a:p>
+          <a:p>
+            <a:r>
+              <a:rPr lang="es-MX" dirty="0"/>
+              <a:t> Ocurren en condiciones anormales que interrumpen el flujo</a:t>
+            </a:r>
+          </a:p>
+          <a:p>
+            <a:pPr lvl="1"/>
+            <a:r>
+              <a:rPr lang="es-MX" dirty="0"/>
+              <a:t>El usuario ingresa datos inválidos</a:t>
+            </a:r>
+          </a:p>
+          <a:p>
+            <a:pPr lvl="1"/>
+            <a:r>
+              <a:rPr lang="es-MX" dirty="0"/>
+              <a:t>Se requiere abrir un archivo que no existe</a:t>
+            </a:r>
+          </a:p>
+          <a:p>
+            <a:pPr lvl="1"/>
+            <a:r>
+              <a:rPr lang="es-MX" dirty="0"/>
+              <a:t>Una conexión de red se interrumpió</a:t>
+            </a:r>
+          </a:p>
+          <a:p>
+            <a:pPr lvl="1"/>
+            <a:r>
+              <a:rPr lang="es-MX" dirty="0"/>
+              <a:t>La JVM se quedó sin memoria</a:t>
+            </a:r>
+          </a:p>
+          <a:p>
+            <a:r>
+              <a:rPr lang="es-MX" dirty="0"/>
+              <a:t>Si no hacer un manejo correcto de la excepción, se mostrará un error y se terminará la ejecución del programa.</a:t>
+            </a:r>
+            <a:endParaRPr lang="en-US" dirty="0"/>
+          </a:p>
+        </p:txBody>
+      </p:sp>
+    </p:spTree>
+    <p:extLst>
+      <p:ext uri="{BB962C8B-B14F-4D97-AF65-F5344CB8AC3E}">
+        <p14:creationId xmlns:p14="http://schemas.microsoft.com/office/powerpoint/2010/main" val="2209845548"/>
+      </p:ext>
+    </p:extLst>
+  </p:cSld>
+  <p:clrMapOvr>
+    <a:masterClrMapping/>
+  </p:clrMapOvr>
+</p:sld>
+</file>
+
 <file path=ppt/slides/slide4.xml><?xml version="1.0" encoding="utf-8"?>
 <p:sld xmlns:a="http://schemas.openxmlformats.org/drawingml/2006/main" xmlns:r="http://schemas.openxmlformats.org/officeDocument/2006/relationships" xmlns:p="http://schemas.openxmlformats.org/presentationml/2006/main">
   <p:cSld>
@@ -35365,6 +35501,275 @@
     <p:extLst>
       <p:ext uri="{BB962C8B-B14F-4D97-AF65-F5344CB8AC3E}">
         <p14:creationId xmlns:p14="http://schemas.microsoft.com/office/powerpoint/2010/main" val="56288283"/>
+      </p:ext>
+    </p:extLst>
+  </p:cSld>
+  <p:clrMapOvr>
+    <a:masterClrMapping/>
+  </p:clrMapOvr>
+</p:sld>
+</file>
+
+<file path=ppt/slides/slide40.xml><?xml version="1.0" encoding="utf-8"?>
+<p:sld xmlns:a="http://schemas.openxmlformats.org/drawingml/2006/main" xmlns:r="http://schemas.openxmlformats.org/officeDocument/2006/relationships" xmlns:p="http://schemas.openxmlformats.org/presentationml/2006/main">
+  <p:cSld>
+    <p:spTree>
+      <p:nvGrpSpPr>
+        <p:cNvPr id="1" name=""/>
+        <p:cNvGrpSpPr/>
+        <p:nvPr/>
+      </p:nvGrpSpPr>
+      <p:grpSpPr>
+        <a:xfrm>
+          <a:off x="0" y="0"/>
+          <a:ext cx="0" cy="0"/>
+          <a:chOff x="0" y="0"/>
+          <a:chExt cx="0" cy="0"/>
+        </a:xfrm>
+      </p:grpSpPr>
+      <p:sp>
+        <p:nvSpPr>
+          <p:cNvPr id="2" name="Título 1">
+            <a:extLst>
+              <a:ext uri="{FF2B5EF4-FFF2-40B4-BE49-F238E27FC236}">
+                <a16:creationId xmlns:a16="http://schemas.microsoft.com/office/drawing/2014/main" id="{8B022BAB-FE05-4FF1-B42E-C6B36A50E88F}"/>
+              </a:ext>
+            </a:extLst>
+          </p:cNvPr>
+          <p:cNvSpPr>
+            <a:spLocks noGrp="1"/>
+          </p:cNvSpPr>
+          <p:nvPr>
+            <p:ph type="title"/>
+          </p:nvPr>
+        </p:nvSpPr>
+        <p:spPr/>
+        <p:txBody>
+          <a:bodyPr/>
+          <a:lstStyle/>
+          <a:p>
+            <a:r>
+              <a:rPr lang="es-MX" dirty="0"/>
+              <a:t>Manejo de excepciones</a:t>
+            </a:r>
+            <a:endParaRPr lang="en-US" dirty="0"/>
+          </a:p>
+        </p:txBody>
+      </p:sp>
+      <p:sp>
+        <p:nvSpPr>
+          <p:cNvPr id="3" name="Marcador de texto 2">
+            <a:extLst>
+              <a:ext uri="{FF2B5EF4-FFF2-40B4-BE49-F238E27FC236}">
+                <a16:creationId xmlns:a16="http://schemas.microsoft.com/office/drawing/2014/main" id="{E4AEC0D6-718B-4D7F-AEE3-A825AE7C9518}"/>
+              </a:ext>
+            </a:extLst>
+          </p:cNvPr>
+          <p:cNvSpPr>
+            <a:spLocks noGrp="1"/>
+          </p:cNvSpPr>
+          <p:nvPr>
+            <p:ph type="body" idx="1"/>
+          </p:nvPr>
+        </p:nvSpPr>
+        <p:spPr/>
+        <p:txBody>
+          <a:bodyPr/>
+          <a:lstStyle/>
+          <a:p>
+            <a:r>
+              <a:rPr lang="es-MX" dirty="0"/>
+              <a:t> Se utilizan dos bloques de código:</a:t>
+            </a:r>
+          </a:p>
+          <a:p>
+            <a:pPr lvl="1"/>
+            <a:r>
+              <a:rPr lang="es-MX" dirty="0"/>
+              <a:t>try: contiene las instrucciones que son vulnerables a excepciones</a:t>
+            </a:r>
+          </a:p>
+          <a:p>
+            <a:pPr lvl="1"/>
+            <a:r>
+              <a:rPr lang="es-MX" dirty="0"/>
+              <a:t>catch: evita la detención abrupta del programa y toma acciones para remediar</a:t>
+            </a:r>
+          </a:p>
+          <a:p>
+            <a:pPr lvl="1"/>
+            <a:r>
+              <a:rPr lang="en-US" dirty="0"/>
+              <a:t>finally: </a:t>
+            </a:r>
+            <a:r>
+              <a:rPr lang="en-US" dirty="0" err="1"/>
+              <a:t>bloque</a:t>
+            </a:r>
+            <a:r>
+              <a:rPr lang="en-US" dirty="0"/>
+              <a:t> de Código que se debe </a:t>
+            </a:r>
+            <a:r>
+              <a:rPr lang="en-US" dirty="0" err="1"/>
+              <a:t>ejecutar</a:t>
+            </a:r>
+            <a:r>
+              <a:rPr lang="en-US" dirty="0"/>
+              <a:t> antes de </a:t>
+            </a:r>
+            <a:r>
+              <a:rPr lang="en-US" dirty="0" err="1"/>
+              <a:t>retornar</a:t>
+            </a:r>
+            <a:r>
+              <a:rPr lang="en-US" dirty="0"/>
+              <a:t> un </a:t>
+            </a:r>
+            <a:r>
+              <a:rPr lang="en-US" dirty="0" err="1"/>
+              <a:t>método</a:t>
+            </a:r>
+            <a:r>
+              <a:rPr lang="en-US" dirty="0"/>
+              <a:t>.</a:t>
+            </a:r>
+          </a:p>
+          <a:p>
+            <a:pPr marL="604520" lvl="1" indent="0">
+              <a:buNone/>
+            </a:pPr>
+            <a:r>
+              <a:rPr lang="en-US" dirty="0"/>
+              <a:t>try {</a:t>
+            </a:r>
+          </a:p>
+          <a:p>
+            <a:pPr marL="604520" lvl="1" indent="0">
+              <a:buNone/>
+            </a:pPr>
+            <a:r>
+              <a:rPr lang="en-US" dirty="0"/>
+              <a:t>    //</a:t>
+            </a:r>
+            <a:r>
+              <a:rPr lang="en-US" dirty="0" err="1"/>
+              <a:t>codigo</a:t>
+            </a:r>
+            <a:r>
+              <a:rPr lang="en-US" dirty="0"/>
+              <a:t> a </a:t>
+            </a:r>
+            <a:r>
+              <a:rPr lang="en-US" dirty="0" err="1"/>
+              <a:t>monitorear</a:t>
+            </a:r>
+            <a:r>
+              <a:rPr lang="en-US" dirty="0"/>
+              <a:t> por </a:t>
+            </a:r>
+            <a:r>
+              <a:rPr lang="en-US" dirty="0" err="1"/>
+              <a:t>potenciales</a:t>
+            </a:r>
+            <a:r>
+              <a:rPr lang="en-US" dirty="0"/>
+              <a:t> </a:t>
+            </a:r>
+            <a:r>
+              <a:rPr lang="en-US" dirty="0" err="1"/>
+              <a:t>errores</a:t>
+            </a:r>
+            <a:endParaRPr lang="en-US" dirty="0"/>
+          </a:p>
+          <a:p>
+            <a:pPr marL="604520" lvl="1" indent="0">
+              <a:buNone/>
+            </a:pPr>
+            <a:r>
+              <a:rPr lang="en-US" dirty="0"/>
+              <a:t>} catch (ExceptionType1 ex) {</a:t>
+            </a:r>
+          </a:p>
+          <a:p>
+            <a:pPr marL="604520" lvl="1" indent="0">
+              <a:buNone/>
+            </a:pPr>
+            <a:r>
+              <a:rPr lang="en-US" dirty="0"/>
+              <a:t>     //</a:t>
+            </a:r>
+            <a:r>
+              <a:rPr lang="en-US" dirty="0" err="1"/>
+              <a:t>manejador</a:t>
+            </a:r>
+            <a:r>
+              <a:rPr lang="en-US" dirty="0"/>
+              <a:t> de </a:t>
+            </a:r>
+            <a:r>
+              <a:rPr lang="en-US" dirty="0" err="1"/>
+              <a:t>excepciones</a:t>
+            </a:r>
+            <a:endParaRPr lang="en-US" dirty="0"/>
+          </a:p>
+          <a:p>
+            <a:pPr marL="604520" lvl="1" indent="0">
+              <a:buNone/>
+            </a:pPr>
+            <a:r>
+              <a:rPr lang="en-US" dirty="0"/>
+              <a:t>} finally {</a:t>
+            </a:r>
+          </a:p>
+          <a:p>
+            <a:pPr marL="604520" lvl="1" indent="0">
+              <a:buNone/>
+            </a:pPr>
+            <a:r>
+              <a:rPr lang="en-US" dirty="0"/>
+              <a:t>    //</a:t>
+            </a:r>
+            <a:r>
+              <a:rPr lang="en-US" dirty="0" err="1"/>
+              <a:t>bloque</a:t>
+            </a:r>
+            <a:r>
+              <a:rPr lang="en-US" dirty="0"/>
+              <a:t> de </a:t>
+            </a:r>
+            <a:r>
+              <a:rPr lang="en-US" dirty="0" err="1"/>
+              <a:t>codigo</a:t>
+            </a:r>
+            <a:r>
+              <a:rPr lang="en-US" dirty="0"/>
+              <a:t> dentro del </a:t>
+            </a:r>
+            <a:r>
+              <a:rPr lang="en-US" dirty="0" err="1"/>
+              <a:t>bloque</a:t>
+            </a:r>
+            <a:r>
+              <a:rPr lang="en-US" dirty="0"/>
+              <a:t> de try-catch</a:t>
+            </a:r>
+          </a:p>
+          <a:p>
+            <a:pPr marL="604520" lvl="1" indent="0">
+              <a:buNone/>
+            </a:pPr>
+            <a:r>
+              <a:rPr lang="en-US" dirty="0"/>
+              <a:t>}</a:t>
+            </a:r>
+          </a:p>
+        </p:txBody>
+      </p:sp>
+    </p:spTree>
+    <p:extLst>
+      <p:ext uri="{BB962C8B-B14F-4D97-AF65-F5344CB8AC3E}">
+        <p14:creationId xmlns:p14="http://schemas.microsoft.com/office/powerpoint/2010/main" val="428783462"/>
       </p:ext>
     </p:extLst>
   </p:cSld>

</xml_diff>